<commit_message>
push to jatos integration
</commit_message>
<xml_diff>
--- a/instruction-images/expInstructions.pptx
+++ b/instruction-images/expInstructions.pptx
@@ -7,14 +7,19 @@
   <p:sldIdLst>
     <p:sldId id="257" r:id="rId2"/>
     <p:sldId id="268" r:id="rId3"/>
-    <p:sldId id="265" r:id="rId4"/>
-    <p:sldId id="266" r:id="rId5"/>
-    <p:sldId id="259" r:id="rId6"/>
-    <p:sldId id="273" r:id="rId7"/>
-    <p:sldId id="274" r:id="rId8"/>
-    <p:sldId id="270" r:id="rId9"/>
-    <p:sldId id="271" r:id="rId10"/>
-    <p:sldId id="272" r:id="rId11"/>
+    <p:sldId id="276" r:id="rId4"/>
+    <p:sldId id="277" r:id="rId5"/>
+    <p:sldId id="278" r:id="rId6"/>
+    <p:sldId id="265" r:id="rId7"/>
+    <p:sldId id="266" r:id="rId8"/>
+    <p:sldId id="259" r:id="rId9"/>
+    <p:sldId id="279" r:id="rId10"/>
+    <p:sldId id="273" r:id="rId11"/>
+    <p:sldId id="280" r:id="rId12"/>
+    <p:sldId id="274" r:id="rId13"/>
+    <p:sldId id="270" r:id="rId14"/>
+    <p:sldId id="271" r:id="rId15"/>
+    <p:sldId id="272" r:id="rId16"/>
   </p:sldIdLst>
   <p:sldSz cx="12192000" cy="6858000"/>
   <p:notesSz cx="6858000" cy="9144000"/>
@@ -270,7 +275,7 @@
           <a:p>
             <a:fld id="{4B8E9ED7-1151-274C-BA24-50983D909DEF}" type="datetimeFigureOut">
               <a:rPr lang="en-US" smtClean="0"/>
-              <a:t>2/27/25</a:t>
+              <a:t>3/12/25</a:t>
             </a:fld>
             <a:endParaRPr lang="en-US"/>
           </a:p>
@@ -470,7 +475,7 @@
           <a:p>
             <a:fld id="{4B8E9ED7-1151-274C-BA24-50983D909DEF}" type="datetimeFigureOut">
               <a:rPr lang="en-US" smtClean="0"/>
-              <a:t>2/27/25</a:t>
+              <a:t>3/12/25</a:t>
             </a:fld>
             <a:endParaRPr lang="en-US"/>
           </a:p>
@@ -680,7 +685,7 @@
           <a:p>
             <a:fld id="{4B8E9ED7-1151-274C-BA24-50983D909DEF}" type="datetimeFigureOut">
               <a:rPr lang="en-US" smtClean="0"/>
-              <a:t>2/27/25</a:t>
+              <a:t>3/12/25</a:t>
             </a:fld>
             <a:endParaRPr lang="en-US"/>
           </a:p>
@@ -880,7 +885,7 @@
           <a:p>
             <a:fld id="{4B8E9ED7-1151-274C-BA24-50983D909DEF}" type="datetimeFigureOut">
               <a:rPr lang="en-US" smtClean="0"/>
-              <a:t>2/27/25</a:t>
+              <a:t>3/12/25</a:t>
             </a:fld>
             <a:endParaRPr lang="en-US"/>
           </a:p>
@@ -1156,7 +1161,7 @@
           <a:p>
             <a:fld id="{4B8E9ED7-1151-274C-BA24-50983D909DEF}" type="datetimeFigureOut">
               <a:rPr lang="en-US" smtClean="0"/>
-              <a:t>2/27/25</a:t>
+              <a:t>3/12/25</a:t>
             </a:fld>
             <a:endParaRPr lang="en-US"/>
           </a:p>
@@ -1424,7 +1429,7 @@
           <a:p>
             <a:fld id="{4B8E9ED7-1151-274C-BA24-50983D909DEF}" type="datetimeFigureOut">
               <a:rPr lang="en-US" smtClean="0"/>
-              <a:t>2/27/25</a:t>
+              <a:t>3/12/25</a:t>
             </a:fld>
             <a:endParaRPr lang="en-US"/>
           </a:p>
@@ -1839,7 +1844,7 @@
           <a:p>
             <a:fld id="{4B8E9ED7-1151-274C-BA24-50983D909DEF}" type="datetimeFigureOut">
               <a:rPr lang="en-US" smtClean="0"/>
-              <a:t>2/27/25</a:t>
+              <a:t>3/12/25</a:t>
             </a:fld>
             <a:endParaRPr lang="en-US"/>
           </a:p>
@@ -1981,7 +1986,7 @@
           <a:p>
             <a:fld id="{4B8E9ED7-1151-274C-BA24-50983D909DEF}" type="datetimeFigureOut">
               <a:rPr lang="en-US" smtClean="0"/>
-              <a:t>2/27/25</a:t>
+              <a:t>3/12/25</a:t>
             </a:fld>
             <a:endParaRPr lang="en-US"/>
           </a:p>
@@ -2094,7 +2099,7 @@
           <a:p>
             <a:fld id="{4B8E9ED7-1151-274C-BA24-50983D909DEF}" type="datetimeFigureOut">
               <a:rPr lang="en-US" smtClean="0"/>
-              <a:t>2/27/25</a:t>
+              <a:t>3/12/25</a:t>
             </a:fld>
             <a:endParaRPr lang="en-US"/>
           </a:p>
@@ -2407,7 +2412,7 @@
           <a:p>
             <a:fld id="{4B8E9ED7-1151-274C-BA24-50983D909DEF}" type="datetimeFigureOut">
               <a:rPr lang="en-US" smtClean="0"/>
-              <a:t>2/27/25</a:t>
+              <a:t>3/12/25</a:t>
             </a:fld>
             <a:endParaRPr lang="en-US"/>
           </a:p>
@@ -2696,7 +2701,7 @@
           <a:p>
             <a:fld id="{4B8E9ED7-1151-274C-BA24-50983D909DEF}" type="datetimeFigureOut">
               <a:rPr lang="en-US" smtClean="0"/>
-              <a:t>2/27/25</a:t>
+              <a:t>3/12/25</a:t>
             </a:fld>
             <a:endParaRPr lang="en-US"/>
           </a:p>
@@ -2939,7 +2944,7 @@
           <a:p>
             <a:fld id="{4B8E9ED7-1151-274C-BA24-50983D909DEF}" type="datetimeFigureOut">
               <a:rPr lang="en-US" smtClean="0"/>
-              <a:t>2/27/25</a:t>
+              <a:t>3/12/25</a:t>
             </a:fld>
             <a:endParaRPr lang="en-US"/>
           </a:p>
@@ -3345,7 +3350,7 @@
     <p:bg>
       <p:bgPr>
         <a:solidFill>
-          <a:srgbClr val="808080"/>
+          <a:srgbClr val="808070"/>
         </a:solidFill>
         <a:effectLst/>
       </p:bgPr>
@@ -3750,1115 +3755,7 @@
     <p:bg>
       <p:bgPr>
         <a:solidFill>
-          <a:srgbClr val="808080"/>
-        </a:solidFill>
-        <a:effectLst/>
-      </p:bgPr>
-    </p:bg>
-    <p:spTree>
-      <p:nvGrpSpPr>
-        <p:cNvPr id="1" name="">
-          <a:extLst>
-            <a:ext uri="{FF2B5EF4-FFF2-40B4-BE49-F238E27FC236}">
-              <a16:creationId xmlns:a16="http://schemas.microsoft.com/office/drawing/2014/main" id="{E5622CEB-2A91-9BCC-6206-EAD8237FB4F5}"/>
-            </a:ext>
-          </a:extLst>
-        </p:cNvPr>
-        <p:cNvGrpSpPr/>
-        <p:nvPr/>
-      </p:nvGrpSpPr>
-      <p:grpSpPr>
-        <a:xfrm>
-          <a:off x="0" y="0"/>
-          <a:ext cx="0" cy="0"/>
-          <a:chOff x="0" y="0"/>
-          <a:chExt cx="0" cy="0"/>
-        </a:xfrm>
-      </p:grpSpPr>
-      <p:sp>
-        <p:nvSpPr>
-          <p:cNvPr id="3" name="Content Placeholder 2">
-            <a:extLst>
-              <a:ext uri="{FF2B5EF4-FFF2-40B4-BE49-F238E27FC236}">
-                <a16:creationId xmlns:a16="http://schemas.microsoft.com/office/drawing/2014/main" id="{216871E9-AB77-E2CD-765A-3CD47DD17360}"/>
-              </a:ext>
-            </a:extLst>
-          </p:cNvPr>
-          <p:cNvSpPr>
-            <a:spLocks noGrp="1"/>
-          </p:cNvSpPr>
-          <p:nvPr>
-            <p:ph idx="1"/>
-          </p:nvPr>
-        </p:nvSpPr>
-        <p:spPr>
-          <a:xfrm>
-            <a:off x="838200" y="1131286"/>
-            <a:ext cx="10515600" cy="3193579"/>
-          </a:xfrm>
-        </p:spPr>
-        <p:txBody>
-          <a:bodyPr>
-            <a:normAutofit/>
-          </a:bodyPr>
-          <a:lstStyle/>
-          <a:p>
-            <a:pPr marL="0" indent="0" algn="ctr">
-              <a:buNone/>
-            </a:pPr>
-            <a:r>
-              <a:rPr lang="en-US" sz="4200" b="1" dirty="0">
-                <a:solidFill>
-                  <a:schemeClr val="bg1"/>
-                </a:solidFill>
-              </a:rPr>
-              <a:t>Option 3:</a:t>
-            </a:r>
-          </a:p>
-          <a:p>
-            <a:pPr marL="0" indent="0" algn="ctr">
-              <a:buNone/>
-            </a:pPr>
-            <a:endParaRPr lang="en-US" sz="4200" b="1" u="sng" dirty="0">
-              <a:solidFill>
-                <a:schemeClr val="bg1"/>
-              </a:solidFill>
-            </a:endParaRPr>
-          </a:p>
-          <a:p>
-            <a:pPr marL="0" indent="0" algn="ctr">
-              <a:buNone/>
-            </a:pPr>
-            <a:r>
-              <a:rPr lang="en-US" sz="4200" dirty="0">
-                <a:solidFill>
-                  <a:schemeClr val="bg1"/>
-                </a:solidFill>
-              </a:rPr>
-              <a:t>You will not receive advice</a:t>
-            </a:r>
-          </a:p>
-        </p:txBody>
-      </p:sp>
-      <p:sp>
-        <p:nvSpPr>
-          <p:cNvPr id="6" name="TextBox 5">
-            <a:extLst>
-              <a:ext uri="{FF2B5EF4-FFF2-40B4-BE49-F238E27FC236}">
-                <a16:creationId xmlns:a16="http://schemas.microsoft.com/office/drawing/2014/main" id="{B3A09276-B549-3B1F-C017-F0E971C1DC7A}"/>
-              </a:ext>
-            </a:extLst>
-          </p:cNvPr>
-          <p:cNvSpPr txBox="1"/>
-          <p:nvPr/>
-        </p:nvSpPr>
-        <p:spPr>
-          <a:xfrm>
-            <a:off x="4888042" y="3751423"/>
-            <a:ext cx="2415915" cy="738664"/>
-          </a:xfrm>
-          <a:prstGeom prst="rect">
-            <a:avLst/>
-          </a:prstGeom>
-          <a:solidFill>
-            <a:srgbClr val="EFEFEF"/>
-          </a:solidFill>
-        </p:spPr>
-        <p:txBody>
-          <a:bodyPr wrap="square" rtlCol="0" anchor="ctr">
-            <a:spAutoFit/>
-          </a:bodyPr>
-          <a:lstStyle/>
-          <a:p>
-            <a:pPr algn="ctr"/>
-            <a:r>
-              <a:rPr lang="en-US" sz="4200" b="1" dirty="0"/>
-              <a:t>continue</a:t>
-            </a:r>
-          </a:p>
-        </p:txBody>
-      </p:sp>
-    </p:spTree>
-    <p:extLst>
-      <p:ext uri="{BB962C8B-B14F-4D97-AF65-F5344CB8AC3E}">
-        <p14:creationId xmlns:p14="http://schemas.microsoft.com/office/powerpoint/2010/main" val="2990537946"/>
-      </p:ext>
-    </p:extLst>
-  </p:cSld>
-  <p:clrMapOvr>
-    <a:masterClrMapping/>
-  </p:clrMapOvr>
-</p:sld>
-</file>
-
-<file path=ppt/slides/slide2.xml><?xml version="1.0" encoding="utf-8"?>
-<p:sld xmlns:a="http://schemas.openxmlformats.org/drawingml/2006/main" xmlns:r="http://schemas.openxmlformats.org/officeDocument/2006/relationships" xmlns:p="http://schemas.openxmlformats.org/presentationml/2006/main">
-  <p:cSld>
-    <p:bg>
-      <p:bgPr>
-        <a:solidFill>
-          <a:srgbClr val="808080"/>
-        </a:solidFill>
-        <a:effectLst/>
-      </p:bgPr>
-    </p:bg>
-    <p:spTree>
-      <p:nvGrpSpPr>
-        <p:cNvPr id="1" name="">
-          <a:extLst>
-            <a:ext uri="{FF2B5EF4-FFF2-40B4-BE49-F238E27FC236}">
-              <a16:creationId xmlns:a16="http://schemas.microsoft.com/office/drawing/2014/main" id="{D0E95760-7BEE-2EDC-3725-B675DCCC21CE}"/>
-            </a:ext>
-          </a:extLst>
-        </p:cNvPr>
-        <p:cNvGrpSpPr/>
-        <p:nvPr/>
-      </p:nvGrpSpPr>
-      <p:grpSpPr>
-        <a:xfrm>
-          <a:off x="0" y="0"/>
-          <a:ext cx="0" cy="0"/>
-          <a:chOff x="0" y="0"/>
-          <a:chExt cx="0" cy="0"/>
-        </a:xfrm>
-      </p:grpSpPr>
-      <p:sp>
-        <p:nvSpPr>
-          <p:cNvPr id="3" name="Content Placeholder 2">
-            <a:extLst>
-              <a:ext uri="{FF2B5EF4-FFF2-40B4-BE49-F238E27FC236}">
-                <a16:creationId xmlns:a16="http://schemas.microsoft.com/office/drawing/2014/main" id="{AE42EEB7-BC92-915C-E4DB-2DC600E09659}"/>
-              </a:ext>
-            </a:extLst>
-          </p:cNvPr>
-          <p:cNvSpPr>
-            <a:spLocks noGrp="1"/>
-          </p:cNvSpPr>
-          <p:nvPr>
-            <p:ph idx="1"/>
-          </p:nvPr>
-        </p:nvSpPr>
-        <p:spPr>
-          <a:xfrm>
-            <a:off x="838200" y="457200"/>
-            <a:ext cx="10515600" cy="5658787"/>
-          </a:xfrm>
-        </p:spPr>
-        <p:txBody>
-          <a:bodyPr>
-            <a:normAutofit/>
-          </a:bodyPr>
-          <a:lstStyle/>
-          <a:p>
-            <a:pPr marL="0" indent="0" algn="ctr">
-              <a:lnSpc>
-                <a:spcPct val="200000"/>
-              </a:lnSpc>
-              <a:buNone/>
-            </a:pPr>
-            <a:r>
-              <a:rPr lang="en-US" u="sng" dirty="0">
-                <a:solidFill>
-                  <a:schemeClr val="bg1"/>
-                </a:solidFill>
-              </a:rPr>
-              <a:t>After your choice,</a:t>
-            </a:r>
-            <a:r>
-              <a:rPr lang="en-US" b="1" dirty="0">
-                <a:solidFill>
-                  <a:schemeClr val="bg1"/>
-                </a:solidFill>
-              </a:rPr>
-              <a:t> </a:t>
-            </a:r>
-            <a:r>
-              <a:rPr lang="en-US" dirty="0">
-                <a:solidFill>
-                  <a:schemeClr val="bg1"/>
-                </a:solidFill>
-              </a:rPr>
-              <a:t>you will have the option to receive advice.</a:t>
-            </a:r>
-            <a:endParaRPr lang="en-US" b="1" dirty="0">
-              <a:solidFill>
-                <a:schemeClr val="bg1"/>
-              </a:solidFill>
-            </a:endParaRPr>
-          </a:p>
-          <a:p>
-            <a:pPr marL="0" indent="0" algn="ctr">
-              <a:lnSpc>
-                <a:spcPct val="200000"/>
-              </a:lnSpc>
-              <a:buFont typeface="Arial" panose="020B0604020202020204" pitchFamily="34" charset="0"/>
-              <a:buNone/>
-            </a:pPr>
-            <a:br>
-              <a:rPr lang="en-US" dirty="0">
-                <a:solidFill>
-                  <a:schemeClr val="bg1"/>
-                </a:solidFill>
-              </a:rPr>
-            </a:br>
-            <a:endParaRPr lang="en-US" dirty="0">
-              <a:solidFill>
-                <a:schemeClr val="bg1"/>
-              </a:solidFill>
-            </a:endParaRPr>
-          </a:p>
-          <a:p>
-            <a:pPr marL="0" indent="0" algn="ctr">
-              <a:lnSpc>
-                <a:spcPct val="200000"/>
-              </a:lnSpc>
-              <a:buNone/>
-            </a:pPr>
-            <a:endParaRPr lang="en-US" dirty="0">
-              <a:solidFill>
-                <a:schemeClr val="bg1"/>
-              </a:solidFill>
-            </a:endParaRPr>
-          </a:p>
-        </p:txBody>
-      </p:sp>
-      <p:sp>
-        <p:nvSpPr>
-          <p:cNvPr id="9" name="Content Placeholder 2">
-            <a:extLst>
-              <a:ext uri="{FF2B5EF4-FFF2-40B4-BE49-F238E27FC236}">
-                <a16:creationId xmlns:a16="http://schemas.microsoft.com/office/drawing/2014/main" id="{E7AA873B-1636-61C7-BE08-07A4A5372FEC}"/>
-              </a:ext>
-            </a:extLst>
-          </p:cNvPr>
-          <p:cNvSpPr txBox="1">
-            <a:spLocks/>
-          </p:cNvSpPr>
-          <p:nvPr/>
-        </p:nvSpPr>
-        <p:spPr>
-          <a:xfrm>
-            <a:off x="838200" y="2093206"/>
-            <a:ext cx="10515600" cy="4188146"/>
-          </a:xfrm>
-          <a:prstGeom prst="rect">
-            <a:avLst/>
-          </a:prstGeom>
-        </p:spPr>
-        <p:txBody>
-          <a:bodyPr vert="horz" lIns="91440" tIns="45720" rIns="91440" bIns="45720" rtlCol="0">
-            <a:normAutofit/>
-          </a:bodyPr>
-          <a:lstStyle>
-            <a:lvl1pPr marL="228600" indent="-228600" algn="l" defTabSz="914400" rtl="0" eaLnBrk="1" latinLnBrk="0" hangingPunct="1">
-              <a:lnSpc>
-                <a:spcPct val="90000"/>
-              </a:lnSpc>
-              <a:spcBef>
-                <a:spcPts val="1000"/>
-              </a:spcBef>
-              <a:buFont typeface="Arial" panose="020B0604020202020204" pitchFamily="34" charset="0"/>
-              <a:buChar char="•"/>
-              <a:defRPr sz="2800" kern="1200">
-                <a:solidFill>
-                  <a:schemeClr val="tx1"/>
-                </a:solidFill>
-                <a:latin typeface="+mn-lt"/>
-                <a:ea typeface="+mn-ea"/>
-                <a:cs typeface="+mn-cs"/>
-              </a:defRPr>
-            </a:lvl1pPr>
-            <a:lvl2pPr marL="685800" indent="-228600" algn="l" defTabSz="914400" rtl="0" eaLnBrk="1" latinLnBrk="0" hangingPunct="1">
-              <a:lnSpc>
-                <a:spcPct val="90000"/>
-              </a:lnSpc>
-              <a:spcBef>
-                <a:spcPts val="500"/>
-              </a:spcBef>
-              <a:buFont typeface="Arial" panose="020B0604020202020204" pitchFamily="34" charset="0"/>
-              <a:buChar char="•"/>
-              <a:defRPr sz="2400" kern="1200">
-                <a:solidFill>
-                  <a:schemeClr val="tx1"/>
-                </a:solidFill>
-                <a:latin typeface="+mn-lt"/>
-                <a:ea typeface="+mn-ea"/>
-                <a:cs typeface="+mn-cs"/>
-              </a:defRPr>
-            </a:lvl2pPr>
-            <a:lvl3pPr marL="1143000" indent="-228600" algn="l" defTabSz="914400" rtl="0" eaLnBrk="1" latinLnBrk="0" hangingPunct="1">
-              <a:lnSpc>
-                <a:spcPct val="90000"/>
-              </a:lnSpc>
-              <a:spcBef>
-                <a:spcPts val="500"/>
-              </a:spcBef>
-              <a:buFont typeface="Arial" panose="020B0604020202020204" pitchFamily="34" charset="0"/>
-              <a:buChar char="•"/>
-              <a:defRPr sz="2000" kern="1200">
-                <a:solidFill>
-                  <a:schemeClr val="tx1"/>
-                </a:solidFill>
-                <a:latin typeface="+mn-lt"/>
-                <a:ea typeface="+mn-ea"/>
-                <a:cs typeface="+mn-cs"/>
-              </a:defRPr>
-            </a:lvl3pPr>
-            <a:lvl4pPr marL="1600200" indent="-228600" algn="l" defTabSz="914400" rtl="0" eaLnBrk="1" latinLnBrk="0" hangingPunct="1">
-              <a:lnSpc>
-                <a:spcPct val="90000"/>
-              </a:lnSpc>
-              <a:spcBef>
-                <a:spcPts val="500"/>
-              </a:spcBef>
-              <a:buFont typeface="Arial" panose="020B0604020202020204" pitchFamily="34" charset="0"/>
-              <a:buChar char="•"/>
-              <a:defRPr sz="1800" kern="1200">
-                <a:solidFill>
-                  <a:schemeClr val="tx1"/>
-                </a:solidFill>
-                <a:latin typeface="+mn-lt"/>
-                <a:ea typeface="+mn-ea"/>
-                <a:cs typeface="+mn-cs"/>
-              </a:defRPr>
-            </a:lvl4pPr>
-            <a:lvl5pPr marL="2057400" indent="-228600" algn="l" defTabSz="914400" rtl="0" eaLnBrk="1" latinLnBrk="0" hangingPunct="1">
-              <a:lnSpc>
-                <a:spcPct val="90000"/>
-              </a:lnSpc>
-              <a:spcBef>
-                <a:spcPts val="500"/>
-              </a:spcBef>
-              <a:buFont typeface="Arial" panose="020B0604020202020204" pitchFamily="34" charset="0"/>
-              <a:buChar char="•"/>
-              <a:defRPr sz="1800" kern="1200">
-                <a:solidFill>
-                  <a:schemeClr val="tx1"/>
-                </a:solidFill>
-                <a:latin typeface="+mn-lt"/>
-                <a:ea typeface="+mn-ea"/>
-                <a:cs typeface="+mn-cs"/>
-              </a:defRPr>
-            </a:lvl5pPr>
-            <a:lvl6pPr marL="2514600" indent="-228600" algn="l" defTabSz="914400" rtl="0" eaLnBrk="1" latinLnBrk="0" hangingPunct="1">
-              <a:lnSpc>
-                <a:spcPct val="90000"/>
-              </a:lnSpc>
-              <a:spcBef>
-                <a:spcPts val="500"/>
-              </a:spcBef>
-              <a:buFont typeface="Arial" panose="020B0604020202020204" pitchFamily="34" charset="0"/>
-              <a:buChar char="•"/>
-              <a:defRPr sz="1800" kern="1200">
-                <a:solidFill>
-                  <a:schemeClr val="tx1"/>
-                </a:solidFill>
-                <a:latin typeface="+mn-lt"/>
-                <a:ea typeface="+mn-ea"/>
-                <a:cs typeface="+mn-cs"/>
-              </a:defRPr>
-            </a:lvl6pPr>
-            <a:lvl7pPr marL="2971800" indent="-228600" algn="l" defTabSz="914400" rtl="0" eaLnBrk="1" latinLnBrk="0" hangingPunct="1">
-              <a:lnSpc>
-                <a:spcPct val="90000"/>
-              </a:lnSpc>
-              <a:spcBef>
-                <a:spcPts val="500"/>
-              </a:spcBef>
-              <a:buFont typeface="Arial" panose="020B0604020202020204" pitchFamily="34" charset="0"/>
-              <a:buChar char="•"/>
-              <a:defRPr sz="1800" kern="1200">
-                <a:solidFill>
-                  <a:schemeClr val="tx1"/>
-                </a:solidFill>
-                <a:latin typeface="+mn-lt"/>
-                <a:ea typeface="+mn-ea"/>
-                <a:cs typeface="+mn-cs"/>
-              </a:defRPr>
-            </a:lvl7pPr>
-            <a:lvl8pPr marL="3429000" indent="-228600" algn="l" defTabSz="914400" rtl="0" eaLnBrk="1" latinLnBrk="0" hangingPunct="1">
-              <a:lnSpc>
-                <a:spcPct val="90000"/>
-              </a:lnSpc>
-              <a:spcBef>
-                <a:spcPts val="500"/>
-              </a:spcBef>
-              <a:buFont typeface="Arial" panose="020B0604020202020204" pitchFamily="34" charset="0"/>
-              <a:buChar char="•"/>
-              <a:defRPr sz="1800" kern="1200">
-                <a:solidFill>
-                  <a:schemeClr val="tx1"/>
-                </a:solidFill>
-                <a:latin typeface="+mn-lt"/>
-                <a:ea typeface="+mn-ea"/>
-                <a:cs typeface="+mn-cs"/>
-              </a:defRPr>
-            </a:lvl8pPr>
-            <a:lvl9pPr marL="3886200" indent="-228600" algn="l" defTabSz="914400" rtl="0" eaLnBrk="1" latinLnBrk="0" hangingPunct="1">
-              <a:lnSpc>
-                <a:spcPct val="90000"/>
-              </a:lnSpc>
-              <a:spcBef>
-                <a:spcPts val="500"/>
-              </a:spcBef>
-              <a:buFont typeface="Arial" panose="020B0604020202020204" pitchFamily="34" charset="0"/>
-              <a:buChar char="•"/>
-              <a:defRPr sz="1800" kern="1200">
-                <a:solidFill>
-                  <a:schemeClr val="tx1"/>
-                </a:solidFill>
-                <a:latin typeface="+mn-lt"/>
-                <a:ea typeface="+mn-ea"/>
-                <a:cs typeface="+mn-cs"/>
-              </a:defRPr>
-            </a:lvl9pPr>
-          </a:lstStyle>
-          <a:p>
-            <a:pPr marL="0" indent="0" algn="ctr">
-              <a:buFont typeface="Arial" panose="020B0604020202020204" pitchFamily="34" charset="0"/>
-              <a:buNone/>
-            </a:pPr>
-            <a:endParaRPr lang="en-US" dirty="0">
-              <a:solidFill>
-                <a:schemeClr val="bg1"/>
-              </a:solidFill>
-            </a:endParaRPr>
-          </a:p>
-        </p:txBody>
-      </p:sp>
-      <p:pic>
-        <p:nvPicPr>
-          <p:cNvPr id="5" name="Picture 4">
-            <a:extLst>
-              <a:ext uri="{FF2B5EF4-FFF2-40B4-BE49-F238E27FC236}">
-                <a16:creationId xmlns:a16="http://schemas.microsoft.com/office/drawing/2014/main" id="{0109FB5E-A3A1-B5F5-D88D-47138982CB76}"/>
-              </a:ext>
-            </a:extLst>
-          </p:cNvPr>
-          <p:cNvPicPr>
-            <a:picLocks noChangeAspect="1"/>
-          </p:cNvPicPr>
-          <p:nvPr/>
-        </p:nvPicPr>
-        <p:blipFill>
-          <a:blip r:embed="rId2"/>
-          <a:stretch>
-            <a:fillRect/>
-          </a:stretch>
-        </p:blipFill>
-        <p:spPr>
-          <a:xfrm>
-            <a:off x="3371850" y="2093206"/>
-            <a:ext cx="5448300" cy="3733800"/>
-          </a:xfrm>
-          <a:prstGeom prst="rect">
-            <a:avLst/>
-          </a:prstGeom>
-          <a:ln w="101600">
-            <a:solidFill>
-              <a:schemeClr val="bg1"/>
-            </a:solidFill>
-          </a:ln>
-        </p:spPr>
-      </p:pic>
-    </p:spTree>
-    <p:extLst>
-      <p:ext uri="{BB962C8B-B14F-4D97-AF65-F5344CB8AC3E}">
-        <p14:creationId xmlns:p14="http://schemas.microsoft.com/office/powerpoint/2010/main" val="794057286"/>
-      </p:ext>
-    </p:extLst>
-  </p:cSld>
-  <p:clrMapOvr>
-    <a:masterClrMapping/>
-  </p:clrMapOvr>
-</p:sld>
-</file>
-
-<file path=ppt/slides/slide3.xml><?xml version="1.0" encoding="utf-8"?>
-<p:sld xmlns:a="http://schemas.openxmlformats.org/drawingml/2006/main" xmlns:r="http://schemas.openxmlformats.org/officeDocument/2006/relationships" xmlns:p="http://schemas.openxmlformats.org/presentationml/2006/main">
-  <p:cSld>
-    <p:bg>
-      <p:bgPr>
-        <a:solidFill>
-          <a:srgbClr val="808080"/>
-        </a:solidFill>
-        <a:effectLst/>
-      </p:bgPr>
-    </p:bg>
-    <p:spTree>
-      <p:nvGrpSpPr>
-        <p:cNvPr id="1" name="">
-          <a:extLst>
-            <a:ext uri="{FF2B5EF4-FFF2-40B4-BE49-F238E27FC236}">
-              <a16:creationId xmlns:a16="http://schemas.microsoft.com/office/drawing/2014/main" id="{ABB2C4CB-8B63-1EA8-DEBE-E02A511D7BF9}"/>
-            </a:ext>
-          </a:extLst>
-        </p:cNvPr>
-        <p:cNvGrpSpPr/>
-        <p:nvPr/>
-      </p:nvGrpSpPr>
-      <p:grpSpPr>
-        <a:xfrm>
-          <a:off x="0" y="0"/>
-          <a:ext cx="0" cy="0"/>
-          <a:chOff x="0" y="0"/>
-          <a:chExt cx="0" cy="0"/>
-        </a:xfrm>
-      </p:grpSpPr>
-      <p:sp>
-        <p:nvSpPr>
-          <p:cNvPr id="3" name="Content Placeholder 2">
-            <a:extLst>
-              <a:ext uri="{FF2B5EF4-FFF2-40B4-BE49-F238E27FC236}">
-                <a16:creationId xmlns:a16="http://schemas.microsoft.com/office/drawing/2014/main" id="{883BED18-3F57-2C98-EB22-1744DBE849DD}"/>
-              </a:ext>
-            </a:extLst>
-          </p:cNvPr>
-          <p:cNvSpPr>
-            <a:spLocks noGrp="1"/>
-          </p:cNvSpPr>
-          <p:nvPr>
-            <p:ph idx="1"/>
-          </p:nvPr>
-        </p:nvSpPr>
-        <p:spPr>
-          <a:xfrm>
-            <a:off x="838200" y="457201"/>
-            <a:ext cx="10515600" cy="1844110"/>
-          </a:xfrm>
-        </p:spPr>
-        <p:txBody>
-          <a:bodyPr>
-            <a:normAutofit/>
-          </a:bodyPr>
-          <a:lstStyle/>
-          <a:p>
-            <a:pPr marL="0" indent="0" algn="ctr">
-              <a:lnSpc>
-                <a:spcPct val="200000"/>
-              </a:lnSpc>
-              <a:buFont typeface="Arial" panose="020B0604020202020204" pitchFamily="34" charset="0"/>
-              <a:buNone/>
-            </a:pPr>
-            <a:r>
-              <a:rPr lang="en-US" dirty="0">
-                <a:solidFill>
-                  <a:schemeClr val="bg1"/>
-                </a:solidFill>
-              </a:rPr>
-              <a:t>This advice will be displayed as a single word, e.g. </a:t>
-            </a:r>
-            <a:r>
-              <a:rPr lang="en-US" u="sng" dirty="0">
-                <a:solidFill>
-                  <a:schemeClr val="bg1"/>
-                </a:solidFill>
-              </a:rPr>
-              <a:t>“LEFT”</a:t>
-            </a:r>
-          </a:p>
-        </p:txBody>
-      </p:sp>
-      <p:sp>
-        <p:nvSpPr>
-          <p:cNvPr id="4" name="TextBox 3">
-            <a:extLst>
-              <a:ext uri="{FF2B5EF4-FFF2-40B4-BE49-F238E27FC236}">
-                <a16:creationId xmlns:a16="http://schemas.microsoft.com/office/drawing/2014/main" id="{65E12E8C-1D88-9A12-C467-1DED8C2CBEF1}"/>
-              </a:ext>
-            </a:extLst>
-          </p:cNvPr>
-          <p:cNvSpPr txBox="1"/>
-          <p:nvPr/>
-        </p:nvSpPr>
-        <p:spPr>
-          <a:xfrm>
-            <a:off x="4402111" y="2840956"/>
-            <a:ext cx="3387777" cy="3170099"/>
-          </a:xfrm>
-          <a:prstGeom prst="rect">
-            <a:avLst/>
-          </a:prstGeom>
-          <a:noFill/>
-          <a:ln w="101600">
-            <a:solidFill>
-              <a:schemeClr val="bg1"/>
-            </a:solidFill>
-          </a:ln>
-        </p:spPr>
-        <p:txBody>
-          <a:bodyPr wrap="square" rtlCol="0">
-            <a:spAutoFit/>
-          </a:bodyPr>
-          <a:lstStyle/>
-          <a:p>
-            <a:pPr algn="ctr"/>
-            <a:r>
-              <a:rPr lang="en-US" sz="4000" b="1" dirty="0">
-                <a:solidFill>
-                  <a:schemeClr val="bg1"/>
-                </a:solidFill>
-              </a:rPr>
-              <a:t>Advice: </a:t>
-            </a:r>
-          </a:p>
-          <a:p>
-            <a:pPr algn="ctr"/>
-            <a:endParaRPr lang="en-US" sz="4000" b="1" dirty="0">
-              <a:solidFill>
-                <a:schemeClr val="bg1"/>
-              </a:solidFill>
-            </a:endParaRPr>
-          </a:p>
-          <a:p>
-            <a:pPr algn="ctr"/>
-            <a:r>
-              <a:rPr lang="en-US" sz="4000" b="1" dirty="0">
-                <a:solidFill>
-                  <a:schemeClr val="bg1"/>
-                </a:solidFill>
-              </a:rPr>
-              <a:t>LEFT</a:t>
-            </a:r>
-          </a:p>
-          <a:p>
-            <a:pPr algn="ctr"/>
-            <a:endParaRPr lang="en-US" sz="4000" b="1" dirty="0">
-              <a:solidFill>
-                <a:schemeClr val="bg1"/>
-              </a:solidFill>
-            </a:endParaRPr>
-          </a:p>
-          <a:p>
-            <a:pPr algn="ctr"/>
-            <a:endParaRPr lang="en-US" sz="4000" b="1" dirty="0">
-              <a:solidFill>
-                <a:schemeClr val="bg1"/>
-              </a:solidFill>
-            </a:endParaRPr>
-          </a:p>
-        </p:txBody>
-      </p:sp>
-    </p:spTree>
-    <p:extLst>
-      <p:ext uri="{BB962C8B-B14F-4D97-AF65-F5344CB8AC3E}">
-        <p14:creationId xmlns:p14="http://schemas.microsoft.com/office/powerpoint/2010/main" val="1089380817"/>
-      </p:ext>
-    </p:extLst>
-  </p:cSld>
-  <p:clrMapOvr>
-    <a:masterClrMapping/>
-  </p:clrMapOvr>
-</p:sld>
-</file>
-
-<file path=ppt/slides/slide4.xml><?xml version="1.0" encoding="utf-8"?>
-<p:sld xmlns:a="http://schemas.openxmlformats.org/drawingml/2006/main" xmlns:r="http://schemas.openxmlformats.org/officeDocument/2006/relationships" xmlns:p="http://schemas.openxmlformats.org/presentationml/2006/main">
-  <p:cSld>
-    <p:bg>
-      <p:bgPr>
-        <a:solidFill>
-          <a:srgbClr val="808080"/>
-        </a:solidFill>
-        <a:effectLst/>
-      </p:bgPr>
-    </p:bg>
-    <p:spTree>
-      <p:nvGrpSpPr>
-        <p:cNvPr id="1" name="">
-          <a:extLst>
-            <a:ext uri="{FF2B5EF4-FFF2-40B4-BE49-F238E27FC236}">
-              <a16:creationId xmlns:a16="http://schemas.microsoft.com/office/drawing/2014/main" id="{09853143-39EB-1776-C5EF-375B5BF4107F}"/>
-            </a:ext>
-          </a:extLst>
-        </p:cNvPr>
-        <p:cNvGrpSpPr/>
-        <p:nvPr/>
-      </p:nvGrpSpPr>
-      <p:grpSpPr>
-        <a:xfrm>
-          <a:off x="0" y="0"/>
-          <a:ext cx="0" cy="0"/>
-          <a:chOff x="0" y="0"/>
-          <a:chExt cx="0" cy="0"/>
-        </a:xfrm>
-      </p:grpSpPr>
-      <p:sp>
-        <p:nvSpPr>
-          <p:cNvPr id="3" name="Content Placeholder 2">
-            <a:extLst>
-              <a:ext uri="{FF2B5EF4-FFF2-40B4-BE49-F238E27FC236}">
-                <a16:creationId xmlns:a16="http://schemas.microsoft.com/office/drawing/2014/main" id="{D40CD515-F09F-9028-98A0-C3D356FEF08B}"/>
-              </a:ext>
-            </a:extLst>
-          </p:cNvPr>
-          <p:cNvSpPr>
-            <a:spLocks noGrp="1"/>
-          </p:cNvSpPr>
-          <p:nvPr>
-            <p:ph idx="1"/>
-          </p:nvPr>
-        </p:nvSpPr>
-        <p:spPr>
-          <a:xfrm>
-            <a:off x="838200" y="457201"/>
-            <a:ext cx="10515600" cy="1844110"/>
-          </a:xfrm>
-        </p:spPr>
-        <p:txBody>
-          <a:bodyPr>
-            <a:noAutofit/>
-          </a:bodyPr>
-          <a:lstStyle/>
-          <a:p>
-            <a:pPr marL="0" indent="0" algn="ctr">
-              <a:lnSpc>
-                <a:spcPct val="200000"/>
-              </a:lnSpc>
-              <a:buNone/>
-            </a:pPr>
-            <a:r>
-              <a:rPr lang="en-US" dirty="0">
-                <a:solidFill>
-                  <a:schemeClr val="bg1"/>
-                </a:solidFill>
-              </a:rPr>
-              <a:t>The words “LEFT” or “RIGHT” indicate the advice is to select the Left or Right box as having more dots.</a:t>
-            </a:r>
-          </a:p>
-        </p:txBody>
-      </p:sp>
-      <p:sp>
-        <p:nvSpPr>
-          <p:cNvPr id="4" name="TextBox 3">
-            <a:extLst>
-              <a:ext uri="{FF2B5EF4-FFF2-40B4-BE49-F238E27FC236}">
-                <a16:creationId xmlns:a16="http://schemas.microsoft.com/office/drawing/2014/main" id="{E148D547-45E8-97B4-7E04-A2E0E6100516}"/>
-              </a:ext>
-            </a:extLst>
-          </p:cNvPr>
-          <p:cNvSpPr txBox="1"/>
-          <p:nvPr/>
-        </p:nvSpPr>
-        <p:spPr>
-          <a:xfrm>
-            <a:off x="4402111" y="2691056"/>
-            <a:ext cx="3387777" cy="3170099"/>
-          </a:xfrm>
-          <a:prstGeom prst="rect">
-            <a:avLst/>
-          </a:prstGeom>
-          <a:noFill/>
-          <a:ln w="101600">
-            <a:solidFill>
-              <a:schemeClr val="bg1"/>
-            </a:solidFill>
-          </a:ln>
-        </p:spPr>
-        <p:txBody>
-          <a:bodyPr wrap="square" rtlCol="0">
-            <a:spAutoFit/>
-          </a:bodyPr>
-          <a:lstStyle/>
-          <a:p>
-            <a:pPr algn="ctr"/>
-            <a:r>
-              <a:rPr lang="en-US" sz="4000" b="1" dirty="0">
-                <a:solidFill>
-                  <a:schemeClr val="bg1"/>
-                </a:solidFill>
-              </a:rPr>
-              <a:t>Advice: </a:t>
-            </a:r>
-          </a:p>
-          <a:p>
-            <a:pPr algn="ctr"/>
-            <a:endParaRPr lang="en-US" sz="4000" b="1" dirty="0">
-              <a:solidFill>
-                <a:schemeClr val="bg1"/>
-              </a:solidFill>
-            </a:endParaRPr>
-          </a:p>
-          <a:p>
-            <a:pPr algn="ctr"/>
-            <a:r>
-              <a:rPr lang="en-US" sz="4000" b="1" dirty="0">
-                <a:solidFill>
-                  <a:schemeClr val="bg1"/>
-                </a:solidFill>
-              </a:rPr>
-              <a:t>RIGHT</a:t>
-            </a:r>
-          </a:p>
-          <a:p>
-            <a:pPr algn="ctr"/>
-            <a:endParaRPr lang="en-US" sz="4000" b="1" dirty="0">
-              <a:solidFill>
-                <a:schemeClr val="bg1"/>
-              </a:solidFill>
-            </a:endParaRPr>
-          </a:p>
-          <a:p>
-            <a:pPr algn="ctr"/>
-            <a:endParaRPr lang="en-US" sz="4000" b="1" dirty="0">
-              <a:solidFill>
-                <a:schemeClr val="bg1"/>
-              </a:solidFill>
-            </a:endParaRPr>
-          </a:p>
-        </p:txBody>
-      </p:sp>
-    </p:spTree>
-    <p:extLst>
-      <p:ext uri="{BB962C8B-B14F-4D97-AF65-F5344CB8AC3E}">
-        <p14:creationId xmlns:p14="http://schemas.microsoft.com/office/powerpoint/2010/main" val="1861600517"/>
-      </p:ext>
-    </p:extLst>
-  </p:cSld>
-  <p:clrMapOvr>
-    <a:masterClrMapping/>
-  </p:clrMapOvr>
-</p:sld>
-</file>
-
-<file path=ppt/slides/slide5.xml><?xml version="1.0" encoding="utf-8"?>
-<p:sld xmlns:a="http://schemas.openxmlformats.org/drawingml/2006/main" xmlns:r="http://schemas.openxmlformats.org/officeDocument/2006/relationships" xmlns:p="http://schemas.openxmlformats.org/presentationml/2006/main">
-  <p:cSld>
-    <p:bg>
-      <p:bgPr>
-        <a:solidFill>
-          <a:srgbClr val="808080"/>
-        </a:solidFill>
-        <a:effectLst/>
-      </p:bgPr>
-    </p:bg>
-    <p:spTree>
-      <p:nvGrpSpPr>
-        <p:cNvPr id="1" name="">
-          <a:extLst>
-            <a:ext uri="{FF2B5EF4-FFF2-40B4-BE49-F238E27FC236}">
-              <a16:creationId xmlns:a16="http://schemas.microsoft.com/office/drawing/2014/main" id="{AE5166C1-EFF0-A596-C01E-4C959116B2E3}"/>
-            </a:ext>
-          </a:extLst>
-        </p:cNvPr>
-        <p:cNvGrpSpPr/>
-        <p:nvPr/>
-      </p:nvGrpSpPr>
-      <p:grpSpPr>
-        <a:xfrm>
-          <a:off x="0" y="0"/>
-          <a:ext cx="0" cy="0"/>
-          <a:chOff x="0" y="0"/>
-          <a:chExt cx="0" cy="0"/>
-        </a:xfrm>
-      </p:grpSpPr>
-      <p:sp>
-        <p:nvSpPr>
-          <p:cNvPr id="3" name="Content Placeholder 2">
-            <a:extLst>
-              <a:ext uri="{FF2B5EF4-FFF2-40B4-BE49-F238E27FC236}">
-                <a16:creationId xmlns:a16="http://schemas.microsoft.com/office/drawing/2014/main" id="{698C2D30-E455-E802-FF33-4FAB1ABC085D}"/>
-              </a:ext>
-            </a:extLst>
-          </p:cNvPr>
-          <p:cNvSpPr>
-            <a:spLocks noGrp="1"/>
-          </p:cNvSpPr>
-          <p:nvPr>
-            <p:ph idx="1"/>
-          </p:nvPr>
-        </p:nvSpPr>
-        <p:spPr>
-          <a:xfrm>
-            <a:off x="838200" y="1131286"/>
-            <a:ext cx="10515600" cy="3193579"/>
-          </a:xfrm>
-        </p:spPr>
-        <p:txBody>
-          <a:bodyPr>
-            <a:normAutofit/>
-          </a:bodyPr>
-          <a:lstStyle/>
-          <a:p>
-            <a:pPr marL="0" indent="0" algn="ctr">
-              <a:buNone/>
-            </a:pPr>
-            <a:r>
-              <a:rPr lang="en-US" dirty="0">
-                <a:solidFill>
-                  <a:schemeClr val="bg1"/>
-                </a:solidFill>
-              </a:rPr>
-              <a:t>Please make sure your </a:t>
-            </a:r>
-            <a:r>
-              <a:rPr lang="en-US" u="sng" dirty="0">
-                <a:solidFill>
-                  <a:schemeClr val="bg1"/>
-                </a:solidFill>
-              </a:rPr>
-              <a:t>first decision is accurate</a:t>
-            </a:r>
-            <a:r>
-              <a:rPr lang="en-US" dirty="0">
-                <a:solidFill>
-                  <a:schemeClr val="bg1"/>
-                </a:solidFill>
-              </a:rPr>
-              <a:t>.</a:t>
-            </a:r>
-          </a:p>
-          <a:p>
-            <a:pPr marL="0" indent="0" algn="ctr">
-              <a:buNone/>
-            </a:pPr>
-            <a:r>
-              <a:rPr lang="en-US" dirty="0">
-                <a:solidFill>
-                  <a:schemeClr val="bg1"/>
-                </a:solidFill>
-              </a:rPr>
-              <a:t>This is because you will not always receive advice. </a:t>
-            </a:r>
-          </a:p>
-          <a:p>
-            <a:pPr marL="0" indent="0" algn="ctr">
-              <a:buNone/>
-            </a:pPr>
-            <a:r>
-              <a:rPr lang="en-US" dirty="0">
-                <a:solidFill>
-                  <a:schemeClr val="bg1"/>
-                </a:solidFill>
-              </a:rPr>
-              <a:t>There are 3 possibilities: </a:t>
-            </a:r>
-          </a:p>
-        </p:txBody>
-      </p:sp>
-      <p:pic>
-        <p:nvPicPr>
-          <p:cNvPr id="12" name="Picture 11">
-            <a:extLst>
-              <a:ext uri="{FF2B5EF4-FFF2-40B4-BE49-F238E27FC236}">
-                <a16:creationId xmlns:a16="http://schemas.microsoft.com/office/drawing/2014/main" id="{4A3567E3-0162-37A1-BBC0-6A2420CF1005}"/>
-              </a:ext>
-            </a:extLst>
-          </p:cNvPr>
-          <p:cNvPicPr>
-            <a:picLocks noChangeAspect="1"/>
-          </p:cNvPicPr>
-          <p:nvPr/>
-        </p:nvPicPr>
-        <p:blipFill>
-          <a:blip r:embed="rId2"/>
-          <a:srcRect l="3822" r="7095"/>
-          <a:stretch/>
-        </p:blipFill>
-        <p:spPr>
-          <a:xfrm>
-            <a:off x="314793" y="3612923"/>
-            <a:ext cx="3522688" cy="2110329"/>
-          </a:xfrm>
-          <a:prstGeom prst="rect">
-            <a:avLst/>
-          </a:prstGeom>
-          <a:ln w="101600">
-            <a:solidFill>
-              <a:schemeClr val="bg1"/>
-            </a:solidFill>
-          </a:ln>
-        </p:spPr>
-      </p:pic>
-      <p:pic>
-        <p:nvPicPr>
-          <p:cNvPr id="14" name="Picture 13">
-            <a:extLst>
-              <a:ext uri="{FF2B5EF4-FFF2-40B4-BE49-F238E27FC236}">
-                <a16:creationId xmlns:a16="http://schemas.microsoft.com/office/drawing/2014/main" id="{6C43D192-A637-CBB1-523E-AE07D48F166F}"/>
-              </a:ext>
-            </a:extLst>
-          </p:cNvPr>
-          <p:cNvPicPr>
-            <a:picLocks noChangeAspect="1"/>
-          </p:cNvPicPr>
-          <p:nvPr/>
-        </p:nvPicPr>
-        <p:blipFill>
-          <a:blip r:embed="rId3"/>
-          <a:stretch>
-            <a:fillRect/>
-          </a:stretch>
-        </p:blipFill>
-        <p:spPr>
-          <a:xfrm>
-            <a:off x="4316199" y="4055087"/>
-            <a:ext cx="3633585" cy="2110329"/>
-          </a:xfrm>
-          <a:prstGeom prst="rect">
-            <a:avLst/>
-          </a:prstGeom>
-          <a:ln w="101600">
-            <a:solidFill>
-              <a:schemeClr val="bg1"/>
-            </a:solidFill>
-          </a:ln>
-        </p:spPr>
-      </p:pic>
-      <p:pic>
-        <p:nvPicPr>
-          <p:cNvPr id="16" name="Picture 15">
-            <a:extLst>
-              <a:ext uri="{FF2B5EF4-FFF2-40B4-BE49-F238E27FC236}">
-                <a16:creationId xmlns:a16="http://schemas.microsoft.com/office/drawing/2014/main" id="{A56A882E-27E3-75FC-C295-55179FD7C766}"/>
-              </a:ext>
-            </a:extLst>
-          </p:cNvPr>
-          <p:cNvPicPr>
-            <a:picLocks noChangeAspect="1"/>
-          </p:cNvPicPr>
-          <p:nvPr/>
-        </p:nvPicPr>
-        <p:blipFill>
-          <a:blip r:embed="rId4"/>
-          <a:srcRect l="7246"/>
-          <a:stretch/>
-        </p:blipFill>
-        <p:spPr>
-          <a:xfrm>
-            <a:off x="8428502" y="4268735"/>
-            <a:ext cx="3633585" cy="2166457"/>
-          </a:xfrm>
-          <a:prstGeom prst="rect">
-            <a:avLst/>
-          </a:prstGeom>
-          <a:ln w="101600">
-            <a:solidFill>
-              <a:schemeClr val="bg1"/>
-            </a:solidFill>
-          </a:ln>
-        </p:spPr>
-      </p:pic>
-    </p:spTree>
-    <p:extLst>
-      <p:ext uri="{BB962C8B-B14F-4D97-AF65-F5344CB8AC3E}">
-        <p14:creationId xmlns:p14="http://schemas.microsoft.com/office/powerpoint/2010/main" val="2244019906"/>
-      </p:ext>
-    </p:extLst>
-  </p:cSld>
-  <p:clrMapOvr>
-    <a:masterClrMapping/>
-  </p:clrMapOvr>
-</p:sld>
-</file>
-
-<file path=ppt/slides/slide6.xml><?xml version="1.0" encoding="utf-8"?>
-<p:sld xmlns:a="http://schemas.openxmlformats.org/drawingml/2006/main" xmlns:r="http://schemas.openxmlformats.org/officeDocument/2006/relationships" xmlns:p="http://schemas.openxmlformats.org/presentationml/2006/main">
-  <p:cSld>
-    <p:bg>
-      <p:bgPr>
-        <a:solidFill>
-          <a:srgbClr val="808080"/>
+          <a:srgbClr val="808070"/>
         </a:solidFill>
         <a:effectLst/>
       </p:bgPr>
@@ -4920,7 +3817,7 @@
                   <a:schemeClr val="bg1"/>
                 </a:solidFill>
               </a:rPr>
-              <a:t>After these options, you will be asked to enter your final decision:</a:t>
+              <a:t>After these options, you will be asked to confirm your final decision:</a:t>
             </a:r>
           </a:p>
         </p:txBody>
@@ -5058,13 +3955,802 @@
 </p:sld>
 </file>
 
-<file path=ppt/slides/slide7.xml><?xml version="1.0" encoding="utf-8"?>
+<file path=ppt/slides/slide11.xml><?xml version="1.0" encoding="utf-8"?>
 <p:sld xmlns:a="http://schemas.openxmlformats.org/drawingml/2006/main" xmlns:r="http://schemas.openxmlformats.org/officeDocument/2006/relationships" xmlns:p="http://schemas.openxmlformats.org/presentationml/2006/main">
   <p:cSld>
     <p:bg>
       <p:bgPr>
         <a:solidFill>
-          <a:srgbClr val="808080"/>
+          <a:srgbClr val="808070"/>
+        </a:solidFill>
+        <a:effectLst/>
+      </p:bgPr>
+    </p:bg>
+    <p:spTree>
+      <p:nvGrpSpPr>
+        <p:cNvPr id="1" name="">
+          <a:extLst>
+            <a:ext uri="{FF2B5EF4-FFF2-40B4-BE49-F238E27FC236}">
+              <a16:creationId xmlns:a16="http://schemas.microsoft.com/office/drawing/2014/main" id="{411982A2-EB3D-2717-BFA2-F515A4B2C117}"/>
+            </a:ext>
+          </a:extLst>
+        </p:cNvPr>
+        <p:cNvGrpSpPr/>
+        <p:nvPr/>
+      </p:nvGrpSpPr>
+      <p:grpSpPr>
+        <a:xfrm>
+          <a:off x="0" y="0"/>
+          <a:ext cx="0" cy="0"/>
+          <a:chOff x="0" y="0"/>
+          <a:chExt cx="0" cy="0"/>
+        </a:xfrm>
+      </p:grpSpPr>
+      <p:sp>
+        <p:nvSpPr>
+          <p:cNvPr id="3" name="Content Placeholder 2">
+            <a:extLst>
+              <a:ext uri="{FF2B5EF4-FFF2-40B4-BE49-F238E27FC236}">
+                <a16:creationId xmlns:a16="http://schemas.microsoft.com/office/drawing/2014/main" id="{02E0F8CB-DE6E-7F0B-E34F-E3ED5221B8FC}"/>
+              </a:ext>
+            </a:extLst>
+          </p:cNvPr>
+          <p:cNvSpPr>
+            <a:spLocks noGrp="1"/>
+          </p:cNvSpPr>
+          <p:nvPr>
+            <p:ph idx="1"/>
+          </p:nvPr>
+        </p:nvSpPr>
+        <p:spPr>
+          <a:xfrm>
+            <a:off x="838200" y="1131286"/>
+            <a:ext cx="10515600" cy="3193579"/>
+          </a:xfrm>
+        </p:spPr>
+        <p:txBody>
+          <a:bodyPr>
+            <a:normAutofit/>
+          </a:bodyPr>
+          <a:lstStyle/>
+          <a:p>
+            <a:pPr marL="0" indent="0" algn="ctr">
+              <a:buNone/>
+            </a:pPr>
+            <a:r>
+              <a:rPr lang="en-US" dirty="0">
+                <a:solidFill>
+                  <a:schemeClr val="bg1"/>
+                </a:solidFill>
+              </a:rPr>
+              <a:t>Here is an example trial sequence:</a:t>
+            </a:r>
+          </a:p>
+        </p:txBody>
+      </p:sp>
+      <p:cxnSp>
+        <p:nvCxnSpPr>
+          <p:cNvPr id="8" name="Straight Arrow Connector 7">
+            <a:extLst>
+              <a:ext uri="{FF2B5EF4-FFF2-40B4-BE49-F238E27FC236}">
+                <a16:creationId xmlns:a16="http://schemas.microsoft.com/office/drawing/2014/main" id="{84024BBD-0BA2-79F9-EC95-4CFF637B85A7}"/>
+              </a:ext>
+            </a:extLst>
+          </p:cNvPr>
+          <p:cNvCxnSpPr/>
+          <p:nvPr/>
+        </p:nvCxnSpPr>
+        <p:spPr>
+          <a:xfrm>
+            <a:off x="975813" y="5960651"/>
+            <a:ext cx="10660566" cy="0"/>
+          </a:xfrm>
+          <a:prstGeom prst="straightConnector1">
+            <a:avLst/>
+          </a:prstGeom>
+          <a:ln w="101600">
+            <a:solidFill>
+              <a:schemeClr val="bg1"/>
+            </a:solidFill>
+            <a:tailEnd type="triangle"/>
+          </a:ln>
+        </p:spPr>
+        <p:style>
+          <a:lnRef idx="2">
+            <a:schemeClr val="accent1"/>
+          </a:lnRef>
+          <a:fillRef idx="0">
+            <a:schemeClr val="accent1"/>
+          </a:fillRef>
+          <a:effectRef idx="1">
+            <a:schemeClr val="accent1"/>
+          </a:effectRef>
+          <a:fontRef idx="minor">
+            <a:schemeClr val="tx1"/>
+          </a:fontRef>
+        </p:style>
+      </p:cxnSp>
+      <p:sp>
+        <p:nvSpPr>
+          <p:cNvPr id="9" name="TextBox 8">
+            <a:extLst>
+              <a:ext uri="{FF2B5EF4-FFF2-40B4-BE49-F238E27FC236}">
+                <a16:creationId xmlns:a16="http://schemas.microsoft.com/office/drawing/2014/main" id="{F088D3C5-D5BE-7173-60FC-5E3B8C0720AD}"/>
+              </a:ext>
+            </a:extLst>
+          </p:cNvPr>
+          <p:cNvSpPr txBox="1"/>
+          <p:nvPr/>
+        </p:nvSpPr>
+        <p:spPr>
+          <a:xfrm>
+            <a:off x="5599965" y="6334780"/>
+            <a:ext cx="936475" cy="523220"/>
+          </a:xfrm>
+          <a:prstGeom prst="rect">
+            <a:avLst/>
+          </a:prstGeom>
+          <a:noFill/>
+        </p:spPr>
+        <p:txBody>
+          <a:bodyPr wrap="none" rtlCol="0">
+            <a:spAutoFit/>
+          </a:bodyPr>
+          <a:lstStyle/>
+          <a:p>
+            <a:r>
+              <a:rPr lang="en-US" sz="2800" dirty="0">
+                <a:solidFill>
+                  <a:schemeClr val="bg1"/>
+                </a:solidFill>
+              </a:rPr>
+              <a:t>Time</a:t>
+            </a:r>
+          </a:p>
+        </p:txBody>
+      </p:sp>
+      <p:sp>
+        <p:nvSpPr>
+          <p:cNvPr id="11" name="Rectangle 10">
+            <a:extLst>
+              <a:ext uri="{FF2B5EF4-FFF2-40B4-BE49-F238E27FC236}">
+                <a16:creationId xmlns:a16="http://schemas.microsoft.com/office/drawing/2014/main" id="{372FC8DB-82B7-E4F2-E407-A443555561AC}"/>
+              </a:ext>
+            </a:extLst>
+          </p:cNvPr>
+          <p:cNvSpPr/>
+          <p:nvPr/>
+        </p:nvSpPr>
+        <p:spPr>
+          <a:xfrm>
+            <a:off x="838200" y="3784611"/>
+            <a:ext cx="1592766" cy="1115122"/>
+          </a:xfrm>
+          <a:prstGeom prst="rect">
+            <a:avLst/>
+          </a:prstGeom>
+        </p:spPr>
+        <p:style>
+          <a:lnRef idx="2">
+            <a:schemeClr val="accent1">
+              <a:shade val="15000"/>
+            </a:schemeClr>
+          </a:lnRef>
+          <a:fillRef idx="1">
+            <a:schemeClr val="accent1"/>
+          </a:fillRef>
+          <a:effectRef idx="0">
+            <a:schemeClr val="accent1"/>
+          </a:effectRef>
+          <a:fontRef idx="minor">
+            <a:schemeClr val="lt1"/>
+          </a:fontRef>
+        </p:style>
+        <p:txBody>
+          <a:bodyPr rtlCol="0" anchor="ctr"/>
+          <a:lstStyle/>
+          <a:p>
+            <a:pPr algn="ctr"/>
+            <a:r>
+              <a:rPr lang="en-US" sz="2800" dirty="0"/>
+              <a:t>+</a:t>
+            </a:r>
+          </a:p>
+        </p:txBody>
+      </p:sp>
+      <p:sp>
+        <p:nvSpPr>
+          <p:cNvPr id="12" name="TextBox 11">
+            <a:extLst>
+              <a:ext uri="{FF2B5EF4-FFF2-40B4-BE49-F238E27FC236}">
+                <a16:creationId xmlns:a16="http://schemas.microsoft.com/office/drawing/2014/main" id="{53562248-0F38-998A-3128-2DBB1958AEB4}"/>
+              </a:ext>
+            </a:extLst>
+          </p:cNvPr>
+          <p:cNvSpPr txBox="1"/>
+          <p:nvPr/>
+        </p:nvSpPr>
+        <p:spPr>
+          <a:xfrm>
+            <a:off x="975813" y="3261391"/>
+            <a:ext cx="1317540" cy="523220"/>
+          </a:xfrm>
+          <a:prstGeom prst="rect">
+            <a:avLst/>
+          </a:prstGeom>
+          <a:noFill/>
+        </p:spPr>
+        <p:txBody>
+          <a:bodyPr wrap="none" rtlCol="0">
+            <a:spAutoFit/>
+          </a:bodyPr>
+          <a:lstStyle/>
+          <a:p>
+            <a:r>
+              <a:rPr lang="en-US" sz="2800" dirty="0">
+                <a:solidFill>
+                  <a:schemeClr val="bg1"/>
+                </a:solidFill>
+              </a:rPr>
+              <a:t>fixation</a:t>
+            </a:r>
+          </a:p>
+        </p:txBody>
+      </p:sp>
+      <p:sp>
+        <p:nvSpPr>
+          <p:cNvPr id="13" name="Rectangle 12">
+            <a:extLst>
+              <a:ext uri="{FF2B5EF4-FFF2-40B4-BE49-F238E27FC236}">
+                <a16:creationId xmlns:a16="http://schemas.microsoft.com/office/drawing/2014/main" id="{4AC902CA-4B74-E056-0D5A-7B969EC75AFA}"/>
+              </a:ext>
+            </a:extLst>
+          </p:cNvPr>
+          <p:cNvSpPr/>
+          <p:nvPr/>
+        </p:nvSpPr>
+        <p:spPr>
+          <a:xfrm>
+            <a:off x="3014072" y="3784611"/>
+            <a:ext cx="1592766" cy="1115122"/>
+          </a:xfrm>
+          <a:prstGeom prst="rect">
+            <a:avLst/>
+          </a:prstGeom>
+        </p:spPr>
+        <p:style>
+          <a:lnRef idx="2">
+            <a:schemeClr val="accent1">
+              <a:shade val="15000"/>
+            </a:schemeClr>
+          </a:lnRef>
+          <a:fillRef idx="1">
+            <a:schemeClr val="accent1"/>
+          </a:fillRef>
+          <a:effectRef idx="0">
+            <a:schemeClr val="accent1"/>
+          </a:effectRef>
+          <a:fontRef idx="minor">
+            <a:schemeClr val="lt1"/>
+          </a:fontRef>
+        </p:style>
+        <p:txBody>
+          <a:bodyPr rtlCol="0" anchor="ctr"/>
+          <a:lstStyle/>
+          <a:p>
+            <a:pPr algn="ctr"/>
+            <a:endParaRPr lang="en-US" sz="2800" dirty="0"/>
+          </a:p>
+        </p:txBody>
+      </p:sp>
+      <p:sp>
+        <p:nvSpPr>
+          <p:cNvPr id="14" name="TextBox 13">
+            <a:extLst>
+              <a:ext uri="{FF2B5EF4-FFF2-40B4-BE49-F238E27FC236}">
+                <a16:creationId xmlns:a16="http://schemas.microsoft.com/office/drawing/2014/main" id="{538672E8-6F28-A84B-0E89-46D043805968}"/>
+              </a:ext>
+            </a:extLst>
+          </p:cNvPr>
+          <p:cNvSpPr txBox="1"/>
+          <p:nvPr/>
+        </p:nvSpPr>
+        <p:spPr>
+          <a:xfrm>
+            <a:off x="3373380" y="3261391"/>
+            <a:ext cx="874150" cy="523220"/>
+          </a:xfrm>
+          <a:prstGeom prst="rect">
+            <a:avLst/>
+          </a:prstGeom>
+          <a:noFill/>
+        </p:spPr>
+        <p:txBody>
+          <a:bodyPr wrap="none" rtlCol="0">
+            <a:spAutoFit/>
+          </a:bodyPr>
+          <a:lstStyle/>
+          <a:p>
+            <a:r>
+              <a:rPr lang="en-US" sz="2800" dirty="0">
+                <a:solidFill>
+                  <a:schemeClr val="bg1"/>
+                </a:solidFill>
+              </a:rPr>
+              <a:t>dots</a:t>
+            </a:r>
+          </a:p>
+        </p:txBody>
+      </p:sp>
+      <p:pic>
+        <p:nvPicPr>
+          <p:cNvPr id="15" name="Picture 14" descr="A white dots on a gray background&#10;&#10;AI-generated content may be incorrect.">
+            <a:extLst>
+              <a:ext uri="{FF2B5EF4-FFF2-40B4-BE49-F238E27FC236}">
+                <a16:creationId xmlns:a16="http://schemas.microsoft.com/office/drawing/2014/main" id="{EECF3CA9-656A-C1D2-4E25-5658312B8414}"/>
+              </a:ext>
+            </a:extLst>
+          </p:cNvPr>
+          <p:cNvPicPr>
+            <a:picLocks noChangeAspect="1"/>
+          </p:cNvPicPr>
+          <p:nvPr/>
+        </p:nvPicPr>
+        <p:blipFill>
+          <a:blip r:embed="rId2"/>
+          <a:stretch>
+            <a:fillRect/>
+          </a:stretch>
+        </p:blipFill>
+        <p:spPr>
+          <a:xfrm rot="10800000">
+            <a:off x="3140827" y="4062513"/>
+            <a:ext cx="1339256" cy="559318"/>
+          </a:xfrm>
+          <a:prstGeom prst="rect">
+            <a:avLst/>
+          </a:prstGeom>
+        </p:spPr>
+      </p:pic>
+      <p:sp>
+        <p:nvSpPr>
+          <p:cNvPr id="17" name="Rectangle 16">
+            <a:extLst>
+              <a:ext uri="{FF2B5EF4-FFF2-40B4-BE49-F238E27FC236}">
+                <a16:creationId xmlns:a16="http://schemas.microsoft.com/office/drawing/2014/main" id="{5050D8C5-48AE-0CA4-4163-F73FB8F2C62A}"/>
+              </a:ext>
+            </a:extLst>
+          </p:cNvPr>
+          <p:cNvSpPr/>
+          <p:nvPr/>
+        </p:nvSpPr>
+        <p:spPr>
+          <a:xfrm>
+            <a:off x="5189944" y="3784611"/>
+            <a:ext cx="1592766" cy="1115122"/>
+          </a:xfrm>
+          <a:prstGeom prst="rect">
+            <a:avLst/>
+          </a:prstGeom>
+        </p:spPr>
+        <p:style>
+          <a:lnRef idx="2">
+            <a:schemeClr val="accent1">
+              <a:shade val="15000"/>
+            </a:schemeClr>
+          </a:lnRef>
+          <a:fillRef idx="1">
+            <a:schemeClr val="accent1"/>
+          </a:fillRef>
+          <a:effectRef idx="0">
+            <a:schemeClr val="accent1"/>
+          </a:effectRef>
+          <a:fontRef idx="minor">
+            <a:schemeClr val="lt1"/>
+          </a:fontRef>
+        </p:style>
+        <p:txBody>
+          <a:bodyPr rtlCol="0" anchor="ctr"/>
+          <a:lstStyle/>
+          <a:p>
+            <a:pPr algn="ctr"/>
+            <a:r>
+              <a:rPr lang="en-US" sz="2800" dirty="0"/>
+              <a:t>?</a:t>
+            </a:r>
+          </a:p>
+        </p:txBody>
+      </p:sp>
+      <p:sp>
+        <p:nvSpPr>
+          <p:cNvPr id="18" name="TextBox 17">
+            <a:extLst>
+              <a:ext uri="{FF2B5EF4-FFF2-40B4-BE49-F238E27FC236}">
+                <a16:creationId xmlns:a16="http://schemas.microsoft.com/office/drawing/2014/main" id="{8C649829-CFC0-8DF7-E781-4894A10E403C}"/>
+              </a:ext>
+            </a:extLst>
+          </p:cNvPr>
+          <p:cNvSpPr txBox="1"/>
+          <p:nvPr/>
+        </p:nvSpPr>
+        <p:spPr>
+          <a:xfrm>
+            <a:off x="5032783" y="2830504"/>
+            <a:ext cx="1928733" cy="954107"/>
+          </a:xfrm>
+          <a:prstGeom prst="rect">
+            <a:avLst/>
+          </a:prstGeom>
+          <a:noFill/>
+        </p:spPr>
+        <p:txBody>
+          <a:bodyPr wrap="none" rtlCol="0">
+            <a:spAutoFit/>
+          </a:bodyPr>
+          <a:lstStyle/>
+          <a:p>
+            <a:pPr algn="ctr"/>
+            <a:r>
+              <a:rPr lang="en-US" sz="2800" dirty="0">
+                <a:solidFill>
+                  <a:schemeClr val="bg1"/>
+                </a:solidFill>
+              </a:rPr>
+              <a:t>first </a:t>
+            </a:r>
+            <a:br>
+              <a:rPr lang="en-US" sz="2800" dirty="0">
+                <a:solidFill>
+                  <a:schemeClr val="bg1"/>
+                </a:solidFill>
+              </a:rPr>
+            </a:br>
+            <a:r>
+              <a:rPr lang="en-US" sz="2800" dirty="0">
+                <a:solidFill>
+                  <a:schemeClr val="bg1"/>
+                </a:solidFill>
+              </a:rPr>
+              <a:t>confidence</a:t>
+            </a:r>
+          </a:p>
+        </p:txBody>
+      </p:sp>
+      <p:sp>
+        <p:nvSpPr>
+          <p:cNvPr id="19" name="Rectangle 18">
+            <a:extLst>
+              <a:ext uri="{FF2B5EF4-FFF2-40B4-BE49-F238E27FC236}">
+                <a16:creationId xmlns:a16="http://schemas.microsoft.com/office/drawing/2014/main" id="{BB0D0D15-6C52-2168-5C21-112EAF3D3A3C}"/>
+              </a:ext>
+            </a:extLst>
+          </p:cNvPr>
+          <p:cNvSpPr/>
+          <p:nvPr/>
+        </p:nvSpPr>
+        <p:spPr>
+          <a:xfrm>
+            <a:off x="7346268" y="2965440"/>
+            <a:ext cx="1592766" cy="1115122"/>
+          </a:xfrm>
+          <a:prstGeom prst="rect">
+            <a:avLst/>
+          </a:prstGeom>
+        </p:spPr>
+        <p:style>
+          <a:lnRef idx="2">
+            <a:schemeClr val="accent1">
+              <a:shade val="15000"/>
+            </a:schemeClr>
+          </a:lnRef>
+          <a:fillRef idx="1">
+            <a:schemeClr val="accent1"/>
+          </a:fillRef>
+          <a:effectRef idx="0">
+            <a:schemeClr val="accent1"/>
+          </a:effectRef>
+          <a:fontRef idx="minor">
+            <a:schemeClr val="lt1"/>
+          </a:fontRef>
+        </p:style>
+        <p:txBody>
+          <a:bodyPr rtlCol="0" anchor="ctr"/>
+          <a:lstStyle/>
+          <a:p>
+            <a:pPr algn="ctr"/>
+            <a:r>
+              <a:rPr lang="en-US" sz="2800" dirty="0"/>
+              <a:t>LEFT</a:t>
+            </a:r>
+          </a:p>
+        </p:txBody>
+      </p:sp>
+      <p:sp>
+        <p:nvSpPr>
+          <p:cNvPr id="20" name="TextBox 19">
+            <a:extLst>
+              <a:ext uri="{FF2B5EF4-FFF2-40B4-BE49-F238E27FC236}">
+                <a16:creationId xmlns:a16="http://schemas.microsoft.com/office/drawing/2014/main" id="{36BF9A87-B3DE-D246-D185-58D8F2DD8E1C}"/>
+              </a:ext>
+            </a:extLst>
+          </p:cNvPr>
+          <p:cNvSpPr txBox="1"/>
+          <p:nvPr/>
+        </p:nvSpPr>
+        <p:spPr>
+          <a:xfrm>
+            <a:off x="7492473" y="1944770"/>
+            <a:ext cx="1300356" cy="954107"/>
+          </a:xfrm>
+          <a:prstGeom prst="rect">
+            <a:avLst/>
+          </a:prstGeom>
+          <a:noFill/>
+        </p:spPr>
+        <p:txBody>
+          <a:bodyPr wrap="none" rtlCol="0">
+            <a:spAutoFit/>
+          </a:bodyPr>
+          <a:lstStyle/>
+          <a:p>
+            <a:pPr algn="ctr"/>
+            <a:r>
+              <a:rPr lang="en-US" sz="2800" dirty="0">
+                <a:solidFill>
+                  <a:schemeClr val="bg1"/>
+                </a:solidFill>
+              </a:rPr>
+              <a:t>Advice </a:t>
+            </a:r>
+            <a:br>
+              <a:rPr lang="en-US" sz="2800" dirty="0">
+                <a:solidFill>
+                  <a:schemeClr val="bg1"/>
+                </a:solidFill>
+              </a:rPr>
+            </a:br>
+            <a:r>
+              <a:rPr lang="en-US" sz="2800" dirty="0">
+                <a:solidFill>
+                  <a:schemeClr val="bg1"/>
+                </a:solidFill>
+              </a:rPr>
+              <a:t>(or not)</a:t>
+            </a:r>
+          </a:p>
+        </p:txBody>
+      </p:sp>
+      <p:sp>
+        <p:nvSpPr>
+          <p:cNvPr id="21" name="Rectangle 20">
+            <a:extLst>
+              <a:ext uri="{FF2B5EF4-FFF2-40B4-BE49-F238E27FC236}">
+                <a16:creationId xmlns:a16="http://schemas.microsoft.com/office/drawing/2014/main" id="{88FA7A82-EB74-6DCC-A299-80772E291B9B}"/>
+              </a:ext>
+            </a:extLst>
+          </p:cNvPr>
+          <p:cNvSpPr/>
+          <p:nvPr/>
+        </p:nvSpPr>
+        <p:spPr>
+          <a:xfrm>
+            <a:off x="7346268" y="4391428"/>
+            <a:ext cx="1592766" cy="1115122"/>
+          </a:xfrm>
+          <a:prstGeom prst="rect">
+            <a:avLst/>
+          </a:prstGeom>
+        </p:spPr>
+        <p:style>
+          <a:lnRef idx="2">
+            <a:schemeClr val="accent1">
+              <a:shade val="15000"/>
+            </a:schemeClr>
+          </a:lnRef>
+          <a:fillRef idx="1">
+            <a:schemeClr val="accent1"/>
+          </a:fillRef>
+          <a:effectRef idx="0">
+            <a:schemeClr val="accent1"/>
+          </a:effectRef>
+          <a:fontRef idx="minor">
+            <a:schemeClr val="lt1"/>
+          </a:fontRef>
+        </p:style>
+        <p:txBody>
+          <a:bodyPr rtlCol="0" anchor="ctr"/>
+          <a:lstStyle/>
+          <a:p>
+            <a:pPr algn="ctr"/>
+            <a:r>
+              <a:rPr lang="en-US" sz="2800" dirty="0"/>
+              <a:t>+</a:t>
+            </a:r>
+          </a:p>
+        </p:txBody>
+      </p:sp>
+      <p:sp>
+        <p:nvSpPr>
+          <p:cNvPr id="22" name="Rectangle 21">
+            <a:extLst>
+              <a:ext uri="{FF2B5EF4-FFF2-40B4-BE49-F238E27FC236}">
+                <a16:creationId xmlns:a16="http://schemas.microsoft.com/office/drawing/2014/main" id="{C39B9C99-A2AC-9D30-5798-DEF25C42C421}"/>
+              </a:ext>
+            </a:extLst>
+          </p:cNvPr>
+          <p:cNvSpPr/>
+          <p:nvPr/>
+        </p:nvSpPr>
+        <p:spPr>
+          <a:xfrm>
+            <a:off x="9541688" y="3906020"/>
+            <a:ext cx="1592766" cy="1115122"/>
+          </a:xfrm>
+          <a:prstGeom prst="rect">
+            <a:avLst/>
+          </a:prstGeom>
+        </p:spPr>
+        <p:style>
+          <a:lnRef idx="2">
+            <a:schemeClr val="accent1">
+              <a:shade val="15000"/>
+            </a:schemeClr>
+          </a:lnRef>
+          <a:fillRef idx="1">
+            <a:schemeClr val="accent1"/>
+          </a:fillRef>
+          <a:effectRef idx="0">
+            <a:schemeClr val="accent1"/>
+          </a:effectRef>
+          <a:fontRef idx="minor">
+            <a:schemeClr val="lt1"/>
+          </a:fontRef>
+        </p:style>
+        <p:txBody>
+          <a:bodyPr rtlCol="0" anchor="ctr"/>
+          <a:lstStyle/>
+          <a:p>
+            <a:pPr algn="ctr"/>
+            <a:r>
+              <a:rPr lang="en-US" sz="2800" dirty="0"/>
+              <a:t>?</a:t>
+            </a:r>
+          </a:p>
+        </p:txBody>
+      </p:sp>
+      <p:sp>
+        <p:nvSpPr>
+          <p:cNvPr id="23" name="TextBox 22">
+            <a:extLst>
+              <a:ext uri="{FF2B5EF4-FFF2-40B4-BE49-F238E27FC236}">
+                <a16:creationId xmlns:a16="http://schemas.microsoft.com/office/drawing/2014/main" id="{617236A0-BCAB-CA93-7894-C212316D014B}"/>
+              </a:ext>
+            </a:extLst>
+          </p:cNvPr>
+          <p:cNvSpPr txBox="1"/>
+          <p:nvPr/>
+        </p:nvSpPr>
+        <p:spPr>
+          <a:xfrm>
+            <a:off x="9385138" y="2951913"/>
+            <a:ext cx="1928733" cy="954107"/>
+          </a:xfrm>
+          <a:prstGeom prst="rect">
+            <a:avLst/>
+          </a:prstGeom>
+          <a:noFill/>
+        </p:spPr>
+        <p:txBody>
+          <a:bodyPr wrap="none" rtlCol="0">
+            <a:spAutoFit/>
+          </a:bodyPr>
+          <a:lstStyle/>
+          <a:p>
+            <a:pPr algn="ctr"/>
+            <a:r>
+              <a:rPr lang="en-US" sz="2800" dirty="0">
+                <a:solidFill>
+                  <a:schemeClr val="bg1"/>
+                </a:solidFill>
+              </a:rPr>
+              <a:t>final </a:t>
+            </a:r>
+            <a:br>
+              <a:rPr lang="en-US" sz="2800" dirty="0">
+                <a:solidFill>
+                  <a:schemeClr val="bg1"/>
+                </a:solidFill>
+              </a:rPr>
+            </a:br>
+            <a:r>
+              <a:rPr lang="en-US" sz="2800" dirty="0">
+                <a:solidFill>
+                  <a:schemeClr val="bg1"/>
+                </a:solidFill>
+              </a:rPr>
+              <a:t>confidence</a:t>
+            </a:r>
+          </a:p>
+        </p:txBody>
+      </p:sp>
+      <p:pic>
+        <p:nvPicPr>
+          <p:cNvPr id="24" name="Picture 23" descr="A screenshot of a game&#10;&#10;AI-generated content may be incorrect.">
+            <a:extLst>
+              <a:ext uri="{FF2B5EF4-FFF2-40B4-BE49-F238E27FC236}">
+                <a16:creationId xmlns:a16="http://schemas.microsoft.com/office/drawing/2014/main" id="{42B14243-6130-D15F-DC0E-E25789C40CF5}"/>
+              </a:ext>
+            </a:extLst>
+          </p:cNvPr>
+          <p:cNvPicPr>
+            <a:picLocks noChangeAspect="1"/>
+          </p:cNvPicPr>
+          <p:nvPr/>
+        </p:nvPicPr>
+        <p:blipFill>
+          <a:blip r:embed="rId3"/>
+          <a:srcRect b="29679"/>
+          <a:stretch/>
+        </p:blipFill>
+        <p:spPr>
+          <a:xfrm>
+            <a:off x="5256593" y="4129607"/>
+            <a:ext cx="1487021" cy="472057"/>
+          </a:xfrm>
+          <a:prstGeom prst="rect">
+            <a:avLst/>
+          </a:prstGeom>
+        </p:spPr>
+      </p:pic>
+      <p:pic>
+        <p:nvPicPr>
+          <p:cNvPr id="25" name="Picture 24" descr="A screenshot of a game&#10;&#10;AI-generated content may be incorrect.">
+            <a:extLst>
+              <a:ext uri="{FF2B5EF4-FFF2-40B4-BE49-F238E27FC236}">
+                <a16:creationId xmlns:a16="http://schemas.microsoft.com/office/drawing/2014/main" id="{903612A6-2A96-ACA3-5A30-0380E8C0F107}"/>
+              </a:ext>
+            </a:extLst>
+          </p:cNvPr>
+          <p:cNvPicPr>
+            <a:picLocks noChangeAspect="1"/>
+          </p:cNvPicPr>
+          <p:nvPr/>
+        </p:nvPicPr>
+        <p:blipFill>
+          <a:blip r:embed="rId3"/>
+          <a:srcRect b="29679"/>
+          <a:stretch/>
+        </p:blipFill>
+        <p:spPr>
+          <a:xfrm>
+            <a:off x="9605993" y="4200946"/>
+            <a:ext cx="1487021" cy="472057"/>
+          </a:xfrm>
+          <a:prstGeom prst="rect">
+            <a:avLst/>
+          </a:prstGeom>
+        </p:spPr>
+      </p:pic>
+    </p:spTree>
+    <p:extLst>
+      <p:ext uri="{BB962C8B-B14F-4D97-AF65-F5344CB8AC3E}">
+        <p14:creationId xmlns:p14="http://schemas.microsoft.com/office/powerpoint/2010/main" val="2094194100"/>
+      </p:ext>
+    </p:extLst>
+  </p:cSld>
+  <p:clrMapOvr>
+    <a:masterClrMapping/>
+  </p:clrMapOvr>
+</p:sld>
+</file>
+
+<file path=ppt/slides/slide12.xml><?xml version="1.0" encoding="utf-8"?>
+<p:sld xmlns:a="http://schemas.openxmlformats.org/drawingml/2006/main" xmlns:r="http://schemas.openxmlformats.org/officeDocument/2006/relationships" xmlns:p="http://schemas.openxmlformats.org/presentationml/2006/main">
+  <p:cSld>
+    <p:bg>
+      <p:bgPr>
+        <a:solidFill>
+          <a:srgbClr val="808070"/>
         </a:solidFill>
         <a:effectLst/>
       </p:bgPr>
@@ -5177,7 +4863,7 @@
 </p:sld>
 </file>
 
-<file path=ppt/slides/slide8.xml><?xml version="1.0" encoding="utf-8"?>
+<file path=ppt/slides/slide13.xml><?xml version="1.0" encoding="utf-8"?>
 <p:sld xmlns:a="http://schemas.openxmlformats.org/drawingml/2006/main" xmlns:r="http://schemas.openxmlformats.org/officeDocument/2006/relationships" xmlns:p="http://schemas.openxmlformats.org/presentationml/2006/main">
   <p:cSld>
     <p:bg>
@@ -5362,7 +5048,7 @@
 </p:sld>
 </file>
 
-<file path=ppt/slides/slide9.xml><?xml version="1.0" encoding="utf-8"?>
+<file path=ppt/slides/slide14.xml><?xml version="1.0" encoding="utf-8"?>
 <p:sld xmlns:a="http://schemas.openxmlformats.org/drawingml/2006/main" xmlns:r="http://schemas.openxmlformats.org/officeDocument/2006/relationships" xmlns:p="http://schemas.openxmlformats.org/presentationml/2006/main">
   <p:cSld>
     <p:bg>
@@ -5500,6 +5186,2197 @@
     <p:extLst>
       <p:ext uri="{BB962C8B-B14F-4D97-AF65-F5344CB8AC3E}">
         <p14:creationId xmlns:p14="http://schemas.microsoft.com/office/powerpoint/2010/main" val="4038687249"/>
+      </p:ext>
+    </p:extLst>
+  </p:cSld>
+  <p:clrMapOvr>
+    <a:masterClrMapping/>
+  </p:clrMapOvr>
+</p:sld>
+</file>
+
+<file path=ppt/slides/slide15.xml><?xml version="1.0" encoding="utf-8"?>
+<p:sld xmlns:a="http://schemas.openxmlformats.org/drawingml/2006/main" xmlns:r="http://schemas.openxmlformats.org/officeDocument/2006/relationships" xmlns:p="http://schemas.openxmlformats.org/presentationml/2006/main">
+  <p:cSld>
+    <p:bg>
+      <p:bgPr>
+        <a:solidFill>
+          <a:srgbClr val="808080"/>
+        </a:solidFill>
+        <a:effectLst/>
+      </p:bgPr>
+    </p:bg>
+    <p:spTree>
+      <p:nvGrpSpPr>
+        <p:cNvPr id="1" name="">
+          <a:extLst>
+            <a:ext uri="{FF2B5EF4-FFF2-40B4-BE49-F238E27FC236}">
+              <a16:creationId xmlns:a16="http://schemas.microsoft.com/office/drawing/2014/main" id="{E5622CEB-2A91-9BCC-6206-EAD8237FB4F5}"/>
+            </a:ext>
+          </a:extLst>
+        </p:cNvPr>
+        <p:cNvGrpSpPr/>
+        <p:nvPr/>
+      </p:nvGrpSpPr>
+      <p:grpSpPr>
+        <a:xfrm>
+          <a:off x="0" y="0"/>
+          <a:ext cx="0" cy="0"/>
+          <a:chOff x="0" y="0"/>
+          <a:chExt cx="0" cy="0"/>
+        </a:xfrm>
+      </p:grpSpPr>
+      <p:sp>
+        <p:nvSpPr>
+          <p:cNvPr id="3" name="Content Placeholder 2">
+            <a:extLst>
+              <a:ext uri="{FF2B5EF4-FFF2-40B4-BE49-F238E27FC236}">
+                <a16:creationId xmlns:a16="http://schemas.microsoft.com/office/drawing/2014/main" id="{216871E9-AB77-E2CD-765A-3CD47DD17360}"/>
+              </a:ext>
+            </a:extLst>
+          </p:cNvPr>
+          <p:cNvSpPr>
+            <a:spLocks noGrp="1"/>
+          </p:cNvSpPr>
+          <p:nvPr>
+            <p:ph idx="1"/>
+          </p:nvPr>
+        </p:nvSpPr>
+        <p:spPr>
+          <a:xfrm>
+            <a:off x="838200" y="1131286"/>
+            <a:ext cx="10515600" cy="3193579"/>
+          </a:xfrm>
+        </p:spPr>
+        <p:txBody>
+          <a:bodyPr>
+            <a:normAutofit/>
+          </a:bodyPr>
+          <a:lstStyle/>
+          <a:p>
+            <a:pPr marL="0" indent="0" algn="ctr">
+              <a:buNone/>
+            </a:pPr>
+            <a:r>
+              <a:rPr lang="en-US" sz="4200" b="1" dirty="0">
+                <a:solidFill>
+                  <a:schemeClr val="bg1"/>
+                </a:solidFill>
+              </a:rPr>
+              <a:t>Option 3:</a:t>
+            </a:r>
+          </a:p>
+          <a:p>
+            <a:pPr marL="0" indent="0" algn="ctr">
+              <a:buNone/>
+            </a:pPr>
+            <a:endParaRPr lang="en-US" sz="4200" b="1" u="sng" dirty="0">
+              <a:solidFill>
+                <a:schemeClr val="bg1"/>
+              </a:solidFill>
+            </a:endParaRPr>
+          </a:p>
+          <a:p>
+            <a:pPr marL="0" indent="0" algn="ctr">
+              <a:buNone/>
+            </a:pPr>
+            <a:r>
+              <a:rPr lang="en-US" sz="4200" dirty="0">
+                <a:solidFill>
+                  <a:schemeClr val="bg1"/>
+                </a:solidFill>
+              </a:rPr>
+              <a:t>You will not receive advice</a:t>
+            </a:r>
+          </a:p>
+        </p:txBody>
+      </p:sp>
+      <p:sp>
+        <p:nvSpPr>
+          <p:cNvPr id="6" name="TextBox 5">
+            <a:extLst>
+              <a:ext uri="{FF2B5EF4-FFF2-40B4-BE49-F238E27FC236}">
+                <a16:creationId xmlns:a16="http://schemas.microsoft.com/office/drawing/2014/main" id="{B3A09276-B549-3B1F-C017-F0E971C1DC7A}"/>
+              </a:ext>
+            </a:extLst>
+          </p:cNvPr>
+          <p:cNvSpPr txBox="1"/>
+          <p:nvPr/>
+        </p:nvSpPr>
+        <p:spPr>
+          <a:xfrm>
+            <a:off x="4888042" y="3751423"/>
+            <a:ext cx="2415915" cy="738664"/>
+          </a:xfrm>
+          <a:prstGeom prst="rect">
+            <a:avLst/>
+          </a:prstGeom>
+          <a:solidFill>
+            <a:srgbClr val="EFEFEF"/>
+          </a:solidFill>
+        </p:spPr>
+        <p:txBody>
+          <a:bodyPr wrap="square" rtlCol="0" anchor="ctr">
+            <a:spAutoFit/>
+          </a:bodyPr>
+          <a:lstStyle/>
+          <a:p>
+            <a:pPr algn="ctr"/>
+            <a:r>
+              <a:rPr lang="en-US" sz="4200" b="1" dirty="0"/>
+              <a:t>continue</a:t>
+            </a:r>
+          </a:p>
+        </p:txBody>
+      </p:sp>
+    </p:spTree>
+    <p:extLst>
+      <p:ext uri="{BB962C8B-B14F-4D97-AF65-F5344CB8AC3E}">
+        <p14:creationId xmlns:p14="http://schemas.microsoft.com/office/powerpoint/2010/main" val="2990537946"/>
+      </p:ext>
+    </p:extLst>
+  </p:cSld>
+  <p:clrMapOvr>
+    <a:masterClrMapping/>
+  </p:clrMapOvr>
+</p:sld>
+</file>
+
+<file path=ppt/slides/slide2.xml><?xml version="1.0" encoding="utf-8"?>
+<p:sld xmlns:a="http://schemas.openxmlformats.org/drawingml/2006/main" xmlns:r="http://schemas.openxmlformats.org/officeDocument/2006/relationships" xmlns:p="http://schemas.openxmlformats.org/presentationml/2006/main">
+  <p:cSld>
+    <p:bg>
+      <p:bgPr>
+        <a:solidFill>
+          <a:srgbClr val="808070"/>
+        </a:solidFill>
+        <a:effectLst/>
+      </p:bgPr>
+    </p:bg>
+    <p:spTree>
+      <p:nvGrpSpPr>
+        <p:cNvPr id="1" name="">
+          <a:extLst>
+            <a:ext uri="{FF2B5EF4-FFF2-40B4-BE49-F238E27FC236}">
+              <a16:creationId xmlns:a16="http://schemas.microsoft.com/office/drawing/2014/main" id="{D0E95760-7BEE-2EDC-3725-B675DCCC21CE}"/>
+            </a:ext>
+          </a:extLst>
+        </p:cNvPr>
+        <p:cNvGrpSpPr/>
+        <p:nvPr/>
+      </p:nvGrpSpPr>
+      <p:grpSpPr>
+        <a:xfrm>
+          <a:off x="0" y="0"/>
+          <a:ext cx="0" cy="0"/>
+          <a:chOff x="0" y="0"/>
+          <a:chExt cx="0" cy="0"/>
+        </a:xfrm>
+      </p:grpSpPr>
+      <p:sp>
+        <p:nvSpPr>
+          <p:cNvPr id="3" name="Content Placeholder 2">
+            <a:extLst>
+              <a:ext uri="{FF2B5EF4-FFF2-40B4-BE49-F238E27FC236}">
+                <a16:creationId xmlns:a16="http://schemas.microsoft.com/office/drawing/2014/main" id="{AE42EEB7-BC92-915C-E4DB-2DC600E09659}"/>
+              </a:ext>
+            </a:extLst>
+          </p:cNvPr>
+          <p:cNvSpPr>
+            <a:spLocks noGrp="1"/>
+          </p:cNvSpPr>
+          <p:nvPr>
+            <p:ph idx="1"/>
+          </p:nvPr>
+        </p:nvSpPr>
+        <p:spPr>
+          <a:xfrm>
+            <a:off x="1726115" y="573433"/>
+            <a:ext cx="8739769" cy="5658787"/>
+          </a:xfrm>
+        </p:spPr>
+        <p:txBody>
+          <a:bodyPr anchor="ctr">
+            <a:noAutofit/>
+          </a:bodyPr>
+          <a:lstStyle/>
+          <a:p>
+            <a:pPr marL="0" indent="0" algn="ctr">
+              <a:lnSpc>
+                <a:spcPct val="200000"/>
+              </a:lnSpc>
+              <a:buNone/>
+            </a:pPr>
+            <a:r>
+              <a:rPr lang="en-US" u="sng" dirty="0">
+                <a:solidFill>
+                  <a:schemeClr val="bg1"/>
+                </a:solidFill>
+              </a:rPr>
+              <a:t>After your choice,</a:t>
+            </a:r>
+            <a:r>
+              <a:rPr lang="en-US" b="1" dirty="0">
+                <a:solidFill>
+                  <a:schemeClr val="bg1"/>
+                </a:solidFill>
+              </a:rPr>
+              <a:t> </a:t>
+            </a:r>
+            <a:r>
+              <a:rPr lang="en-US" dirty="0">
+                <a:solidFill>
+                  <a:schemeClr val="bg1"/>
+                </a:solidFill>
+              </a:rPr>
+              <a:t>you will have the option to receive advice from an AI-based decision support system. </a:t>
+            </a:r>
+          </a:p>
+          <a:p>
+            <a:pPr marL="0" indent="0" algn="ctr">
+              <a:lnSpc>
+                <a:spcPct val="200000"/>
+              </a:lnSpc>
+              <a:buNone/>
+            </a:pPr>
+            <a:endParaRPr lang="en-US" dirty="0">
+              <a:solidFill>
+                <a:schemeClr val="bg1"/>
+              </a:solidFill>
+            </a:endParaRPr>
+          </a:p>
+          <a:p>
+            <a:pPr marL="0" indent="0" algn="ctr">
+              <a:lnSpc>
+                <a:spcPct val="200000"/>
+              </a:lnSpc>
+              <a:buNone/>
+            </a:pPr>
+            <a:r>
+              <a:rPr lang="en-US" dirty="0">
+                <a:solidFill>
+                  <a:schemeClr val="bg1"/>
+                </a:solidFill>
+              </a:rPr>
+              <a:t>This system has been designed to enhance human-decision making,  and has been trained on large datasets of past participant performance.</a:t>
+            </a:r>
+          </a:p>
+        </p:txBody>
+      </p:sp>
+      <p:sp>
+        <p:nvSpPr>
+          <p:cNvPr id="9" name="Content Placeholder 2">
+            <a:extLst>
+              <a:ext uri="{FF2B5EF4-FFF2-40B4-BE49-F238E27FC236}">
+                <a16:creationId xmlns:a16="http://schemas.microsoft.com/office/drawing/2014/main" id="{E7AA873B-1636-61C7-BE08-07A4A5372FEC}"/>
+              </a:ext>
+            </a:extLst>
+          </p:cNvPr>
+          <p:cNvSpPr txBox="1">
+            <a:spLocks/>
+          </p:cNvSpPr>
+          <p:nvPr/>
+        </p:nvSpPr>
+        <p:spPr>
+          <a:xfrm>
+            <a:off x="838200" y="2093206"/>
+            <a:ext cx="10515600" cy="4188146"/>
+          </a:xfrm>
+          <a:prstGeom prst="rect">
+            <a:avLst/>
+          </a:prstGeom>
+        </p:spPr>
+        <p:txBody>
+          <a:bodyPr vert="horz" lIns="91440" tIns="45720" rIns="91440" bIns="45720" rtlCol="0">
+            <a:normAutofit/>
+          </a:bodyPr>
+          <a:lstStyle>
+            <a:lvl1pPr marL="228600" indent="-228600" algn="l" defTabSz="914400" rtl="0" eaLnBrk="1" latinLnBrk="0" hangingPunct="1">
+              <a:lnSpc>
+                <a:spcPct val="90000"/>
+              </a:lnSpc>
+              <a:spcBef>
+                <a:spcPts val="1000"/>
+              </a:spcBef>
+              <a:buFont typeface="Arial" panose="020B0604020202020204" pitchFamily="34" charset="0"/>
+              <a:buChar char="•"/>
+              <a:defRPr sz="2800" kern="1200">
+                <a:solidFill>
+                  <a:schemeClr val="tx1"/>
+                </a:solidFill>
+                <a:latin typeface="+mn-lt"/>
+                <a:ea typeface="+mn-ea"/>
+                <a:cs typeface="+mn-cs"/>
+              </a:defRPr>
+            </a:lvl1pPr>
+            <a:lvl2pPr marL="685800" indent="-228600" algn="l" defTabSz="914400" rtl="0" eaLnBrk="1" latinLnBrk="0" hangingPunct="1">
+              <a:lnSpc>
+                <a:spcPct val="90000"/>
+              </a:lnSpc>
+              <a:spcBef>
+                <a:spcPts val="500"/>
+              </a:spcBef>
+              <a:buFont typeface="Arial" panose="020B0604020202020204" pitchFamily="34" charset="0"/>
+              <a:buChar char="•"/>
+              <a:defRPr sz="2400" kern="1200">
+                <a:solidFill>
+                  <a:schemeClr val="tx1"/>
+                </a:solidFill>
+                <a:latin typeface="+mn-lt"/>
+                <a:ea typeface="+mn-ea"/>
+                <a:cs typeface="+mn-cs"/>
+              </a:defRPr>
+            </a:lvl2pPr>
+            <a:lvl3pPr marL="1143000" indent="-228600" algn="l" defTabSz="914400" rtl="0" eaLnBrk="1" latinLnBrk="0" hangingPunct="1">
+              <a:lnSpc>
+                <a:spcPct val="90000"/>
+              </a:lnSpc>
+              <a:spcBef>
+                <a:spcPts val="500"/>
+              </a:spcBef>
+              <a:buFont typeface="Arial" panose="020B0604020202020204" pitchFamily="34" charset="0"/>
+              <a:buChar char="•"/>
+              <a:defRPr sz="2000" kern="1200">
+                <a:solidFill>
+                  <a:schemeClr val="tx1"/>
+                </a:solidFill>
+                <a:latin typeface="+mn-lt"/>
+                <a:ea typeface="+mn-ea"/>
+                <a:cs typeface="+mn-cs"/>
+              </a:defRPr>
+            </a:lvl3pPr>
+            <a:lvl4pPr marL="1600200" indent="-228600" algn="l" defTabSz="914400" rtl="0" eaLnBrk="1" latinLnBrk="0" hangingPunct="1">
+              <a:lnSpc>
+                <a:spcPct val="90000"/>
+              </a:lnSpc>
+              <a:spcBef>
+                <a:spcPts val="500"/>
+              </a:spcBef>
+              <a:buFont typeface="Arial" panose="020B0604020202020204" pitchFamily="34" charset="0"/>
+              <a:buChar char="•"/>
+              <a:defRPr sz="1800" kern="1200">
+                <a:solidFill>
+                  <a:schemeClr val="tx1"/>
+                </a:solidFill>
+                <a:latin typeface="+mn-lt"/>
+                <a:ea typeface="+mn-ea"/>
+                <a:cs typeface="+mn-cs"/>
+              </a:defRPr>
+            </a:lvl4pPr>
+            <a:lvl5pPr marL="2057400" indent="-228600" algn="l" defTabSz="914400" rtl="0" eaLnBrk="1" latinLnBrk="0" hangingPunct="1">
+              <a:lnSpc>
+                <a:spcPct val="90000"/>
+              </a:lnSpc>
+              <a:spcBef>
+                <a:spcPts val="500"/>
+              </a:spcBef>
+              <a:buFont typeface="Arial" panose="020B0604020202020204" pitchFamily="34" charset="0"/>
+              <a:buChar char="•"/>
+              <a:defRPr sz="1800" kern="1200">
+                <a:solidFill>
+                  <a:schemeClr val="tx1"/>
+                </a:solidFill>
+                <a:latin typeface="+mn-lt"/>
+                <a:ea typeface="+mn-ea"/>
+                <a:cs typeface="+mn-cs"/>
+              </a:defRPr>
+            </a:lvl5pPr>
+            <a:lvl6pPr marL="2514600" indent="-228600" algn="l" defTabSz="914400" rtl="0" eaLnBrk="1" latinLnBrk="0" hangingPunct="1">
+              <a:lnSpc>
+                <a:spcPct val="90000"/>
+              </a:lnSpc>
+              <a:spcBef>
+                <a:spcPts val="500"/>
+              </a:spcBef>
+              <a:buFont typeface="Arial" panose="020B0604020202020204" pitchFamily="34" charset="0"/>
+              <a:buChar char="•"/>
+              <a:defRPr sz="1800" kern="1200">
+                <a:solidFill>
+                  <a:schemeClr val="tx1"/>
+                </a:solidFill>
+                <a:latin typeface="+mn-lt"/>
+                <a:ea typeface="+mn-ea"/>
+                <a:cs typeface="+mn-cs"/>
+              </a:defRPr>
+            </a:lvl6pPr>
+            <a:lvl7pPr marL="2971800" indent="-228600" algn="l" defTabSz="914400" rtl="0" eaLnBrk="1" latinLnBrk="0" hangingPunct="1">
+              <a:lnSpc>
+                <a:spcPct val="90000"/>
+              </a:lnSpc>
+              <a:spcBef>
+                <a:spcPts val="500"/>
+              </a:spcBef>
+              <a:buFont typeface="Arial" panose="020B0604020202020204" pitchFamily="34" charset="0"/>
+              <a:buChar char="•"/>
+              <a:defRPr sz="1800" kern="1200">
+                <a:solidFill>
+                  <a:schemeClr val="tx1"/>
+                </a:solidFill>
+                <a:latin typeface="+mn-lt"/>
+                <a:ea typeface="+mn-ea"/>
+                <a:cs typeface="+mn-cs"/>
+              </a:defRPr>
+            </a:lvl7pPr>
+            <a:lvl8pPr marL="3429000" indent="-228600" algn="l" defTabSz="914400" rtl="0" eaLnBrk="1" latinLnBrk="0" hangingPunct="1">
+              <a:lnSpc>
+                <a:spcPct val="90000"/>
+              </a:lnSpc>
+              <a:spcBef>
+                <a:spcPts val="500"/>
+              </a:spcBef>
+              <a:buFont typeface="Arial" panose="020B0604020202020204" pitchFamily="34" charset="0"/>
+              <a:buChar char="•"/>
+              <a:defRPr sz="1800" kern="1200">
+                <a:solidFill>
+                  <a:schemeClr val="tx1"/>
+                </a:solidFill>
+                <a:latin typeface="+mn-lt"/>
+                <a:ea typeface="+mn-ea"/>
+                <a:cs typeface="+mn-cs"/>
+              </a:defRPr>
+            </a:lvl8pPr>
+            <a:lvl9pPr marL="3886200" indent="-228600" algn="l" defTabSz="914400" rtl="0" eaLnBrk="1" latinLnBrk="0" hangingPunct="1">
+              <a:lnSpc>
+                <a:spcPct val="90000"/>
+              </a:lnSpc>
+              <a:spcBef>
+                <a:spcPts val="500"/>
+              </a:spcBef>
+              <a:buFont typeface="Arial" panose="020B0604020202020204" pitchFamily="34" charset="0"/>
+              <a:buChar char="•"/>
+              <a:defRPr sz="1800" kern="1200">
+                <a:solidFill>
+                  <a:schemeClr val="tx1"/>
+                </a:solidFill>
+                <a:latin typeface="+mn-lt"/>
+                <a:ea typeface="+mn-ea"/>
+                <a:cs typeface="+mn-cs"/>
+              </a:defRPr>
+            </a:lvl9pPr>
+          </a:lstStyle>
+          <a:p>
+            <a:pPr marL="0" indent="0" algn="ctr">
+              <a:buFont typeface="Arial" panose="020B0604020202020204" pitchFamily="34" charset="0"/>
+              <a:buNone/>
+            </a:pPr>
+            <a:endParaRPr lang="en-US" dirty="0">
+              <a:solidFill>
+                <a:schemeClr val="bg1"/>
+              </a:solidFill>
+            </a:endParaRPr>
+          </a:p>
+        </p:txBody>
+      </p:sp>
+    </p:spTree>
+    <p:extLst>
+      <p:ext uri="{BB962C8B-B14F-4D97-AF65-F5344CB8AC3E}">
+        <p14:creationId xmlns:p14="http://schemas.microsoft.com/office/powerpoint/2010/main" val="794057286"/>
+      </p:ext>
+    </p:extLst>
+  </p:cSld>
+  <p:clrMapOvr>
+    <a:masterClrMapping/>
+  </p:clrMapOvr>
+</p:sld>
+</file>
+
+<file path=ppt/slides/slide3.xml><?xml version="1.0" encoding="utf-8"?>
+<p:sld xmlns:a="http://schemas.openxmlformats.org/drawingml/2006/main" xmlns:r="http://schemas.openxmlformats.org/officeDocument/2006/relationships" xmlns:p="http://schemas.openxmlformats.org/presentationml/2006/main">
+  <p:cSld>
+    <p:bg>
+      <p:bgPr>
+        <a:solidFill>
+          <a:srgbClr val="808070"/>
+        </a:solidFill>
+        <a:effectLst/>
+      </p:bgPr>
+    </p:bg>
+    <p:spTree>
+      <p:nvGrpSpPr>
+        <p:cNvPr id="1" name="">
+          <a:extLst>
+            <a:ext uri="{FF2B5EF4-FFF2-40B4-BE49-F238E27FC236}">
+              <a16:creationId xmlns:a16="http://schemas.microsoft.com/office/drawing/2014/main" id="{E47DF14F-A524-68ED-4580-AD4914817FB1}"/>
+            </a:ext>
+          </a:extLst>
+        </p:cNvPr>
+        <p:cNvGrpSpPr/>
+        <p:nvPr/>
+      </p:nvGrpSpPr>
+      <p:grpSpPr>
+        <a:xfrm>
+          <a:off x="0" y="0"/>
+          <a:ext cx="0" cy="0"/>
+          <a:chOff x="0" y="0"/>
+          <a:chExt cx="0" cy="0"/>
+        </a:xfrm>
+      </p:grpSpPr>
+      <p:sp>
+        <p:nvSpPr>
+          <p:cNvPr id="3" name="Content Placeholder 2">
+            <a:extLst>
+              <a:ext uri="{FF2B5EF4-FFF2-40B4-BE49-F238E27FC236}">
+                <a16:creationId xmlns:a16="http://schemas.microsoft.com/office/drawing/2014/main" id="{BCDC050B-2A76-DAD9-4EAE-240B0D1445C9}"/>
+              </a:ext>
+            </a:extLst>
+          </p:cNvPr>
+          <p:cNvSpPr>
+            <a:spLocks noGrp="1"/>
+          </p:cNvSpPr>
+          <p:nvPr>
+            <p:ph idx="1"/>
+          </p:nvPr>
+        </p:nvSpPr>
+        <p:spPr>
+          <a:xfrm>
+            <a:off x="1726115" y="573433"/>
+            <a:ext cx="8739769" cy="5658787"/>
+          </a:xfrm>
+        </p:spPr>
+        <p:txBody>
+          <a:bodyPr anchor="ctr">
+            <a:noAutofit/>
+          </a:bodyPr>
+          <a:lstStyle/>
+          <a:p>
+            <a:pPr marL="0" indent="0" algn="ctr">
+              <a:lnSpc>
+                <a:spcPct val="200000"/>
+              </a:lnSpc>
+              <a:buNone/>
+            </a:pPr>
+            <a:r>
+              <a:rPr lang="en-US" dirty="0">
+                <a:solidFill>
+                  <a:schemeClr val="bg1"/>
+                </a:solidFill>
+              </a:rPr>
+              <a:t>Using </a:t>
+            </a:r>
+            <a:r>
+              <a:rPr lang="en-US" u="sng" dirty="0">
+                <a:solidFill>
+                  <a:schemeClr val="bg1"/>
+                </a:solidFill>
+              </a:rPr>
+              <a:t>probabilistic modelling </a:t>
+            </a:r>
+            <a:r>
+              <a:rPr lang="en-US" dirty="0">
+                <a:solidFill>
+                  <a:schemeClr val="bg1"/>
+                </a:solidFill>
+              </a:rPr>
+              <a:t>and </a:t>
+            </a:r>
+            <a:br>
+              <a:rPr lang="en-US" dirty="0">
+                <a:solidFill>
+                  <a:schemeClr val="bg1"/>
+                </a:solidFill>
+              </a:rPr>
+            </a:br>
+            <a:r>
+              <a:rPr lang="en-US" u="sng" dirty="0">
+                <a:solidFill>
+                  <a:schemeClr val="bg1"/>
+                </a:solidFill>
+              </a:rPr>
+              <a:t>machine learning techniques</a:t>
+            </a:r>
+            <a:r>
+              <a:rPr lang="en-US" dirty="0">
+                <a:solidFill>
+                  <a:schemeClr val="bg1"/>
+                </a:solidFill>
+              </a:rPr>
+              <a:t>, the AI  predicts what will be the correct answer based on past participant responses.</a:t>
+            </a:r>
+          </a:p>
+        </p:txBody>
+      </p:sp>
+      <p:sp>
+        <p:nvSpPr>
+          <p:cNvPr id="9" name="Content Placeholder 2">
+            <a:extLst>
+              <a:ext uri="{FF2B5EF4-FFF2-40B4-BE49-F238E27FC236}">
+                <a16:creationId xmlns:a16="http://schemas.microsoft.com/office/drawing/2014/main" id="{AF4B6FEF-0BCE-538B-D8BE-1338AD04FCBA}"/>
+              </a:ext>
+            </a:extLst>
+          </p:cNvPr>
+          <p:cNvSpPr txBox="1">
+            <a:spLocks/>
+          </p:cNvSpPr>
+          <p:nvPr/>
+        </p:nvSpPr>
+        <p:spPr>
+          <a:xfrm>
+            <a:off x="838200" y="2093206"/>
+            <a:ext cx="10515600" cy="4188146"/>
+          </a:xfrm>
+          <a:prstGeom prst="rect">
+            <a:avLst/>
+          </a:prstGeom>
+        </p:spPr>
+        <p:txBody>
+          <a:bodyPr vert="horz" lIns="91440" tIns="45720" rIns="91440" bIns="45720" rtlCol="0">
+            <a:normAutofit/>
+          </a:bodyPr>
+          <a:lstStyle>
+            <a:lvl1pPr marL="228600" indent="-228600" algn="l" defTabSz="914400" rtl="0" eaLnBrk="1" latinLnBrk="0" hangingPunct="1">
+              <a:lnSpc>
+                <a:spcPct val="90000"/>
+              </a:lnSpc>
+              <a:spcBef>
+                <a:spcPts val="1000"/>
+              </a:spcBef>
+              <a:buFont typeface="Arial" panose="020B0604020202020204" pitchFamily="34" charset="0"/>
+              <a:buChar char="•"/>
+              <a:defRPr sz="2800" kern="1200">
+                <a:solidFill>
+                  <a:schemeClr val="tx1"/>
+                </a:solidFill>
+                <a:latin typeface="+mn-lt"/>
+                <a:ea typeface="+mn-ea"/>
+                <a:cs typeface="+mn-cs"/>
+              </a:defRPr>
+            </a:lvl1pPr>
+            <a:lvl2pPr marL="685800" indent="-228600" algn="l" defTabSz="914400" rtl="0" eaLnBrk="1" latinLnBrk="0" hangingPunct="1">
+              <a:lnSpc>
+                <a:spcPct val="90000"/>
+              </a:lnSpc>
+              <a:spcBef>
+                <a:spcPts val="500"/>
+              </a:spcBef>
+              <a:buFont typeface="Arial" panose="020B0604020202020204" pitchFamily="34" charset="0"/>
+              <a:buChar char="•"/>
+              <a:defRPr sz="2400" kern="1200">
+                <a:solidFill>
+                  <a:schemeClr val="tx1"/>
+                </a:solidFill>
+                <a:latin typeface="+mn-lt"/>
+                <a:ea typeface="+mn-ea"/>
+                <a:cs typeface="+mn-cs"/>
+              </a:defRPr>
+            </a:lvl2pPr>
+            <a:lvl3pPr marL="1143000" indent="-228600" algn="l" defTabSz="914400" rtl="0" eaLnBrk="1" latinLnBrk="0" hangingPunct="1">
+              <a:lnSpc>
+                <a:spcPct val="90000"/>
+              </a:lnSpc>
+              <a:spcBef>
+                <a:spcPts val="500"/>
+              </a:spcBef>
+              <a:buFont typeface="Arial" panose="020B0604020202020204" pitchFamily="34" charset="0"/>
+              <a:buChar char="•"/>
+              <a:defRPr sz="2000" kern="1200">
+                <a:solidFill>
+                  <a:schemeClr val="tx1"/>
+                </a:solidFill>
+                <a:latin typeface="+mn-lt"/>
+                <a:ea typeface="+mn-ea"/>
+                <a:cs typeface="+mn-cs"/>
+              </a:defRPr>
+            </a:lvl3pPr>
+            <a:lvl4pPr marL="1600200" indent="-228600" algn="l" defTabSz="914400" rtl="0" eaLnBrk="1" latinLnBrk="0" hangingPunct="1">
+              <a:lnSpc>
+                <a:spcPct val="90000"/>
+              </a:lnSpc>
+              <a:spcBef>
+                <a:spcPts val="500"/>
+              </a:spcBef>
+              <a:buFont typeface="Arial" panose="020B0604020202020204" pitchFamily="34" charset="0"/>
+              <a:buChar char="•"/>
+              <a:defRPr sz="1800" kern="1200">
+                <a:solidFill>
+                  <a:schemeClr val="tx1"/>
+                </a:solidFill>
+                <a:latin typeface="+mn-lt"/>
+                <a:ea typeface="+mn-ea"/>
+                <a:cs typeface="+mn-cs"/>
+              </a:defRPr>
+            </a:lvl4pPr>
+            <a:lvl5pPr marL="2057400" indent="-228600" algn="l" defTabSz="914400" rtl="0" eaLnBrk="1" latinLnBrk="0" hangingPunct="1">
+              <a:lnSpc>
+                <a:spcPct val="90000"/>
+              </a:lnSpc>
+              <a:spcBef>
+                <a:spcPts val="500"/>
+              </a:spcBef>
+              <a:buFont typeface="Arial" panose="020B0604020202020204" pitchFamily="34" charset="0"/>
+              <a:buChar char="•"/>
+              <a:defRPr sz="1800" kern="1200">
+                <a:solidFill>
+                  <a:schemeClr val="tx1"/>
+                </a:solidFill>
+                <a:latin typeface="+mn-lt"/>
+                <a:ea typeface="+mn-ea"/>
+                <a:cs typeface="+mn-cs"/>
+              </a:defRPr>
+            </a:lvl5pPr>
+            <a:lvl6pPr marL="2514600" indent="-228600" algn="l" defTabSz="914400" rtl="0" eaLnBrk="1" latinLnBrk="0" hangingPunct="1">
+              <a:lnSpc>
+                <a:spcPct val="90000"/>
+              </a:lnSpc>
+              <a:spcBef>
+                <a:spcPts val="500"/>
+              </a:spcBef>
+              <a:buFont typeface="Arial" panose="020B0604020202020204" pitchFamily="34" charset="0"/>
+              <a:buChar char="•"/>
+              <a:defRPr sz="1800" kern="1200">
+                <a:solidFill>
+                  <a:schemeClr val="tx1"/>
+                </a:solidFill>
+                <a:latin typeface="+mn-lt"/>
+                <a:ea typeface="+mn-ea"/>
+                <a:cs typeface="+mn-cs"/>
+              </a:defRPr>
+            </a:lvl6pPr>
+            <a:lvl7pPr marL="2971800" indent="-228600" algn="l" defTabSz="914400" rtl="0" eaLnBrk="1" latinLnBrk="0" hangingPunct="1">
+              <a:lnSpc>
+                <a:spcPct val="90000"/>
+              </a:lnSpc>
+              <a:spcBef>
+                <a:spcPts val="500"/>
+              </a:spcBef>
+              <a:buFont typeface="Arial" panose="020B0604020202020204" pitchFamily="34" charset="0"/>
+              <a:buChar char="•"/>
+              <a:defRPr sz="1800" kern="1200">
+                <a:solidFill>
+                  <a:schemeClr val="tx1"/>
+                </a:solidFill>
+                <a:latin typeface="+mn-lt"/>
+                <a:ea typeface="+mn-ea"/>
+                <a:cs typeface="+mn-cs"/>
+              </a:defRPr>
+            </a:lvl7pPr>
+            <a:lvl8pPr marL="3429000" indent="-228600" algn="l" defTabSz="914400" rtl="0" eaLnBrk="1" latinLnBrk="0" hangingPunct="1">
+              <a:lnSpc>
+                <a:spcPct val="90000"/>
+              </a:lnSpc>
+              <a:spcBef>
+                <a:spcPts val="500"/>
+              </a:spcBef>
+              <a:buFont typeface="Arial" panose="020B0604020202020204" pitchFamily="34" charset="0"/>
+              <a:buChar char="•"/>
+              <a:defRPr sz="1800" kern="1200">
+                <a:solidFill>
+                  <a:schemeClr val="tx1"/>
+                </a:solidFill>
+                <a:latin typeface="+mn-lt"/>
+                <a:ea typeface="+mn-ea"/>
+                <a:cs typeface="+mn-cs"/>
+              </a:defRPr>
+            </a:lvl8pPr>
+            <a:lvl9pPr marL="3886200" indent="-228600" algn="l" defTabSz="914400" rtl="0" eaLnBrk="1" latinLnBrk="0" hangingPunct="1">
+              <a:lnSpc>
+                <a:spcPct val="90000"/>
+              </a:lnSpc>
+              <a:spcBef>
+                <a:spcPts val="500"/>
+              </a:spcBef>
+              <a:buFont typeface="Arial" panose="020B0604020202020204" pitchFamily="34" charset="0"/>
+              <a:buChar char="•"/>
+              <a:defRPr sz="1800" kern="1200">
+                <a:solidFill>
+                  <a:schemeClr val="tx1"/>
+                </a:solidFill>
+                <a:latin typeface="+mn-lt"/>
+                <a:ea typeface="+mn-ea"/>
+                <a:cs typeface="+mn-cs"/>
+              </a:defRPr>
+            </a:lvl9pPr>
+          </a:lstStyle>
+          <a:p>
+            <a:pPr marL="0" indent="0" algn="ctr">
+              <a:buFont typeface="Arial" panose="020B0604020202020204" pitchFamily="34" charset="0"/>
+              <a:buNone/>
+            </a:pPr>
+            <a:endParaRPr lang="en-US" dirty="0">
+              <a:solidFill>
+                <a:schemeClr val="bg1"/>
+              </a:solidFill>
+            </a:endParaRPr>
+          </a:p>
+        </p:txBody>
+      </p:sp>
+    </p:spTree>
+    <p:extLst>
+      <p:ext uri="{BB962C8B-B14F-4D97-AF65-F5344CB8AC3E}">
+        <p14:creationId xmlns:p14="http://schemas.microsoft.com/office/powerpoint/2010/main" val="2434503611"/>
+      </p:ext>
+    </p:extLst>
+  </p:cSld>
+  <p:clrMapOvr>
+    <a:masterClrMapping/>
+  </p:clrMapOvr>
+</p:sld>
+</file>
+
+<file path=ppt/slides/slide4.xml><?xml version="1.0" encoding="utf-8"?>
+<p:sld xmlns:a="http://schemas.openxmlformats.org/drawingml/2006/main" xmlns:r="http://schemas.openxmlformats.org/officeDocument/2006/relationships" xmlns:p="http://schemas.openxmlformats.org/presentationml/2006/main">
+  <p:cSld>
+    <p:bg>
+      <p:bgPr>
+        <a:solidFill>
+          <a:srgbClr val="808070"/>
+        </a:solidFill>
+        <a:effectLst/>
+      </p:bgPr>
+    </p:bg>
+    <p:spTree>
+      <p:nvGrpSpPr>
+        <p:cNvPr id="1" name="">
+          <a:extLst>
+            <a:ext uri="{FF2B5EF4-FFF2-40B4-BE49-F238E27FC236}">
+              <a16:creationId xmlns:a16="http://schemas.microsoft.com/office/drawing/2014/main" id="{F55C22DC-05BB-312E-078D-AE618E0F4876}"/>
+            </a:ext>
+          </a:extLst>
+        </p:cNvPr>
+        <p:cNvGrpSpPr/>
+        <p:nvPr/>
+      </p:nvGrpSpPr>
+      <p:grpSpPr>
+        <a:xfrm>
+          <a:off x="0" y="0"/>
+          <a:ext cx="0" cy="0"/>
+          <a:chOff x="0" y="0"/>
+          <a:chExt cx="0" cy="0"/>
+        </a:xfrm>
+      </p:grpSpPr>
+      <p:sp>
+        <p:nvSpPr>
+          <p:cNvPr id="3" name="Content Placeholder 2">
+            <a:extLst>
+              <a:ext uri="{FF2B5EF4-FFF2-40B4-BE49-F238E27FC236}">
+                <a16:creationId xmlns:a16="http://schemas.microsoft.com/office/drawing/2014/main" id="{EC591A43-A247-903F-6675-4A868F7CC19D}"/>
+              </a:ext>
+            </a:extLst>
+          </p:cNvPr>
+          <p:cNvSpPr>
+            <a:spLocks noGrp="1"/>
+          </p:cNvSpPr>
+          <p:nvPr>
+            <p:ph idx="1"/>
+          </p:nvPr>
+        </p:nvSpPr>
+        <p:spPr>
+          <a:xfrm>
+            <a:off x="1726115" y="573433"/>
+            <a:ext cx="8739769" cy="5658787"/>
+          </a:xfrm>
+        </p:spPr>
+        <p:txBody>
+          <a:bodyPr anchor="ctr">
+            <a:noAutofit/>
+          </a:bodyPr>
+          <a:lstStyle/>
+          <a:p>
+            <a:pPr marL="0" indent="0" algn="ctr">
+              <a:lnSpc>
+                <a:spcPct val="200000"/>
+              </a:lnSpc>
+              <a:buNone/>
+            </a:pPr>
+            <a:r>
+              <a:rPr lang="en-US" dirty="0">
+                <a:solidFill>
+                  <a:schemeClr val="bg1"/>
+                </a:solidFill>
+              </a:rPr>
+              <a:t>The goal of this system is to help users improve their accuracy by providing real-time recommendations tailored to perceptual decision-making processes. </a:t>
+            </a:r>
+            <a:br>
+              <a:rPr lang="en-US" dirty="0">
+                <a:solidFill>
+                  <a:schemeClr val="bg1"/>
+                </a:solidFill>
+              </a:rPr>
+            </a:br>
+            <a:endParaRPr lang="en-US" dirty="0">
+              <a:solidFill>
+                <a:schemeClr val="bg1"/>
+              </a:solidFill>
+            </a:endParaRPr>
+          </a:p>
+          <a:p>
+            <a:pPr marL="0" indent="0" algn="ctr">
+              <a:lnSpc>
+                <a:spcPct val="200000"/>
+              </a:lnSpc>
+              <a:buNone/>
+            </a:pPr>
+            <a:r>
+              <a:rPr lang="en-US" dirty="0">
+                <a:solidFill>
+                  <a:schemeClr val="bg1"/>
+                </a:solidFill>
+              </a:rPr>
+              <a:t>(More information regarding this AI is available in the debrief at the end of this experiment)</a:t>
+            </a:r>
+          </a:p>
+        </p:txBody>
+      </p:sp>
+      <p:sp>
+        <p:nvSpPr>
+          <p:cNvPr id="9" name="Content Placeholder 2">
+            <a:extLst>
+              <a:ext uri="{FF2B5EF4-FFF2-40B4-BE49-F238E27FC236}">
+                <a16:creationId xmlns:a16="http://schemas.microsoft.com/office/drawing/2014/main" id="{8604431B-8153-C41B-E050-D6943E479DF1}"/>
+              </a:ext>
+            </a:extLst>
+          </p:cNvPr>
+          <p:cNvSpPr txBox="1">
+            <a:spLocks/>
+          </p:cNvSpPr>
+          <p:nvPr/>
+        </p:nvSpPr>
+        <p:spPr>
+          <a:xfrm>
+            <a:off x="838200" y="2093206"/>
+            <a:ext cx="10515600" cy="4188146"/>
+          </a:xfrm>
+          <a:prstGeom prst="rect">
+            <a:avLst/>
+          </a:prstGeom>
+        </p:spPr>
+        <p:txBody>
+          <a:bodyPr vert="horz" lIns="91440" tIns="45720" rIns="91440" bIns="45720" rtlCol="0">
+            <a:normAutofit/>
+          </a:bodyPr>
+          <a:lstStyle>
+            <a:lvl1pPr marL="228600" indent="-228600" algn="l" defTabSz="914400" rtl="0" eaLnBrk="1" latinLnBrk="0" hangingPunct="1">
+              <a:lnSpc>
+                <a:spcPct val="90000"/>
+              </a:lnSpc>
+              <a:spcBef>
+                <a:spcPts val="1000"/>
+              </a:spcBef>
+              <a:buFont typeface="Arial" panose="020B0604020202020204" pitchFamily="34" charset="0"/>
+              <a:buChar char="•"/>
+              <a:defRPr sz="2800" kern="1200">
+                <a:solidFill>
+                  <a:schemeClr val="tx1"/>
+                </a:solidFill>
+                <a:latin typeface="+mn-lt"/>
+                <a:ea typeface="+mn-ea"/>
+                <a:cs typeface="+mn-cs"/>
+              </a:defRPr>
+            </a:lvl1pPr>
+            <a:lvl2pPr marL="685800" indent="-228600" algn="l" defTabSz="914400" rtl="0" eaLnBrk="1" latinLnBrk="0" hangingPunct="1">
+              <a:lnSpc>
+                <a:spcPct val="90000"/>
+              </a:lnSpc>
+              <a:spcBef>
+                <a:spcPts val="500"/>
+              </a:spcBef>
+              <a:buFont typeface="Arial" panose="020B0604020202020204" pitchFamily="34" charset="0"/>
+              <a:buChar char="•"/>
+              <a:defRPr sz="2400" kern="1200">
+                <a:solidFill>
+                  <a:schemeClr val="tx1"/>
+                </a:solidFill>
+                <a:latin typeface="+mn-lt"/>
+                <a:ea typeface="+mn-ea"/>
+                <a:cs typeface="+mn-cs"/>
+              </a:defRPr>
+            </a:lvl2pPr>
+            <a:lvl3pPr marL="1143000" indent="-228600" algn="l" defTabSz="914400" rtl="0" eaLnBrk="1" latinLnBrk="0" hangingPunct="1">
+              <a:lnSpc>
+                <a:spcPct val="90000"/>
+              </a:lnSpc>
+              <a:spcBef>
+                <a:spcPts val="500"/>
+              </a:spcBef>
+              <a:buFont typeface="Arial" panose="020B0604020202020204" pitchFamily="34" charset="0"/>
+              <a:buChar char="•"/>
+              <a:defRPr sz="2000" kern="1200">
+                <a:solidFill>
+                  <a:schemeClr val="tx1"/>
+                </a:solidFill>
+                <a:latin typeface="+mn-lt"/>
+                <a:ea typeface="+mn-ea"/>
+                <a:cs typeface="+mn-cs"/>
+              </a:defRPr>
+            </a:lvl3pPr>
+            <a:lvl4pPr marL="1600200" indent="-228600" algn="l" defTabSz="914400" rtl="0" eaLnBrk="1" latinLnBrk="0" hangingPunct="1">
+              <a:lnSpc>
+                <a:spcPct val="90000"/>
+              </a:lnSpc>
+              <a:spcBef>
+                <a:spcPts val="500"/>
+              </a:spcBef>
+              <a:buFont typeface="Arial" panose="020B0604020202020204" pitchFamily="34" charset="0"/>
+              <a:buChar char="•"/>
+              <a:defRPr sz="1800" kern="1200">
+                <a:solidFill>
+                  <a:schemeClr val="tx1"/>
+                </a:solidFill>
+                <a:latin typeface="+mn-lt"/>
+                <a:ea typeface="+mn-ea"/>
+                <a:cs typeface="+mn-cs"/>
+              </a:defRPr>
+            </a:lvl4pPr>
+            <a:lvl5pPr marL="2057400" indent="-228600" algn="l" defTabSz="914400" rtl="0" eaLnBrk="1" latinLnBrk="0" hangingPunct="1">
+              <a:lnSpc>
+                <a:spcPct val="90000"/>
+              </a:lnSpc>
+              <a:spcBef>
+                <a:spcPts val="500"/>
+              </a:spcBef>
+              <a:buFont typeface="Arial" panose="020B0604020202020204" pitchFamily="34" charset="0"/>
+              <a:buChar char="•"/>
+              <a:defRPr sz="1800" kern="1200">
+                <a:solidFill>
+                  <a:schemeClr val="tx1"/>
+                </a:solidFill>
+                <a:latin typeface="+mn-lt"/>
+                <a:ea typeface="+mn-ea"/>
+                <a:cs typeface="+mn-cs"/>
+              </a:defRPr>
+            </a:lvl5pPr>
+            <a:lvl6pPr marL="2514600" indent="-228600" algn="l" defTabSz="914400" rtl="0" eaLnBrk="1" latinLnBrk="0" hangingPunct="1">
+              <a:lnSpc>
+                <a:spcPct val="90000"/>
+              </a:lnSpc>
+              <a:spcBef>
+                <a:spcPts val="500"/>
+              </a:spcBef>
+              <a:buFont typeface="Arial" panose="020B0604020202020204" pitchFamily="34" charset="0"/>
+              <a:buChar char="•"/>
+              <a:defRPr sz="1800" kern="1200">
+                <a:solidFill>
+                  <a:schemeClr val="tx1"/>
+                </a:solidFill>
+                <a:latin typeface="+mn-lt"/>
+                <a:ea typeface="+mn-ea"/>
+                <a:cs typeface="+mn-cs"/>
+              </a:defRPr>
+            </a:lvl6pPr>
+            <a:lvl7pPr marL="2971800" indent="-228600" algn="l" defTabSz="914400" rtl="0" eaLnBrk="1" latinLnBrk="0" hangingPunct="1">
+              <a:lnSpc>
+                <a:spcPct val="90000"/>
+              </a:lnSpc>
+              <a:spcBef>
+                <a:spcPts val="500"/>
+              </a:spcBef>
+              <a:buFont typeface="Arial" panose="020B0604020202020204" pitchFamily="34" charset="0"/>
+              <a:buChar char="•"/>
+              <a:defRPr sz="1800" kern="1200">
+                <a:solidFill>
+                  <a:schemeClr val="tx1"/>
+                </a:solidFill>
+                <a:latin typeface="+mn-lt"/>
+                <a:ea typeface="+mn-ea"/>
+                <a:cs typeface="+mn-cs"/>
+              </a:defRPr>
+            </a:lvl7pPr>
+            <a:lvl8pPr marL="3429000" indent="-228600" algn="l" defTabSz="914400" rtl="0" eaLnBrk="1" latinLnBrk="0" hangingPunct="1">
+              <a:lnSpc>
+                <a:spcPct val="90000"/>
+              </a:lnSpc>
+              <a:spcBef>
+                <a:spcPts val="500"/>
+              </a:spcBef>
+              <a:buFont typeface="Arial" panose="020B0604020202020204" pitchFamily="34" charset="0"/>
+              <a:buChar char="•"/>
+              <a:defRPr sz="1800" kern="1200">
+                <a:solidFill>
+                  <a:schemeClr val="tx1"/>
+                </a:solidFill>
+                <a:latin typeface="+mn-lt"/>
+                <a:ea typeface="+mn-ea"/>
+                <a:cs typeface="+mn-cs"/>
+              </a:defRPr>
+            </a:lvl8pPr>
+            <a:lvl9pPr marL="3886200" indent="-228600" algn="l" defTabSz="914400" rtl="0" eaLnBrk="1" latinLnBrk="0" hangingPunct="1">
+              <a:lnSpc>
+                <a:spcPct val="90000"/>
+              </a:lnSpc>
+              <a:spcBef>
+                <a:spcPts val="500"/>
+              </a:spcBef>
+              <a:buFont typeface="Arial" panose="020B0604020202020204" pitchFamily="34" charset="0"/>
+              <a:buChar char="•"/>
+              <a:defRPr sz="1800" kern="1200">
+                <a:solidFill>
+                  <a:schemeClr val="tx1"/>
+                </a:solidFill>
+                <a:latin typeface="+mn-lt"/>
+                <a:ea typeface="+mn-ea"/>
+                <a:cs typeface="+mn-cs"/>
+              </a:defRPr>
+            </a:lvl9pPr>
+          </a:lstStyle>
+          <a:p>
+            <a:pPr marL="0" indent="0" algn="ctr">
+              <a:buFont typeface="Arial" panose="020B0604020202020204" pitchFamily="34" charset="0"/>
+              <a:buNone/>
+            </a:pPr>
+            <a:endParaRPr lang="en-US" dirty="0">
+              <a:solidFill>
+                <a:schemeClr val="bg1"/>
+              </a:solidFill>
+            </a:endParaRPr>
+          </a:p>
+        </p:txBody>
+      </p:sp>
+    </p:spTree>
+    <p:extLst>
+      <p:ext uri="{BB962C8B-B14F-4D97-AF65-F5344CB8AC3E}">
+        <p14:creationId xmlns:p14="http://schemas.microsoft.com/office/powerpoint/2010/main" val="3039179845"/>
+      </p:ext>
+    </p:extLst>
+  </p:cSld>
+  <p:clrMapOvr>
+    <a:masterClrMapping/>
+  </p:clrMapOvr>
+</p:sld>
+</file>
+
+<file path=ppt/slides/slide5.xml><?xml version="1.0" encoding="utf-8"?>
+<p:sld xmlns:a="http://schemas.openxmlformats.org/drawingml/2006/main" xmlns:r="http://schemas.openxmlformats.org/officeDocument/2006/relationships" xmlns:p="http://schemas.openxmlformats.org/presentationml/2006/main">
+  <p:cSld>
+    <p:bg>
+      <p:bgPr>
+        <a:solidFill>
+          <a:srgbClr val="808070"/>
+        </a:solidFill>
+        <a:effectLst/>
+      </p:bgPr>
+    </p:bg>
+    <p:spTree>
+      <p:nvGrpSpPr>
+        <p:cNvPr id="1" name="">
+          <a:extLst>
+            <a:ext uri="{FF2B5EF4-FFF2-40B4-BE49-F238E27FC236}">
+              <a16:creationId xmlns:a16="http://schemas.microsoft.com/office/drawing/2014/main" id="{022CEE1E-3089-4478-2DFE-6A22F0BEE544}"/>
+            </a:ext>
+          </a:extLst>
+        </p:cNvPr>
+        <p:cNvGrpSpPr/>
+        <p:nvPr/>
+      </p:nvGrpSpPr>
+      <p:grpSpPr>
+        <a:xfrm>
+          <a:off x="0" y="0"/>
+          <a:ext cx="0" cy="0"/>
+          <a:chOff x="0" y="0"/>
+          <a:chExt cx="0" cy="0"/>
+        </a:xfrm>
+      </p:grpSpPr>
+      <p:sp>
+        <p:nvSpPr>
+          <p:cNvPr id="3" name="Content Placeholder 2">
+            <a:extLst>
+              <a:ext uri="{FF2B5EF4-FFF2-40B4-BE49-F238E27FC236}">
+                <a16:creationId xmlns:a16="http://schemas.microsoft.com/office/drawing/2014/main" id="{3D19C0BF-39DB-E5C2-B73F-D26C9CAA958F}"/>
+              </a:ext>
+            </a:extLst>
+          </p:cNvPr>
+          <p:cNvSpPr>
+            <a:spLocks noGrp="1"/>
+          </p:cNvSpPr>
+          <p:nvPr>
+            <p:ph idx="1"/>
+          </p:nvPr>
+        </p:nvSpPr>
+        <p:spPr>
+          <a:xfrm>
+            <a:off x="1726115" y="573433"/>
+            <a:ext cx="8739769" cy="5658787"/>
+          </a:xfrm>
+        </p:spPr>
+        <p:txBody>
+          <a:bodyPr anchor="ctr">
+            <a:noAutofit/>
+          </a:bodyPr>
+          <a:lstStyle/>
+          <a:p>
+            <a:pPr marL="0" indent="0" algn="ctr">
+              <a:lnSpc>
+                <a:spcPct val="200000"/>
+              </a:lnSpc>
+              <a:buNone/>
+            </a:pPr>
+            <a:r>
+              <a:rPr lang="en-US" dirty="0">
+                <a:solidFill>
+                  <a:schemeClr val="bg1"/>
+                </a:solidFill>
+              </a:rPr>
+              <a:t>While the AI is not always correct, it has been designed to be as helpful as possible, reflecting state-of-the-art research on human-AI collaboration.</a:t>
+            </a:r>
+          </a:p>
+        </p:txBody>
+      </p:sp>
+      <p:sp>
+        <p:nvSpPr>
+          <p:cNvPr id="9" name="Content Placeholder 2">
+            <a:extLst>
+              <a:ext uri="{FF2B5EF4-FFF2-40B4-BE49-F238E27FC236}">
+                <a16:creationId xmlns:a16="http://schemas.microsoft.com/office/drawing/2014/main" id="{3C0CFDA9-B9CA-0FEB-995E-9A8A3E8613A6}"/>
+              </a:ext>
+            </a:extLst>
+          </p:cNvPr>
+          <p:cNvSpPr txBox="1">
+            <a:spLocks/>
+          </p:cNvSpPr>
+          <p:nvPr/>
+        </p:nvSpPr>
+        <p:spPr>
+          <a:xfrm>
+            <a:off x="838200" y="2093206"/>
+            <a:ext cx="10515600" cy="4188146"/>
+          </a:xfrm>
+          <a:prstGeom prst="rect">
+            <a:avLst/>
+          </a:prstGeom>
+        </p:spPr>
+        <p:txBody>
+          <a:bodyPr vert="horz" lIns="91440" tIns="45720" rIns="91440" bIns="45720" rtlCol="0">
+            <a:normAutofit/>
+          </a:bodyPr>
+          <a:lstStyle>
+            <a:lvl1pPr marL="228600" indent="-228600" algn="l" defTabSz="914400" rtl="0" eaLnBrk="1" latinLnBrk="0" hangingPunct="1">
+              <a:lnSpc>
+                <a:spcPct val="90000"/>
+              </a:lnSpc>
+              <a:spcBef>
+                <a:spcPts val="1000"/>
+              </a:spcBef>
+              <a:buFont typeface="Arial" panose="020B0604020202020204" pitchFamily="34" charset="0"/>
+              <a:buChar char="•"/>
+              <a:defRPr sz="2800" kern="1200">
+                <a:solidFill>
+                  <a:schemeClr val="tx1"/>
+                </a:solidFill>
+                <a:latin typeface="+mn-lt"/>
+                <a:ea typeface="+mn-ea"/>
+                <a:cs typeface="+mn-cs"/>
+              </a:defRPr>
+            </a:lvl1pPr>
+            <a:lvl2pPr marL="685800" indent="-228600" algn="l" defTabSz="914400" rtl="0" eaLnBrk="1" latinLnBrk="0" hangingPunct="1">
+              <a:lnSpc>
+                <a:spcPct val="90000"/>
+              </a:lnSpc>
+              <a:spcBef>
+                <a:spcPts val="500"/>
+              </a:spcBef>
+              <a:buFont typeface="Arial" panose="020B0604020202020204" pitchFamily="34" charset="0"/>
+              <a:buChar char="•"/>
+              <a:defRPr sz="2400" kern="1200">
+                <a:solidFill>
+                  <a:schemeClr val="tx1"/>
+                </a:solidFill>
+                <a:latin typeface="+mn-lt"/>
+                <a:ea typeface="+mn-ea"/>
+                <a:cs typeface="+mn-cs"/>
+              </a:defRPr>
+            </a:lvl2pPr>
+            <a:lvl3pPr marL="1143000" indent="-228600" algn="l" defTabSz="914400" rtl="0" eaLnBrk="1" latinLnBrk="0" hangingPunct="1">
+              <a:lnSpc>
+                <a:spcPct val="90000"/>
+              </a:lnSpc>
+              <a:spcBef>
+                <a:spcPts val="500"/>
+              </a:spcBef>
+              <a:buFont typeface="Arial" panose="020B0604020202020204" pitchFamily="34" charset="0"/>
+              <a:buChar char="•"/>
+              <a:defRPr sz="2000" kern="1200">
+                <a:solidFill>
+                  <a:schemeClr val="tx1"/>
+                </a:solidFill>
+                <a:latin typeface="+mn-lt"/>
+                <a:ea typeface="+mn-ea"/>
+                <a:cs typeface="+mn-cs"/>
+              </a:defRPr>
+            </a:lvl3pPr>
+            <a:lvl4pPr marL="1600200" indent="-228600" algn="l" defTabSz="914400" rtl="0" eaLnBrk="1" latinLnBrk="0" hangingPunct="1">
+              <a:lnSpc>
+                <a:spcPct val="90000"/>
+              </a:lnSpc>
+              <a:spcBef>
+                <a:spcPts val="500"/>
+              </a:spcBef>
+              <a:buFont typeface="Arial" panose="020B0604020202020204" pitchFamily="34" charset="0"/>
+              <a:buChar char="•"/>
+              <a:defRPr sz="1800" kern="1200">
+                <a:solidFill>
+                  <a:schemeClr val="tx1"/>
+                </a:solidFill>
+                <a:latin typeface="+mn-lt"/>
+                <a:ea typeface="+mn-ea"/>
+                <a:cs typeface="+mn-cs"/>
+              </a:defRPr>
+            </a:lvl4pPr>
+            <a:lvl5pPr marL="2057400" indent="-228600" algn="l" defTabSz="914400" rtl="0" eaLnBrk="1" latinLnBrk="0" hangingPunct="1">
+              <a:lnSpc>
+                <a:spcPct val="90000"/>
+              </a:lnSpc>
+              <a:spcBef>
+                <a:spcPts val="500"/>
+              </a:spcBef>
+              <a:buFont typeface="Arial" panose="020B0604020202020204" pitchFamily="34" charset="0"/>
+              <a:buChar char="•"/>
+              <a:defRPr sz="1800" kern="1200">
+                <a:solidFill>
+                  <a:schemeClr val="tx1"/>
+                </a:solidFill>
+                <a:latin typeface="+mn-lt"/>
+                <a:ea typeface="+mn-ea"/>
+                <a:cs typeface="+mn-cs"/>
+              </a:defRPr>
+            </a:lvl5pPr>
+            <a:lvl6pPr marL="2514600" indent="-228600" algn="l" defTabSz="914400" rtl="0" eaLnBrk="1" latinLnBrk="0" hangingPunct="1">
+              <a:lnSpc>
+                <a:spcPct val="90000"/>
+              </a:lnSpc>
+              <a:spcBef>
+                <a:spcPts val="500"/>
+              </a:spcBef>
+              <a:buFont typeface="Arial" panose="020B0604020202020204" pitchFamily="34" charset="0"/>
+              <a:buChar char="•"/>
+              <a:defRPr sz="1800" kern="1200">
+                <a:solidFill>
+                  <a:schemeClr val="tx1"/>
+                </a:solidFill>
+                <a:latin typeface="+mn-lt"/>
+                <a:ea typeface="+mn-ea"/>
+                <a:cs typeface="+mn-cs"/>
+              </a:defRPr>
+            </a:lvl6pPr>
+            <a:lvl7pPr marL="2971800" indent="-228600" algn="l" defTabSz="914400" rtl="0" eaLnBrk="1" latinLnBrk="0" hangingPunct="1">
+              <a:lnSpc>
+                <a:spcPct val="90000"/>
+              </a:lnSpc>
+              <a:spcBef>
+                <a:spcPts val="500"/>
+              </a:spcBef>
+              <a:buFont typeface="Arial" panose="020B0604020202020204" pitchFamily="34" charset="0"/>
+              <a:buChar char="•"/>
+              <a:defRPr sz="1800" kern="1200">
+                <a:solidFill>
+                  <a:schemeClr val="tx1"/>
+                </a:solidFill>
+                <a:latin typeface="+mn-lt"/>
+                <a:ea typeface="+mn-ea"/>
+                <a:cs typeface="+mn-cs"/>
+              </a:defRPr>
+            </a:lvl7pPr>
+            <a:lvl8pPr marL="3429000" indent="-228600" algn="l" defTabSz="914400" rtl="0" eaLnBrk="1" latinLnBrk="0" hangingPunct="1">
+              <a:lnSpc>
+                <a:spcPct val="90000"/>
+              </a:lnSpc>
+              <a:spcBef>
+                <a:spcPts val="500"/>
+              </a:spcBef>
+              <a:buFont typeface="Arial" panose="020B0604020202020204" pitchFamily="34" charset="0"/>
+              <a:buChar char="•"/>
+              <a:defRPr sz="1800" kern="1200">
+                <a:solidFill>
+                  <a:schemeClr val="tx1"/>
+                </a:solidFill>
+                <a:latin typeface="+mn-lt"/>
+                <a:ea typeface="+mn-ea"/>
+                <a:cs typeface="+mn-cs"/>
+              </a:defRPr>
+            </a:lvl8pPr>
+            <a:lvl9pPr marL="3886200" indent="-228600" algn="l" defTabSz="914400" rtl="0" eaLnBrk="1" latinLnBrk="0" hangingPunct="1">
+              <a:lnSpc>
+                <a:spcPct val="90000"/>
+              </a:lnSpc>
+              <a:spcBef>
+                <a:spcPts val="500"/>
+              </a:spcBef>
+              <a:buFont typeface="Arial" panose="020B0604020202020204" pitchFamily="34" charset="0"/>
+              <a:buChar char="•"/>
+              <a:defRPr sz="1800" kern="1200">
+                <a:solidFill>
+                  <a:schemeClr val="tx1"/>
+                </a:solidFill>
+                <a:latin typeface="+mn-lt"/>
+                <a:ea typeface="+mn-ea"/>
+                <a:cs typeface="+mn-cs"/>
+              </a:defRPr>
+            </a:lvl9pPr>
+          </a:lstStyle>
+          <a:p>
+            <a:pPr marL="0" indent="0" algn="ctr">
+              <a:buFont typeface="Arial" panose="020B0604020202020204" pitchFamily="34" charset="0"/>
+              <a:buNone/>
+            </a:pPr>
+            <a:endParaRPr lang="en-US" dirty="0">
+              <a:solidFill>
+                <a:schemeClr val="bg1"/>
+              </a:solidFill>
+            </a:endParaRPr>
+          </a:p>
+        </p:txBody>
+      </p:sp>
+    </p:spTree>
+    <p:extLst>
+      <p:ext uri="{BB962C8B-B14F-4D97-AF65-F5344CB8AC3E}">
+        <p14:creationId xmlns:p14="http://schemas.microsoft.com/office/powerpoint/2010/main" val="3540898626"/>
+      </p:ext>
+    </p:extLst>
+  </p:cSld>
+  <p:clrMapOvr>
+    <a:masterClrMapping/>
+  </p:clrMapOvr>
+</p:sld>
+</file>
+
+<file path=ppt/slides/slide6.xml><?xml version="1.0" encoding="utf-8"?>
+<p:sld xmlns:a="http://schemas.openxmlformats.org/drawingml/2006/main" xmlns:r="http://schemas.openxmlformats.org/officeDocument/2006/relationships" xmlns:p="http://schemas.openxmlformats.org/presentationml/2006/main">
+  <p:cSld>
+    <p:bg>
+      <p:bgPr>
+        <a:solidFill>
+          <a:srgbClr val="808070"/>
+        </a:solidFill>
+        <a:effectLst/>
+      </p:bgPr>
+    </p:bg>
+    <p:spTree>
+      <p:nvGrpSpPr>
+        <p:cNvPr id="1" name="">
+          <a:extLst>
+            <a:ext uri="{FF2B5EF4-FFF2-40B4-BE49-F238E27FC236}">
+              <a16:creationId xmlns:a16="http://schemas.microsoft.com/office/drawing/2014/main" id="{ABB2C4CB-8B63-1EA8-DEBE-E02A511D7BF9}"/>
+            </a:ext>
+          </a:extLst>
+        </p:cNvPr>
+        <p:cNvGrpSpPr/>
+        <p:nvPr/>
+      </p:nvGrpSpPr>
+      <p:grpSpPr>
+        <a:xfrm>
+          <a:off x="0" y="0"/>
+          <a:ext cx="0" cy="0"/>
+          <a:chOff x="0" y="0"/>
+          <a:chExt cx="0" cy="0"/>
+        </a:xfrm>
+      </p:grpSpPr>
+      <p:sp>
+        <p:nvSpPr>
+          <p:cNvPr id="3" name="Content Placeholder 2">
+            <a:extLst>
+              <a:ext uri="{FF2B5EF4-FFF2-40B4-BE49-F238E27FC236}">
+                <a16:creationId xmlns:a16="http://schemas.microsoft.com/office/drawing/2014/main" id="{883BED18-3F57-2C98-EB22-1744DBE849DD}"/>
+              </a:ext>
+            </a:extLst>
+          </p:cNvPr>
+          <p:cNvSpPr>
+            <a:spLocks noGrp="1"/>
+          </p:cNvSpPr>
+          <p:nvPr>
+            <p:ph idx="1"/>
+          </p:nvPr>
+        </p:nvSpPr>
+        <p:spPr>
+          <a:xfrm>
+            <a:off x="838200" y="457201"/>
+            <a:ext cx="10515600" cy="1844110"/>
+          </a:xfrm>
+        </p:spPr>
+        <p:txBody>
+          <a:bodyPr>
+            <a:normAutofit/>
+          </a:bodyPr>
+          <a:lstStyle/>
+          <a:p>
+            <a:pPr marL="0" indent="0" algn="ctr">
+              <a:lnSpc>
+                <a:spcPct val="200000"/>
+              </a:lnSpc>
+              <a:buFont typeface="Arial" panose="020B0604020202020204" pitchFamily="34" charset="0"/>
+              <a:buNone/>
+            </a:pPr>
+            <a:r>
+              <a:rPr lang="en-US" dirty="0">
+                <a:solidFill>
+                  <a:schemeClr val="bg1"/>
+                </a:solidFill>
+              </a:rPr>
+              <a:t>This advice from this AI will be displayed as a single word:</a:t>
+            </a:r>
+            <a:endParaRPr lang="en-US" u="sng" dirty="0">
+              <a:solidFill>
+                <a:schemeClr val="bg1"/>
+              </a:solidFill>
+            </a:endParaRPr>
+          </a:p>
+        </p:txBody>
+      </p:sp>
+      <p:sp>
+        <p:nvSpPr>
+          <p:cNvPr id="4" name="TextBox 3">
+            <a:extLst>
+              <a:ext uri="{FF2B5EF4-FFF2-40B4-BE49-F238E27FC236}">
+                <a16:creationId xmlns:a16="http://schemas.microsoft.com/office/drawing/2014/main" id="{65E12E8C-1D88-9A12-C467-1DED8C2CBEF1}"/>
+              </a:ext>
+            </a:extLst>
+          </p:cNvPr>
+          <p:cNvSpPr txBox="1"/>
+          <p:nvPr/>
+        </p:nvSpPr>
+        <p:spPr>
+          <a:xfrm>
+            <a:off x="4402111" y="2840956"/>
+            <a:ext cx="3387777" cy="3170099"/>
+          </a:xfrm>
+          <a:prstGeom prst="rect">
+            <a:avLst/>
+          </a:prstGeom>
+          <a:noFill/>
+          <a:ln w="101600">
+            <a:solidFill>
+              <a:schemeClr val="bg1"/>
+            </a:solidFill>
+          </a:ln>
+        </p:spPr>
+        <p:txBody>
+          <a:bodyPr wrap="square" rtlCol="0">
+            <a:spAutoFit/>
+          </a:bodyPr>
+          <a:lstStyle/>
+          <a:p>
+            <a:pPr algn="ctr"/>
+            <a:r>
+              <a:rPr lang="en-US" sz="4000" b="1" dirty="0">
+                <a:solidFill>
+                  <a:schemeClr val="bg1"/>
+                </a:solidFill>
+              </a:rPr>
+              <a:t>Advice: </a:t>
+            </a:r>
+          </a:p>
+          <a:p>
+            <a:pPr algn="ctr"/>
+            <a:endParaRPr lang="en-US" sz="4000" b="1" dirty="0">
+              <a:solidFill>
+                <a:schemeClr val="bg1"/>
+              </a:solidFill>
+            </a:endParaRPr>
+          </a:p>
+          <a:p>
+            <a:pPr algn="ctr"/>
+            <a:r>
+              <a:rPr lang="en-US" sz="4000" b="1" dirty="0">
+                <a:solidFill>
+                  <a:schemeClr val="bg1"/>
+                </a:solidFill>
+              </a:rPr>
+              <a:t>LEFT</a:t>
+            </a:r>
+          </a:p>
+          <a:p>
+            <a:pPr algn="ctr"/>
+            <a:endParaRPr lang="en-US" sz="4000" b="1" dirty="0">
+              <a:solidFill>
+                <a:schemeClr val="bg1"/>
+              </a:solidFill>
+            </a:endParaRPr>
+          </a:p>
+          <a:p>
+            <a:pPr algn="ctr"/>
+            <a:endParaRPr lang="en-US" sz="4000" b="1" dirty="0">
+              <a:solidFill>
+                <a:schemeClr val="bg1"/>
+              </a:solidFill>
+            </a:endParaRPr>
+          </a:p>
+        </p:txBody>
+      </p:sp>
+    </p:spTree>
+    <p:extLst>
+      <p:ext uri="{BB962C8B-B14F-4D97-AF65-F5344CB8AC3E}">
+        <p14:creationId xmlns:p14="http://schemas.microsoft.com/office/powerpoint/2010/main" val="1089380817"/>
+      </p:ext>
+    </p:extLst>
+  </p:cSld>
+  <p:clrMapOvr>
+    <a:masterClrMapping/>
+  </p:clrMapOvr>
+</p:sld>
+</file>
+
+<file path=ppt/slides/slide7.xml><?xml version="1.0" encoding="utf-8"?>
+<p:sld xmlns:a="http://schemas.openxmlformats.org/drawingml/2006/main" xmlns:r="http://schemas.openxmlformats.org/officeDocument/2006/relationships" xmlns:p="http://schemas.openxmlformats.org/presentationml/2006/main">
+  <p:cSld>
+    <p:bg>
+      <p:bgPr>
+        <a:solidFill>
+          <a:srgbClr val="808070"/>
+        </a:solidFill>
+        <a:effectLst/>
+      </p:bgPr>
+    </p:bg>
+    <p:spTree>
+      <p:nvGrpSpPr>
+        <p:cNvPr id="1" name="">
+          <a:extLst>
+            <a:ext uri="{FF2B5EF4-FFF2-40B4-BE49-F238E27FC236}">
+              <a16:creationId xmlns:a16="http://schemas.microsoft.com/office/drawing/2014/main" id="{09853143-39EB-1776-C5EF-375B5BF4107F}"/>
+            </a:ext>
+          </a:extLst>
+        </p:cNvPr>
+        <p:cNvGrpSpPr/>
+        <p:nvPr/>
+      </p:nvGrpSpPr>
+      <p:grpSpPr>
+        <a:xfrm>
+          <a:off x="0" y="0"/>
+          <a:ext cx="0" cy="0"/>
+          <a:chOff x="0" y="0"/>
+          <a:chExt cx="0" cy="0"/>
+        </a:xfrm>
+      </p:grpSpPr>
+      <p:sp>
+        <p:nvSpPr>
+          <p:cNvPr id="3" name="Content Placeholder 2">
+            <a:extLst>
+              <a:ext uri="{FF2B5EF4-FFF2-40B4-BE49-F238E27FC236}">
+                <a16:creationId xmlns:a16="http://schemas.microsoft.com/office/drawing/2014/main" id="{D40CD515-F09F-9028-98A0-C3D356FEF08B}"/>
+              </a:ext>
+            </a:extLst>
+          </p:cNvPr>
+          <p:cNvSpPr>
+            <a:spLocks noGrp="1"/>
+          </p:cNvSpPr>
+          <p:nvPr>
+            <p:ph idx="1"/>
+          </p:nvPr>
+        </p:nvSpPr>
+        <p:spPr>
+          <a:xfrm>
+            <a:off x="838200" y="457201"/>
+            <a:ext cx="10515600" cy="1844110"/>
+          </a:xfrm>
+        </p:spPr>
+        <p:txBody>
+          <a:bodyPr>
+            <a:noAutofit/>
+          </a:bodyPr>
+          <a:lstStyle/>
+          <a:p>
+            <a:pPr marL="0" indent="0" algn="ctr">
+              <a:lnSpc>
+                <a:spcPct val="200000"/>
+              </a:lnSpc>
+              <a:buNone/>
+            </a:pPr>
+            <a:r>
+              <a:rPr lang="en-US" dirty="0">
+                <a:solidFill>
+                  <a:schemeClr val="bg1"/>
+                </a:solidFill>
+              </a:rPr>
+              <a:t>The words “LEFT” or “RIGHT” indicate the advice is to select the Left or Right box as having more dots.</a:t>
+            </a:r>
+          </a:p>
+        </p:txBody>
+      </p:sp>
+      <p:sp>
+        <p:nvSpPr>
+          <p:cNvPr id="4" name="TextBox 3">
+            <a:extLst>
+              <a:ext uri="{FF2B5EF4-FFF2-40B4-BE49-F238E27FC236}">
+                <a16:creationId xmlns:a16="http://schemas.microsoft.com/office/drawing/2014/main" id="{E148D547-45E8-97B4-7E04-A2E0E6100516}"/>
+              </a:ext>
+            </a:extLst>
+          </p:cNvPr>
+          <p:cNvSpPr txBox="1"/>
+          <p:nvPr/>
+        </p:nvSpPr>
+        <p:spPr>
+          <a:xfrm>
+            <a:off x="4402111" y="2691056"/>
+            <a:ext cx="3387777" cy="3170099"/>
+          </a:xfrm>
+          <a:prstGeom prst="rect">
+            <a:avLst/>
+          </a:prstGeom>
+          <a:noFill/>
+          <a:ln w="101600">
+            <a:solidFill>
+              <a:schemeClr val="bg1"/>
+            </a:solidFill>
+          </a:ln>
+        </p:spPr>
+        <p:txBody>
+          <a:bodyPr wrap="square" rtlCol="0">
+            <a:spAutoFit/>
+          </a:bodyPr>
+          <a:lstStyle/>
+          <a:p>
+            <a:pPr algn="ctr"/>
+            <a:r>
+              <a:rPr lang="en-US" sz="4000" b="1" dirty="0">
+                <a:solidFill>
+                  <a:schemeClr val="bg1"/>
+                </a:solidFill>
+              </a:rPr>
+              <a:t>Advice: </a:t>
+            </a:r>
+          </a:p>
+          <a:p>
+            <a:pPr algn="ctr"/>
+            <a:endParaRPr lang="en-US" sz="4000" b="1" dirty="0">
+              <a:solidFill>
+                <a:schemeClr val="bg1"/>
+              </a:solidFill>
+            </a:endParaRPr>
+          </a:p>
+          <a:p>
+            <a:pPr algn="ctr"/>
+            <a:r>
+              <a:rPr lang="en-US" sz="4000" b="1" dirty="0">
+                <a:solidFill>
+                  <a:schemeClr val="bg1"/>
+                </a:solidFill>
+              </a:rPr>
+              <a:t>RIGHT</a:t>
+            </a:r>
+          </a:p>
+          <a:p>
+            <a:pPr algn="ctr"/>
+            <a:endParaRPr lang="en-US" sz="4000" b="1" dirty="0">
+              <a:solidFill>
+                <a:schemeClr val="bg1"/>
+              </a:solidFill>
+            </a:endParaRPr>
+          </a:p>
+          <a:p>
+            <a:pPr algn="ctr"/>
+            <a:endParaRPr lang="en-US" sz="4000" b="1" dirty="0">
+              <a:solidFill>
+                <a:schemeClr val="bg1"/>
+              </a:solidFill>
+            </a:endParaRPr>
+          </a:p>
+        </p:txBody>
+      </p:sp>
+    </p:spTree>
+    <p:extLst>
+      <p:ext uri="{BB962C8B-B14F-4D97-AF65-F5344CB8AC3E}">
+        <p14:creationId xmlns:p14="http://schemas.microsoft.com/office/powerpoint/2010/main" val="1861600517"/>
+      </p:ext>
+    </p:extLst>
+  </p:cSld>
+  <p:clrMapOvr>
+    <a:masterClrMapping/>
+  </p:clrMapOvr>
+</p:sld>
+</file>
+
+<file path=ppt/slides/slide8.xml><?xml version="1.0" encoding="utf-8"?>
+<p:sld xmlns:a="http://schemas.openxmlformats.org/drawingml/2006/main" xmlns:r="http://schemas.openxmlformats.org/officeDocument/2006/relationships" xmlns:p="http://schemas.openxmlformats.org/presentationml/2006/main">
+  <p:cSld>
+    <p:bg>
+      <p:bgPr>
+        <a:solidFill>
+          <a:srgbClr val="808070"/>
+        </a:solidFill>
+        <a:effectLst/>
+      </p:bgPr>
+    </p:bg>
+    <p:spTree>
+      <p:nvGrpSpPr>
+        <p:cNvPr id="1" name="">
+          <a:extLst>
+            <a:ext uri="{FF2B5EF4-FFF2-40B4-BE49-F238E27FC236}">
+              <a16:creationId xmlns:a16="http://schemas.microsoft.com/office/drawing/2014/main" id="{AE5166C1-EFF0-A596-C01E-4C959116B2E3}"/>
+            </a:ext>
+          </a:extLst>
+        </p:cNvPr>
+        <p:cNvGrpSpPr/>
+        <p:nvPr/>
+      </p:nvGrpSpPr>
+      <p:grpSpPr>
+        <a:xfrm>
+          <a:off x="0" y="0"/>
+          <a:ext cx="0" cy="0"/>
+          <a:chOff x="0" y="0"/>
+          <a:chExt cx="0" cy="0"/>
+        </a:xfrm>
+      </p:grpSpPr>
+      <p:sp>
+        <p:nvSpPr>
+          <p:cNvPr id="3" name="Content Placeholder 2">
+            <a:extLst>
+              <a:ext uri="{FF2B5EF4-FFF2-40B4-BE49-F238E27FC236}">
+                <a16:creationId xmlns:a16="http://schemas.microsoft.com/office/drawing/2014/main" id="{698C2D30-E455-E802-FF33-4FAB1ABC085D}"/>
+              </a:ext>
+            </a:extLst>
+          </p:cNvPr>
+          <p:cNvSpPr>
+            <a:spLocks noGrp="1"/>
+          </p:cNvSpPr>
+          <p:nvPr>
+            <p:ph idx="1"/>
+          </p:nvPr>
+        </p:nvSpPr>
+        <p:spPr>
+          <a:xfrm>
+            <a:off x="838200" y="1131286"/>
+            <a:ext cx="10515600" cy="4533534"/>
+          </a:xfrm>
+        </p:spPr>
+        <p:txBody>
+          <a:bodyPr anchor="ctr">
+            <a:normAutofit/>
+          </a:bodyPr>
+          <a:lstStyle/>
+          <a:p>
+            <a:pPr marL="0" indent="0" algn="ctr">
+              <a:buNone/>
+            </a:pPr>
+            <a:r>
+              <a:rPr lang="en-US" dirty="0">
+                <a:solidFill>
+                  <a:schemeClr val="bg1"/>
+                </a:solidFill>
+              </a:rPr>
+              <a:t>Please make sure your </a:t>
+            </a:r>
+            <a:r>
+              <a:rPr lang="en-US" u="sng" dirty="0">
+                <a:solidFill>
+                  <a:schemeClr val="bg1"/>
+                </a:solidFill>
+              </a:rPr>
+              <a:t>first decision is accurate</a:t>
+            </a:r>
+            <a:r>
+              <a:rPr lang="en-US" dirty="0">
+                <a:solidFill>
+                  <a:schemeClr val="bg1"/>
+                </a:solidFill>
+              </a:rPr>
+              <a:t>.</a:t>
+            </a:r>
+          </a:p>
+          <a:p>
+            <a:pPr marL="0" indent="0" algn="ctr">
+              <a:buNone/>
+            </a:pPr>
+            <a:endParaRPr lang="en-US" dirty="0">
+              <a:solidFill>
+                <a:schemeClr val="bg1"/>
+              </a:solidFill>
+            </a:endParaRPr>
+          </a:p>
+          <a:p>
+            <a:pPr marL="0" indent="0" algn="ctr">
+              <a:buNone/>
+            </a:pPr>
+            <a:r>
+              <a:rPr lang="en-US" dirty="0">
+                <a:solidFill>
+                  <a:schemeClr val="bg1"/>
+                </a:solidFill>
+              </a:rPr>
+              <a:t>This is because you will not always have the option to receive advice. </a:t>
+            </a:r>
+          </a:p>
+          <a:p>
+            <a:pPr marL="0" indent="0" algn="ctr">
+              <a:buNone/>
+            </a:pPr>
+            <a:endParaRPr lang="en-US" dirty="0">
+              <a:solidFill>
+                <a:schemeClr val="bg1"/>
+              </a:solidFill>
+            </a:endParaRPr>
+          </a:p>
+          <a:p>
+            <a:pPr marL="0" indent="0" algn="ctr">
+              <a:buNone/>
+            </a:pPr>
+            <a:r>
+              <a:rPr lang="en-US" dirty="0">
+                <a:solidFill>
+                  <a:schemeClr val="bg1"/>
+                </a:solidFill>
+              </a:rPr>
+              <a:t>There are 3 possibilities: </a:t>
+            </a:r>
+          </a:p>
+        </p:txBody>
+      </p:sp>
+    </p:spTree>
+    <p:extLst>
+      <p:ext uri="{BB962C8B-B14F-4D97-AF65-F5344CB8AC3E}">
+        <p14:creationId xmlns:p14="http://schemas.microsoft.com/office/powerpoint/2010/main" val="2244019906"/>
+      </p:ext>
+    </p:extLst>
+  </p:cSld>
+  <p:clrMapOvr>
+    <a:masterClrMapping/>
+  </p:clrMapOvr>
+</p:sld>
+</file>
+
+<file path=ppt/slides/slide9.xml><?xml version="1.0" encoding="utf-8"?>
+<p:sld xmlns:a="http://schemas.openxmlformats.org/drawingml/2006/main" xmlns:r="http://schemas.openxmlformats.org/officeDocument/2006/relationships" xmlns:p="http://schemas.openxmlformats.org/presentationml/2006/main">
+  <p:cSld>
+    <p:bg>
+      <p:bgPr>
+        <a:solidFill>
+          <a:srgbClr val="808070"/>
+        </a:solidFill>
+        <a:effectLst/>
+      </p:bgPr>
+    </p:bg>
+    <p:spTree>
+      <p:nvGrpSpPr>
+        <p:cNvPr id="1" name="">
+          <a:extLst>
+            <a:ext uri="{FF2B5EF4-FFF2-40B4-BE49-F238E27FC236}">
+              <a16:creationId xmlns:a16="http://schemas.microsoft.com/office/drawing/2014/main" id="{122849B8-CD96-B468-532A-6D5F6855F99E}"/>
+            </a:ext>
+          </a:extLst>
+        </p:cNvPr>
+        <p:cNvGrpSpPr/>
+        <p:nvPr/>
+      </p:nvGrpSpPr>
+      <p:grpSpPr>
+        <a:xfrm>
+          <a:off x="0" y="0"/>
+          <a:ext cx="0" cy="0"/>
+          <a:chOff x="0" y="0"/>
+          <a:chExt cx="0" cy="0"/>
+        </a:xfrm>
+      </p:grpSpPr>
+      <p:pic>
+        <p:nvPicPr>
+          <p:cNvPr id="12" name="Picture 11">
+            <a:extLst>
+              <a:ext uri="{FF2B5EF4-FFF2-40B4-BE49-F238E27FC236}">
+                <a16:creationId xmlns:a16="http://schemas.microsoft.com/office/drawing/2014/main" id="{7F4564CF-BBB4-B4D7-59EF-99405429C63E}"/>
+              </a:ext>
+            </a:extLst>
+          </p:cNvPr>
+          <p:cNvPicPr>
+            <a:picLocks noChangeAspect="1"/>
+          </p:cNvPicPr>
+          <p:nvPr/>
+        </p:nvPicPr>
+        <p:blipFill>
+          <a:blip r:embed="rId2"/>
+          <a:srcRect l="3822" r="7095"/>
+          <a:stretch/>
+        </p:blipFill>
+        <p:spPr>
+          <a:xfrm>
+            <a:off x="314793" y="3612923"/>
+            <a:ext cx="3522688" cy="2110329"/>
+          </a:xfrm>
+          <a:prstGeom prst="rect">
+            <a:avLst/>
+          </a:prstGeom>
+          <a:ln w="101600">
+            <a:solidFill>
+              <a:schemeClr val="bg1"/>
+            </a:solidFill>
+          </a:ln>
+        </p:spPr>
+      </p:pic>
+      <p:pic>
+        <p:nvPicPr>
+          <p:cNvPr id="14" name="Picture 13">
+            <a:extLst>
+              <a:ext uri="{FF2B5EF4-FFF2-40B4-BE49-F238E27FC236}">
+                <a16:creationId xmlns:a16="http://schemas.microsoft.com/office/drawing/2014/main" id="{19E61380-F733-7C35-266E-DFA04D69CD3B}"/>
+              </a:ext>
+            </a:extLst>
+          </p:cNvPr>
+          <p:cNvPicPr>
+            <a:picLocks noChangeAspect="1"/>
+          </p:cNvPicPr>
+          <p:nvPr/>
+        </p:nvPicPr>
+        <p:blipFill>
+          <a:blip r:embed="rId3"/>
+          <a:stretch>
+            <a:fillRect/>
+          </a:stretch>
+        </p:blipFill>
+        <p:spPr>
+          <a:xfrm>
+            <a:off x="4316199" y="4055087"/>
+            <a:ext cx="3633585" cy="2110329"/>
+          </a:xfrm>
+          <a:prstGeom prst="rect">
+            <a:avLst/>
+          </a:prstGeom>
+          <a:ln w="101600">
+            <a:solidFill>
+              <a:schemeClr val="bg1"/>
+            </a:solidFill>
+          </a:ln>
+        </p:spPr>
+      </p:pic>
+      <p:pic>
+        <p:nvPicPr>
+          <p:cNvPr id="16" name="Picture 15">
+            <a:extLst>
+              <a:ext uri="{FF2B5EF4-FFF2-40B4-BE49-F238E27FC236}">
+                <a16:creationId xmlns:a16="http://schemas.microsoft.com/office/drawing/2014/main" id="{51464ECB-3F28-565E-FEF9-B5621C918263}"/>
+              </a:ext>
+            </a:extLst>
+          </p:cNvPr>
+          <p:cNvPicPr>
+            <a:picLocks noChangeAspect="1"/>
+          </p:cNvPicPr>
+          <p:nvPr/>
+        </p:nvPicPr>
+        <p:blipFill>
+          <a:blip r:embed="rId4"/>
+          <a:srcRect l="7246"/>
+          <a:stretch/>
+        </p:blipFill>
+        <p:spPr>
+          <a:xfrm>
+            <a:off x="8428502" y="4268735"/>
+            <a:ext cx="3633585" cy="2166457"/>
+          </a:xfrm>
+          <a:prstGeom prst="rect">
+            <a:avLst/>
+          </a:prstGeom>
+          <a:ln w="101600">
+            <a:solidFill>
+              <a:schemeClr val="bg1"/>
+            </a:solidFill>
+          </a:ln>
+        </p:spPr>
+      </p:pic>
+      <p:sp>
+        <p:nvSpPr>
+          <p:cNvPr id="2" name="Content Placeholder 2">
+            <a:extLst>
+              <a:ext uri="{FF2B5EF4-FFF2-40B4-BE49-F238E27FC236}">
+                <a16:creationId xmlns:a16="http://schemas.microsoft.com/office/drawing/2014/main" id="{D17CC427-C734-1CFF-E2CD-ED7538DE296A}"/>
+              </a:ext>
+            </a:extLst>
+          </p:cNvPr>
+          <p:cNvSpPr>
+            <a:spLocks noGrp="1"/>
+          </p:cNvSpPr>
+          <p:nvPr>
+            <p:ph idx="1"/>
+          </p:nvPr>
+        </p:nvSpPr>
+        <p:spPr>
+          <a:xfrm>
+            <a:off x="875191" y="515365"/>
+            <a:ext cx="10515600" cy="1335737"/>
+          </a:xfrm>
+        </p:spPr>
+        <p:txBody>
+          <a:bodyPr anchor="ctr">
+            <a:normAutofit/>
+          </a:bodyPr>
+          <a:lstStyle/>
+          <a:p>
+            <a:pPr marL="0" indent="0" algn="ctr">
+              <a:buNone/>
+            </a:pPr>
+            <a:r>
+              <a:rPr lang="en-US" dirty="0">
+                <a:solidFill>
+                  <a:schemeClr val="bg1"/>
+                </a:solidFill>
+              </a:rPr>
+              <a:t>After your initial decision, you will either:</a:t>
+            </a:r>
+          </a:p>
+          <a:p>
+            <a:pPr marL="514350" indent="-514350" algn="ctr">
+              <a:buAutoNum type="arabicParenR"/>
+            </a:pPr>
+            <a:endParaRPr lang="en-US" dirty="0">
+              <a:solidFill>
+                <a:schemeClr val="bg1"/>
+              </a:solidFill>
+            </a:endParaRPr>
+          </a:p>
+        </p:txBody>
+      </p:sp>
+      <p:sp>
+        <p:nvSpPr>
+          <p:cNvPr id="4" name="TextBox 3">
+            <a:extLst>
+              <a:ext uri="{FF2B5EF4-FFF2-40B4-BE49-F238E27FC236}">
+                <a16:creationId xmlns:a16="http://schemas.microsoft.com/office/drawing/2014/main" id="{C67C7364-3592-48AE-08AE-698CF8757660}"/>
+              </a:ext>
+            </a:extLst>
+          </p:cNvPr>
+          <p:cNvSpPr txBox="1"/>
+          <p:nvPr/>
+        </p:nvSpPr>
+        <p:spPr>
+          <a:xfrm>
+            <a:off x="3836695" y="1417918"/>
+            <a:ext cx="4518609" cy="1384995"/>
+          </a:xfrm>
+          <a:prstGeom prst="rect">
+            <a:avLst/>
+          </a:prstGeom>
+          <a:noFill/>
+        </p:spPr>
+        <p:txBody>
+          <a:bodyPr wrap="none" rtlCol="0">
+            <a:spAutoFit/>
+          </a:bodyPr>
+          <a:lstStyle/>
+          <a:p>
+            <a:pPr marL="514350" indent="-514350">
+              <a:buAutoNum type="arabicParenR"/>
+            </a:pPr>
+            <a:r>
+              <a:rPr lang="en-US" sz="2800" dirty="0">
+                <a:solidFill>
+                  <a:schemeClr val="bg1"/>
+                </a:solidFill>
+              </a:rPr>
+              <a:t>choose to receive advice</a:t>
+            </a:r>
+          </a:p>
+          <a:p>
+            <a:pPr marL="514350" indent="-514350">
+              <a:buAutoNum type="arabicParenR"/>
+            </a:pPr>
+            <a:r>
+              <a:rPr lang="en-US" sz="2800" dirty="0">
+                <a:solidFill>
+                  <a:schemeClr val="bg1"/>
+                </a:solidFill>
+              </a:rPr>
+              <a:t>Be shown advice</a:t>
+            </a:r>
+          </a:p>
+          <a:p>
+            <a:pPr marL="514350" indent="-514350">
+              <a:buAutoNum type="arabicParenR"/>
+            </a:pPr>
+            <a:r>
+              <a:rPr lang="en-US" sz="2800" dirty="0">
+                <a:solidFill>
+                  <a:schemeClr val="bg1"/>
+                </a:solidFill>
+              </a:rPr>
+              <a:t>Not receive advice</a:t>
+            </a:r>
+            <a:endParaRPr lang="en-US" sz="2800" dirty="0"/>
+          </a:p>
+        </p:txBody>
+      </p:sp>
+    </p:spTree>
+    <p:extLst>
+      <p:ext uri="{BB962C8B-B14F-4D97-AF65-F5344CB8AC3E}">
+        <p14:creationId xmlns:p14="http://schemas.microsoft.com/office/powerpoint/2010/main" val="3520619939"/>
       </p:ext>
     </p:extLst>
   </p:cSld>

</xml_diff>

<commit_message>
updated instructions, block and trial order
</commit_message>
<xml_diff>
--- a/instruction-images/expInstructions.pptx
+++ b/instruction-images/expInstructions.pptx
@@ -275,7 +275,7 @@
           <a:p>
             <a:fld id="{4B8E9ED7-1151-274C-BA24-50983D909DEF}" type="datetimeFigureOut">
               <a:rPr lang="en-US" smtClean="0"/>
-              <a:t>3/12/25</a:t>
+              <a:t>3/24/25</a:t>
             </a:fld>
             <a:endParaRPr lang="en-US"/>
           </a:p>
@@ -475,7 +475,7 @@
           <a:p>
             <a:fld id="{4B8E9ED7-1151-274C-BA24-50983D909DEF}" type="datetimeFigureOut">
               <a:rPr lang="en-US" smtClean="0"/>
-              <a:t>3/12/25</a:t>
+              <a:t>3/24/25</a:t>
             </a:fld>
             <a:endParaRPr lang="en-US"/>
           </a:p>
@@ -685,7 +685,7 @@
           <a:p>
             <a:fld id="{4B8E9ED7-1151-274C-BA24-50983D909DEF}" type="datetimeFigureOut">
               <a:rPr lang="en-US" smtClean="0"/>
-              <a:t>3/12/25</a:t>
+              <a:t>3/24/25</a:t>
             </a:fld>
             <a:endParaRPr lang="en-US"/>
           </a:p>
@@ -885,7 +885,7 @@
           <a:p>
             <a:fld id="{4B8E9ED7-1151-274C-BA24-50983D909DEF}" type="datetimeFigureOut">
               <a:rPr lang="en-US" smtClean="0"/>
-              <a:t>3/12/25</a:t>
+              <a:t>3/24/25</a:t>
             </a:fld>
             <a:endParaRPr lang="en-US"/>
           </a:p>
@@ -1161,7 +1161,7 @@
           <a:p>
             <a:fld id="{4B8E9ED7-1151-274C-BA24-50983D909DEF}" type="datetimeFigureOut">
               <a:rPr lang="en-US" smtClean="0"/>
-              <a:t>3/12/25</a:t>
+              <a:t>3/24/25</a:t>
             </a:fld>
             <a:endParaRPr lang="en-US"/>
           </a:p>
@@ -1429,7 +1429,7 @@
           <a:p>
             <a:fld id="{4B8E9ED7-1151-274C-BA24-50983D909DEF}" type="datetimeFigureOut">
               <a:rPr lang="en-US" smtClean="0"/>
-              <a:t>3/12/25</a:t>
+              <a:t>3/24/25</a:t>
             </a:fld>
             <a:endParaRPr lang="en-US"/>
           </a:p>
@@ -1844,7 +1844,7 @@
           <a:p>
             <a:fld id="{4B8E9ED7-1151-274C-BA24-50983D909DEF}" type="datetimeFigureOut">
               <a:rPr lang="en-US" smtClean="0"/>
-              <a:t>3/12/25</a:t>
+              <a:t>3/24/25</a:t>
             </a:fld>
             <a:endParaRPr lang="en-US"/>
           </a:p>
@@ -1986,7 +1986,7 @@
           <a:p>
             <a:fld id="{4B8E9ED7-1151-274C-BA24-50983D909DEF}" type="datetimeFigureOut">
               <a:rPr lang="en-US" smtClean="0"/>
-              <a:t>3/12/25</a:t>
+              <a:t>3/24/25</a:t>
             </a:fld>
             <a:endParaRPr lang="en-US"/>
           </a:p>
@@ -2099,7 +2099,7 @@
           <a:p>
             <a:fld id="{4B8E9ED7-1151-274C-BA24-50983D909DEF}" type="datetimeFigureOut">
               <a:rPr lang="en-US" smtClean="0"/>
-              <a:t>3/12/25</a:t>
+              <a:t>3/24/25</a:t>
             </a:fld>
             <a:endParaRPr lang="en-US"/>
           </a:p>
@@ -2412,7 +2412,7 @@
           <a:p>
             <a:fld id="{4B8E9ED7-1151-274C-BA24-50983D909DEF}" type="datetimeFigureOut">
               <a:rPr lang="en-US" smtClean="0"/>
-              <a:t>3/12/25</a:t>
+              <a:t>3/24/25</a:t>
             </a:fld>
             <a:endParaRPr lang="en-US"/>
           </a:p>
@@ -2701,7 +2701,7 @@
           <a:p>
             <a:fld id="{4B8E9ED7-1151-274C-BA24-50983D909DEF}" type="datetimeFigureOut">
               <a:rPr lang="en-US" smtClean="0"/>
-              <a:t>3/12/25</a:t>
+              <a:t>3/24/25</a:t>
             </a:fld>
             <a:endParaRPr lang="en-US"/>
           </a:p>
@@ -2944,7 +2944,7 @@
           <a:p>
             <a:fld id="{4B8E9ED7-1151-274C-BA24-50983D909DEF}" type="datetimeFigureOut">
               <a:rPr lang="en-US" smtClean="0"/>
-              <a:t>3/12/25</a:t>
+              <a:t>3/24/25</a:t>
             </a:fld>
             <a:endParaRPr lang="en-US"/>
           </a:p>
@@ -5139,7 +5139,7 @@
                   <a:schemeClr val="bg1"/>
                 </a:solidFill>
               </a:rPr>
-              <a:t>You will now receive advice</a:t>
+              <a:t>Advice available</a:t>
             </a:r>
           </a:p>
         </p:txBody>
@@ -5286,7 +5286,7 @@
                   <a:schemeClr val="bg1"/>
                 </a:solidFill>
               </a:rPr>
-              <a:t>You will not receive advice</a:t>
+              <a:t>No advice available</a:t>
             </a:r>
           </a:p>
         </p:txBody>
@@ -7159,7 +7159,7 @@
             </a:extLst>
           </p:cNvPr>
           <p:cNvPicPr>
-            <a:picLocks noChangeAspect="1"/>
+            <a:picLocks/>
           </p:cNvPicPr>
           <p:nvPr/>
         </p:nvPicPr>
@@ -7170,8 +7170,164 @@
         </p:blipFill>
         <p:spPr>
           <a:xfrm>
-            <a:off x="314793" y="3612923"/>
-            <a:ext cx="3522688" cy="2110329"/>
+            <a:off x="314792" y="3587157"/>
+            <a:ext cx="3661200" cy="2160000"/>
+          </a:xfrm>
+          <a:prstGeom prst="rect">
+            <a:avLst/>
+          </a:prstGeom>
+          <a:ln w="101600">
+            <a:solidFill>
+              <a:schemeClr val="bg1"/>
+            </a:solidFill>
+          </a:ln>
+        </p:spPr>
+      </p:pic>
+      <p:sp>
+        <p:nvSpPr>
+          <p:cNvPr id="2" name="Content Placeholder 2">
+            <a:extLst>
+              <a:ext uri="{FF2B5EF4-FFF2-40B4-BE49-F238E27FC236}">
+                <a16:creationId xmlns:a16="http://schemas.microsoft.com/office/drawing/2014/main" id="{D17CC427-C734-1CFF-E2CD-ED7538DE296A}"/>
+              </a:ext>
+            </a:extLst>
+          </p:cNvPr>
+          <p:cNvSpPr>
+            <a:spLocks noGrp="1"/>
+          </p:cNvSpPr>
+          <p:nvPr>
+            <p:ph idx="1"/>
+          </p:nvPr>
+        </p:nvSpPr>
+        <p:spPr>
+          <a:xfrm>
+            <a:off x="875191" y="515365"/>
+            <a:ext cx="10515600" cy="1335737"/>
+          </a:xfrm>
+        </p:spPr>
+        <p:txBody>
+          <a:bodyPr anchor="ctr">
+            <a:normAutofit/>
+          </a:bodyPr>
+          <a:lstStyle/>
+          <a:p>
+            <a:pPr marL="0" indent="0" algn="ctr">
+              <a:buNone/>
+            </a:pPr>
+            <a:r>
+              <a:rPr lang="en-US" dirty="0">
+                <a:solidFill>
+                  <a:schemeClr val="bg1"/>
+                </a:solidFill>
+              </a:rPr>
+              <a:t>After your initial decision, you will either:</a:t>
+            </a:r>
+          </a:p>
+          <a:p>
+            <a:pPr marL="514350" indent="-514350" algn="ctr">
+              <a:buAutoNum type="arabicParenR"/>
+            </a:pPr>
+            <a:endParaRPr lang="en-US" dirty="0">
+              <a:solidFill>
+                <a:schemeClr val="bg1"/>
+              </a:solidFill>
+            </a:endParaRPr>
+          </a:p>
+        </p:txBody>
+      </p:sp>
+      <p:sp>
+        <p:nvSpPr>
+          <p:cNvPr id="4" name="TextBox 3">
+            <a:extLst>
+              <a:ext uri="{FF2B5EF4-FFF2-40B4-BE49-F238E27FC236}">
+                <a16:creationId xmlns:a16="http://schemas.microsoft.com/office/drawing/2014/main" id="{C67C7364-3592-48AE-08AE-698CF8757660}"/>
+              </a:ext>
+            </a:extLst>
+          </p:cNvPr>
+          <p:cNvSpPr txBox="1"/>
+          <p:nvPr/>
+        </p:nvSpPr>
+        <p:spPr>
+          <a:xfrm>
+            <a:off x="3836695" y="1417918"/>
+            <a:ext cx="4518609" cy="1384995"/>
+          </a:xfrm>
+          <a:prstGeom prst="rect">
+            <a:avLst/>
+          </a:prstGeom>
+          <a:noFill/>
+        </p:spPr>
+        <p:txBody>
+          <a:bodyPr wrap="none" rtlCol="0">
+            <a:spAutoFit/>
+          </a:bodyPr>
+          <a:lstStyle/>
+          <a:p>
+            <a:pPr marL="514350" indent="-514350">
+              <a:buAutoNum type="arabicParenR"/>
+            </a:pPr>
+            <a:r>
+              <a:rPr lang="en-US" sz="2800" dirty="0">
+                <a:solidFill>
+                  <a:schemeClr val="bg1"/>
+                </a:solidFill>
+              </a:rPr>
+              <a:t>choose to receive advice</a:t>
+            </a:r>
+          </a:p>
+          <a:p>
+            <a:pPr marL="514350" indent="-514350">
+              <a:buAutoNum type="arabicParenR"/>
+            </a:pPr>
+            <a:r>
+              <a:rPr lang="en-US" sz="2800" dirty="0">
+                <a:solidFill>
+                  <a:schemeClr val="bg1"/>
+                </a:solidFill>
+              </a:rPr>
+              <a:t>Be shown advice</a:t>
+            </a:r>
+          </a:p>
+          <a:p>
+            <a:pPr marL="514350" indent="-514350">
+              <a:buAutoNum type="arabicParenR"/>
+            </a:pPr>
+            <a:r>
+              <a:rPr lang="en-US" sz="2800" dirty="0">
+                <a:solidFill>
+                  <a:schemeClr val="bg1"/>
+                </a:solidFill>
+              </a:rPr>
+              <a:t>Not receive advice</a:t>
+            </a:r>
+            <a:endParaRPr lang="en-US" sz="2800" dirty="0"/>
+          </a:p>
+        </p:txBody>
+      </p:sp>
+      <p:pic>
+        <p:nvPicPr>
+          <p:cNvPr id="5" name="Picture 4" descr="A grey background with white text&#10;&#10;AI-generated content may be incorrect.">
+            <a:extLst>
+              <a:ext uri="{FF2B5EF4-FFF2-40B4-BE49-F238E27FC236}">
+                <a16:creationId xmlns:a16="http://schemas.microsoft.com/office/drawing/2014/main" id="{A52EB63F-2290-25A1-906E-2073DAD09375}"/>
+              </a:ext>
+            </a:extLst>
+          </p:cNvPr>
+          <p:cNvPicPr>
+            <a:picLocks/>
+          </p:cNvPicPr>
+          <p:nvPr/>
+        </p:nvPicPr>
+        <p:blipFill>
+          <a:blip r:embed="rId3"/>
+          <a:stretch>
+            <a:fillRect/>
+          </a:stretch>
+        </p:blipFill>
+        <p:spPr>
+          <a:xfrm>
+            <a:off x="4242613" y="3587157"/>
+            <a:ext cx="3661200" cy="2160000"/>
           </a:xfrm>
           <a:prstGeom prst="rect">
             <a:avLst/>
@@ -7185,10 +7341,10 @@
       </p:pic>
       <p:pic>
         <p:nvPicPr>
-          <p:cNvPr id="14" name="Picture 13">
-            <a:extLst>
-              <a:ext uri="{FF2B5EF4-FFF2-40B4-BE49-F238E27FC236}">
-                <a16:creationId xmlns:a16="http://schemas.microsoft.com/office/drawing/2014/main" id="{19E61380-F733-7C35-266E-DFA04D69CD3B}"/>
+          <p:cNvPr id="7" name="Picture 6" descr="A grey background with white text&#10;&#10;AI-generated content may be incorrect.">
+            <a:extLst>
+              <a:ext uri="{FF2B5EF4-FFF2-40B4-BE49-F238E27FC236}">
+                <a16:creationId xmlns:a16="http://schemas.microsoft.com/office/drawing/2014/main" id="{B6BDE9DA-FFFB-661C-2560-47168CEDB8D1}"/>
               </a:ext>
             </a:extLst>
           </p:cNvPr>
@@ -7198,15 +7354,15 @@
           <p:nvPr/>
         </p:nvPicPr>
         <p:blipFill>
-          <a:blip r:embed="rId3"/>
+          <a:blip r:embed="rId4"/>
           <a:stretch>
             <a:fillRect/>
           </a:stretch>
         </p:blipFill>
         <p:spPr>
           <a:xfrm>
-            <a:off x="4316199" y="4055087"/>
-            <a:ext cx="3633585" cy="2110329"/>
+            <a:off x="8170434" y="3587157"/>
+            <a:ext cx="3661539" cy="2160000"/>
           </a:xfrm>
           <a:prstGeom prst="rect">
             <a:avLst/>
@@ -7218,161 +7374,6 @@
           </a:ln>
         </p:spPr>
       </p:pic>
-      <p:pic>
-        <p:nvPicPr>
-          <p:cNvPr id="16" name="Picture 15">
-            <a:extLst>
-              <a:ext uri="{FF2B5EF4-FFF2-40B4-BE49-F238E27FC236}">
-                <a16:creationId xmlns:a16="http://schemas.microsoft.com/office/drawing/2014/main" id="{51464ECB-3F28-565E-FEF9-B5621C918263}"/>
-              </a:ext>
-            </a:extLst>
-          </p:cNvPr>
-          <p:cNvPicPr>
-            <a:picLocks noChangeAspect="1"/>
-          </p:cNvPicPr>
-          <p:nvPr/>
-        </p:nvPicPr>
-        <p:blipFill>
-          <a:blip r:embed="rId4"/>
-          <a:srcRect l="7246"/>
-          <a:stretch/>
-        </p:blipFill>
-        <p:spPr>
-          <a:xfrm>
-            <a:off x="8428502" y="4268735"/>
-            <a:ext cx="3633585" cy="2166457"/>
-          </a:xfrm>
-          <a:prstGeom prst="rect">
-            <a:avLst/>
-          </a:prstGeom>
-          <a:ln w="101600">
-            <a:solidFill>
-              <a:schemeClr val="bg1"/>
-            </a:solidFill>
-          </a:ln>
-        </p:spPr>
-      </p:pic>
-      <p:sp>
-        <p:nvSpPr>
-          <p:cNvPr id="2" name="Content Placeholder 2">
-            <a:extLst>
-              <a:ext uri="{FF2B5EF4-FFF2-40B4-BE49-F238E27FC236}">
-                <a16:creationId xmlns:a16="http://schemas.microsoft.com/office/drawing/2014/main" id="{D17CC427-C734-1CFF-E2CD-ED7538DE296A}"/>
-              </a:ext>
-            </a:extLst>
-          </p:cNvPr>
-          <p:cNvSpPr>
-            <a:spLocks noGrp="1"/>
-          </p:cNvSpPr>
-          <p:nvPr>
-            <p:ph idx="1"/>
-          </p:nvPr>
-        </p:nvSpPr>
-        <p:spPr>
-          <a:xfrm>
-            <a:off x="875191" y="515365"/>
-            <a:ext cx="10515600" cy="1335737"/>
-          </a:xfrm>
-        </p:spPr>
-        <p:txBody>
-          <a:bodyPr anchor="ctr">
-            <a:normAutofit/>
-          </a:bodyPr>
-          <a:lstStyle/>
-          <a:p>
-            <a:pPr marL="0" indent="0" algn="ctr">
-              <a:buNone/>
-            </a:pPr>
-            <a:r>
-              <a:rPr lang="en-US" dirty="0">
-                <a:solidFill>
-                  <a:schemeClr val="bg1"/>
-                </a:solidFill>
-              </a:rPr>
-              <a:t>After your initial decision, you will either:</a:t>
-            </a:r>
-          </a:p>
-          <a:p>
-            <a:pPr marL="514350" indent="-514350" algn="ctr">
-              <a:buAutoNum type="arabicParenR"/>
-            </a:pPr>
-            <a:endParaRPr lang="en-US" dirty="0">
-              <a:solidFill>
-                <a:schemeClr val="bg1"/>
-              </a:solidFill>
-            </a:endParaRPr>
-          </a:p>
-        </p:txBody>
-      </p:sp>
-      <p:sp>
-        <p:nvSpPr>
-          <p:cNvPr id="4" name="TextBox 3">
-            <a:extLst>
-              <a:ext uri="{FF2B5EF4-FFF2-40B4-BE49-F238E27FC236}">
-                <a16:creationId xmlns:a16="http://schemas.microsoft.com/office/drawing/2014/main" id="{C67C7364-3592-48AE-08AE-698CF8757660}"/>
-              </a:ext>
-            </a:extLst>
-          </p:cNvPr>
-          <p:cNvSpPr txBox="1"/>
-          <p:nvPr/>
-        </p:nvSpPr>
-        <p:spPr>
-          <a:xfrm>
-            <a:off x="3836695" y="1417918"/>
-            <a:ext cx="4518609" cy="1384995"/>
-          </a:xfrm>
-          <a:prstGeom prst="rect">
-            <a:avLst/>
-          </a:prstGeom>
-          <a:noFill/>
-        </p:spPr>
-        <p:txBody>
-          <a:bodyPr wrap="none" rtlCol="0">
-            <a:spAutoFit/>
-          </a:bodyPr>
-          <a:lstStyle/>
-          <a:p>
-            <a:pPr marL="514350" indent="-514350">
-              <a:buAutoNum type="arabicParenR"/>
-            </a:pPr>
-            <a:r>
-              <a:rPr lang="en-US" sz="2800" dirty="0">
-                <a:solidFill>
-                  <a:schemeClr val="bg1"/>
-                </a:solidFill>
-              </a:rPr>
-              <a:t>choose to receive advice</a:t>
-            </a:r>
-          </a:p>
-          <a:p>
-            <a:pPr marL="514350" indent="-514350">
-              <a:buAutoNum type="arabicParenR"/>
-            </a:pPr>
-            <a:r>
-              <a:rPr lang="en-US" sz="2800" dirty="0">
-                <a:solidFill>
-                  <a:schemeClr val="bg1"/>
-                </a:solidFill>
-              </a:rPr>
-              <a:t>Be shown advice</a:t>
-            </a:r>
-          </a:p>
-          <a:p>
-            <a:pPr marL="514350" indent="-514350">
-              <a:buAutoNum type="arabicParenR"/>
-            </a:pPr>
-            <a:r>
-              <a:rPr lang="en-US" sz="2800" dirty="0">
-                <a:solidFill>
-                  <a:schemeClr val="bg1"/>
-                </a:solidFill>
-              </a:rPr>
-              <a:t>Not receive advice</a:t>
-            </a:r>
-            <a:endParaRPr lang="en-US" sz="2800" dirty="0"/>
-          </a:p>
-        </p:txBody>
-      </p:sp>
     </p:spTree>
     <p:extLst>
       <p:ext uri="{BB962C8B-B14F-4D97-AF65-F5344CB8AC3E}">

</xml_diff>

<commit_message>
large updates for SONA push
</commit_message>
<xml_diff>
--- a/instruction-images/expInstructions.pptx
+++ b/instruction-images/expInstructions.pptx
@@ -15,11 +15,12 @@
     <p:sldId id="259" r:id="rId9"/>
     <p:sldId id="279" r:id="rId10"/>
     <p:sldId id="273" r:id="rId11"/>
-    <p:sldId id="280" r:id="rId12"/>
-    <p:sldId id="274" r:id="rId13"/>
-    <p:sldId id="270" r:id="rId14"/>
-    <p:sldId id="271" r:id="rId15"/>
-    <p:sldId id="272" r:id="rId16"/>
+    <p:sldId id="281" r:id="rId12"/>
+    <p:sldId id="280" r:id="rId13"/>
+    <p:sldId id="274" r:id="rId14"/>
+    <p:sldId id="270" r:id="rId15"/>
+    <p:sldId id="271" r:id="rId16"/>
+    <p:sldId id="272" r:id="rId17"/>
   </p:sldIdLst>
   <p:sldSz cx="12192000" cy="6858000"/>
   <p:notesSz cx="6858000" cy="9144000"/>
@@ -275,7 +276,7 @@
           <a:p>
             <a:fld id="{4B8E9ED7-1151-274C-BA24-50983D909DEF}" type="datetimeFigureOut">
               <a:rPr lang="en-US" smtClean="0"/>
-              <a:t>3/24/25</a:t>
+              <a:t>4/2/25</a:t>
             </a:fld>
             <a:endParaRPr lang="en-US"/>
           </a:p>
@@ -475,7 +476,7 @@
           <a:p>
             <a:fld id="{4B8E9ED7-1151-274C-BA24-50983D909DEF}" type="datetimeFigureOut">
               <a:rPr lang="en-US" smtClean="0"/>
-              <a:t>3/24/25</a:t>
+              <a:t>4/2/25</a:t>
             </a:fld>
             <a:endParaRPr lang="en-US"/>
           </a:p>
@@ -685,7 +686,7 @@
           <a:p>
             <a:fld id="{4B8E9ED7-1151-274C-BA24-50983D909DEF}" type="datetimeFigureOut">
               <a:rPr lang="en-US" smtClean="0"/>
-              <a:t>3/24/25</a:t>
+              <a:t>4/2/25</a:t>
             </a:fld>
             <a:endParaRPr lang="en-US"/>
           </a:p>
@@ -885,7 +886,7 @@
           <a:p>
             <a:fld id="{4B8E9ED7-1151-274C-BA24-50983D909DEF}" type="datetimeFigureOut">
               <a:rPr lang="en-US" smtClean="0"/>
-              <a:t>3/24/25</a:t>
+              <a:t>4/2/25</a:t>
             </a:fld>
             <a:endParaRPr lang="en-US"/>
           </a:p>
@@ -1161,7 +1162,7 @@
           <a:p>
             <a:fld id="{4B8E9ED7-1151-274C-BA24-50983D909DEF}" type="datetimeFigureOut">
               <a:rPr lang="en-US" smtClean="0"/>
-              <a:t>3/24/25</a:t>
+              <a:t>4/2/25</a:t>
             </a:fld>
             <a:endParaRPr lang="en-US"/>
           </a:p>
@@ -1429,7 +1430,7 @@
           <a:p>
             <a:fld id="{4B8E9ED7-1151-274C-BA24-50983D909DEF}" type="datetimeFigureOut">
               <a:rPr lang="en-US" smtClean="0"/>
-              <a:t>3/24/25</a:t>
+              <a:t>4/2/25</a:t>
             </a:fld>
             <a:endParaRPr lang="en-US"/>
           </a:p>
@@ -1844,7 +1845,7 @@
           <a:p>
             <a:fld id="{4B8E9ED7-1151-274C-BA24-50983D909DEF}" type="datetimeFigureOut">
               <a:rPr lang="en-US" smtClean="0"/>
-              <a:t>3/24/25</a:t>
+              <a:t>4/2/25</a:t>
             </a:fld>
             <a:endParaRPr lang="en-US"/>
           </a:p>
@@ -1986,7 +1987,7 @@
           <a:p>
             <a:fld id="{4B8E9ED7-1151-274C-BA24-50983D909DEF}" type="datetimeFigureOut">
               <a:rPr lang="en-US" smtClean="0"/>
-              <a:t>3/24/25</a:t>
+              <a:t>4/2/25</a:t>
             </a:fld>
             <a:endParaRPr lang="en-US"/>
           </a:p>
@@ -2099,7 +2100,7 @@
           <a:p>
             <a:fld id="{4B8E9ED7-1151-274C-BA24-50983D909DEF}" type="datetimeFigureOut">
               <a:rPr lang="en-US" smtClean="0"/>
-              <a:t>3/24/25</a:t>
+              <a:t>4/2/25</a:t>
             </a:fld>
             <a:endParaRPr lang="en-US"/>
           </a:p>
@@ -2412,7 +2413,7 @@
           <a:p>
             <a:fld id="{4B8E9ED7-1151-274C-BA24-50983D909DEF}" type="datetimeFigureOut">
               <a:rPr lang="en-US" smtClean="0"/>
-              <a:t>3/24/25</a:t>
+              <a:t>4/2/25</a:t>
             </a:fld>
             <a:endParaRPr lang="en-US"/>
           </a:p>
@@ -2701,7 +2702,7 @@
           <a:p>
             <a:fld id="{4B8E9ED7-1151-274C-BA24-50983D909DEF}" type="datetimeFigureOut">
               <a:rPr lang="en-US" smtClean="0"/>
-              <a:t>3/24/25</a:t>
+              <a:t>4/2/25</a:t>
             </a:fld>
             <a:endParaRPr lang="en-US"/>
           </a:p>
@@ -2944,7 +2945,7 @@
           <a:p>
             <a:fld id="{4B8E9ED7-1151-274C-BA24-50983D909DEF}" type="datetimeFigureOut">
               <a:rPr lang="en-US" smtClean="0"/>
-              <a:t>3/24/25</a:t>
+              <a:t>4/2/25</a:t>
             </a:fld>
             <a:endParaRPr lang="en-US"/>
           </a:p>
@@ -3704,10 +3705,10 @@
       </p:sp>
       <p:pic>
         <p:nvPicPr>
-          <p:cNvPr id="2" name="Picture 1" descr="A screenshot of a game&#10;&#10;AI-generated content may be incorrect.">
-            <a:extLst>
-              <a:ext uri="{FF2B5EF4-FFF2-40B4-BE49-F238E27FC236}">
-                <a16:creationId xmlns:a16="http://schemas.microsoft.com/office/drawing/2014/main" id="{9BB19AB2-ADB3-15D5-14F9-FC9B407C52B1}"/>
+          <p:cNvPr id="4" name="Picture 3" descr="A grey rectangular sign with white text&#10;&#10;AI-generated content may be incorrect.">
+            <a:extLst>
+              <a:ext uri="{FF2B5EF4-FFF2-40B4-BE49-F238E27FC236}">
+                <a16:creationId xmlns:a16="http://schemas.microsoft.com/office/drawing/2014/main" id="{634E4713-C320-733D-A031-E3070B1DF31E}"/>
               </a:ext>
             </a:extLst>
           </p:cNvPr>
@@ -3718,18 +3719,18 @@
         </p:nvPicPr>
         <p:blipFill>
           <a:blip r:embed="rId2"/>
-          <a:srcRect b="29679"/>
+          <a:srcRect t="25956"/>
           <a:stretch/>
         </p:blipFill>
         <p:spPr>
           <a:xfrm>
-            <a:off x="2762250" y="4371097"/>
-            <a:ext cx="6667500" cy="2116608"/>
+            <a:off x="3272107" y="4462084"/>
+            <a:ext cx="5647785" cy="1938716"/>
           </a:xfrm>
           <a:prstGeom prst="rect">
             <a:avLst/>
           </a:prstGeom>
-          <a:ln w="101600">
+          <a:ln>
             <a:solidFill>
               <a:schemeClr val="bg1"/>
             </a:solidFill>
@@ -3817,17 +3818,17 @@
                   <a:schemeClr val="bg1"/>
                 </a:solidFill>
               </a:rPr>
-              <a:t>After these options, you will be asked to confirm your final decision:</a:t>
+              <a:t>After these options, you will be asked to confirm your final decision by clicking once more:</a:t>
             </a:r>
           </a:p>
         </p:txBody>
       </p:sp>
       <p:pic>
         <p:nvPicPr>
-          <p:cNvPr id="4" name="Picture 3" descr="A screenshot of a game&#10;&#10;AI-generated content may be incorrect.">
-            <a:extLst>
-              <a:ext uri="{FF2B5EF4-FFF2-40B4-BE49-F238E27FC236}">
-                <a16:creationId xmlns:a16="http://schemas.microsoft.com/office/drawing/2014/main" id="{23FAB662-E1A2-50D8-4462-A37D273E232D}"/>
+          <p:cNvPr id="7" name="Picture 6" descr="A grey rectangular sign with white text&#10;&#10;AI-generated content may be incorrect.">
+            <a:extLst>
+              <a:ext uri="{FF2B5EF4-FFF2-40B4-BE49-F238E27FC236}">
+                <a16:creationId xmlns:a16="http://schemas.microsoft.com/office/drawing/2014/main" id="{C30D13E9-ACBE-A63D-637B-4FE4BDEA1195}"/>
               </a:ext>
             </a:extLst>
           </p:cNvPr>
@@ -3838,110 +3839,285 @@
         </p:nvPicPr>
         <p:blipFill>
           <a:blip r:embed="rId2"/>
-          <a:srcRect b="29679"/>
-          <a:stretch/>
+          <a:stretch>
+            <a:fillRect/>
+          </a:stretch>
         </p:blipFill>
         <p:spPr>
           <a:xfrm>
-            <a:off x="2762250" y="3610106"/>
-            <a:ext cx="6667500" cy="2116608"/>
+            <a:off x="2800639" y="2412311"/>
+            <a:ext cx="6314518" cy="2699515"/>
           </a:xfrm>
           <a:prstGeom prst="rect">
             <a:avLst/>
           </a:prstGeom>
-        </p:spPr>
-      </p:pic>
-      <p:sp>
-        <p:nvSpPr>
-          <p:cNvPr id="5" name="TextBox 4">
-            <a:extLst>
-              <a:ext uri="{FF2B5EF4-FFF2-40B4-BE49-F238E27FC236}">
-                <a16:creationId xmlns:a16="http://schemas.microsoft.com/office/drawing/2014/main" id="{570CF578-AE96-77DA-30E0-F1DD81902889}"/>
-              </a:ext>
-            </a:extLst>
-          </p:cNvPr>
-          <p:cNvSpPr txBox="1"/>
-          <p:nvPr/>
-        </p:nvSpPr>
-        <p:spPr>
-          <a:xfrm>
-            <a:off x="2810566" y="2509230"/>
-            <a:ext cx="6619184" cy="738664"/>
-          </a:xfrm>
-          <a:prstGeom prst="rect">
-            <a:avLst/>
-          </a:prstGeom>
-          <a:noFill/>
-        </p:spPr>
-        <p:txBody>
-          <a:bodyPr wrap="none" rtlCol="0">
-            <a:spAutoFit/>
-          </a:bodyPr>
-          <a:lstStyle/>
-          <a:p>
-            <a:r>
-              <a:rPr lang="en-US" sz="4200" dirty="0">
-                <a:solidFill>
-                  <a:schemeClr val="bg1"/>
-                </a:solidFill>
-              </a:rPr>
-              <a:t>What is your final decision? </a:t>
-            </a:r>
-          </a:p>
-        </p:txBody>
-      </p:sp>
-      <p:sp>
-        <p:nvSpPr>
-          <p:cNvPr id="6" name="Rectangle 5">
-            <a:extLst>
-              <a:ext uri="{FF2B5EF4-FFF2-40B4-BE49-F238E27FC236}">
-                <a16:creationId xmlns:a16="http://schemas.microsoft.com/office/drawing/2014/main" id="{5BDFB790-F7A4-7140-B30F-EA5B24FF7FF2}"/>
-              </a:ext>
-            </a:extLst>
-          </p:cNvPr>
-          <p:cNvSpPr/>
-          <p:nvPr/>
-        </p:nvSpPr>
-        <p:spPr>
-          <a:xfrm>
-            <a:off x="1906249" y="2158583"/>
-            <a:ext cx="8379502" cy="3792512"/>
-          </a:xfrm>
-          <a:prstGeom prst="rect">
-            <a:avLst/>
-          </a:prstGeom>
-          <a:noFill/>
-          <a:ln w="101600">
+          <a:ln w="38100">
             <a:solidFill>
               <a:schemeClr val="bg1"/>
             </a:solidFill>
           </a:ln>
         </p:spPr>
+      </p:pic>
+      <p:sp>
+        <p:nvSpPr>
+          <p:cNvPr id="8" name="Content Placeholder 2">
+            <a:extLst>
+              <a:ext uri="{FF2B5EF4-FFF2-40B4-BE49-F238E27FC236}">
+                <a16:creationId xmlns:a16="http://schemas.microsoft.com/office/drawing/2014/main" id="{451FD117-A7FA-FA53-4E80-608DF616A21D}"/>
+              </a:ext>
+            </a:extLst>
+          </p:cNvPr>
+          <p:cNvSpPr txBox="1">
+            <a:spLocks/>
+          </p:cNvSpPr>
+          <p:nvPr/>
+        </p:nvSpPr>
+        <p:spPr>
+          <a:xfrm>
+            <a:off x="838200" y="2774763"/>
+            <a:ext cx="1508937" cy="888239"/>
+          </a:xfrm>
+          <a:prstGeom prst="rect">
+            <a:avLst/>
+          </a:prstGeom>
+          <a:solidFill>
+            <a:srgbClr val="808070"/>
+          </a:solidFill>
+          <a:ln w="38100">
+            <a:solidFill>
+              <a:srgbClr val="FFFF00"/>
+            </a:solidFill>
+          </a:ln>
+        </p:spPr>
+        <p:txBody>
+          <a:bodyPr vert="horz" lIns="91440" tIns="45720" rIns="91440" bIns="45720" rtlCol="0" anchor="ctr">
+            <a:noAutofit/>
+          </a:bodyPr>
+          <a:lstStyle>
+            <a:lvl1pPr marL="228600" indent="-228600" algn="l" defTabSz="914400" rtl="0" eaLnBrk="1" latinLnBrk="0" hangingPunct="1">
+              <a:lnSpc>
+                <a:spcPct val="90000"/>
+              </a:lnSpc>
+              <a:spcBef>
+                <a:spcPts val="1000"/>
+              </a:spcBef>
+              <a:buFont typeface="Arial" panose="020B0604020202020204" pitchFamily="34" charset="0"/>
+              <a:buChar char="•"/>
+              <a:defRPr sz="2800" kern="1200">
+                <a:solidFill>
+                  <a:schemeClr val="tx1"/>
+                </a:solidFill>
+                <a:latin typeface="+mn-lt"/>
+                <a:ea typeface="+mn-ea"/>
+                <a:cs typeface="+mn-cs"/>
+              </a:defRPr>
+            </a:lvl1pPr>
+            <a:lvl2pPr marL="685800" indent="-228600" algn="l" defTabSz="914400" rtl="0" eaLnBrk="1" latinLnBrk="0" hangingPunct="1">
+              <a:lnSpc>
+                <a:spcPct val="90000"/>
+              </a:lnSpc>
+              <a:spcBef>
+                <a:spcPts val="500"/>
+              </a:spcBef>
+              <a:buFont typeface="Arial" panose="020B0604020202020204" pitchFamily="34" charset="0"/>
+              <a:buChar char="•"/>
+              <a:defRPr sz="2400" kern="1200">
+                <a:solidFill>
+                  <a:schemeClr val="tx1"/>
+                </a:solidFill>
+                <a:latin typeface="+mn-lt"/>
+                <a:ea typeface="+mn-ea"/>
+                <a:cs typeface="+mn-cs"/>
+              </a:defRPr>
+            </a:lvl2pPr>
+            <a:lvl3pPr marL="1143000" indent="-228600" algn="l" defTabSz="914400" rtl="0" eaLnBrk="1" latinLnBrk="0" hangingPunct="1">
+              <a:lnSpc>
+                <a:spcPct val="90000"/>
+              </a:lnSpc>
+              <a:spcBef>
+                <a:spcPts val="500"/>
+              </a:spcBef>
+              <a:buFont typeface="Arial" panose="020B0604020202020204" pitchFamily="34" charset="0"/>
+              <a:buChar char="•"/>
+              <a:defRPr sz="2000" kern="1200">
+                <a:solidFill>
+                  <a:schemeClr val="tx1"/>
+                </a:solidFill>
+                <a:latin typeface="+mn-lt"/>
+                <a:ea typeface="+mn-ea"/>
+                <a:cs typeface="+mn-cs"/>
+              </a:defRPr>
+            </a:lvl3pPr>
+            <a:lvl4pPr marL="1600200" indent="-228600" algn="l" defTabSz="914400" rtl="0" eaLnBrk="1" latinLnBrk="0" hangingPunct="1">
+              <a:lnSpc>
+                <a:spcPct val="90000"/>
+              </a:lnSpc>
+              <a:spcBef>
+                <a:spcPts val="500"/>
+              </a:spcBef>
+              <a:buFont typeface="Arial" panose="020B0604020202020204" pitchFamily="34" charset="0"/>
+              <a:buChar char="•"/>
+              <a:defRPr sz="1800" kern="1200">
+                <a:solidFill>
+                  <a:schemeClr val="tx1"/>
+                </a:solidFill>
+                <a:latin typeface="+mn-lt"/>
+                <a:ea typeface="+mn-ea"/>
+                <a:cs typeface="+mn-cs"/>
+              </a:defRPr>
+            </a:lvl4pPr>
+            <a:lvl5pPr marL="2057400" indent="-228600" algn="l" defTabSz="914400" rtl="0" eaLnBrk="1" latinLnBrk="0" hangingPunct="1">
+              <a:lnSpc>
+                <a:spcPct val="90000"/>
+              </a:lnSpc>
+              <a:spcBef>
+                <a:spcPts val="500"/>
+              </a:spcBef>
+              <a:buFont typeface="Arial" panose="020B0604020202020204" pitchFamily="34" charset="0"/>
+              <a:buChar char="•"/>
+              <a:defRPr sz="1800" kern="1200">
+                <a:solidFill>
+                  <a:schemeClr val="tx1"/>
+                </a:solidFill>
+                <a:latin typeface="+mn-lt"/>
+                <a:ea typeface="+mn-ea"/>
+                <a:cs typeface="+mn-cs"/>
+              </a:defRPr>
+            </a:lvl5pPr>
+            <a:lvl6pPr marL="2514600" indent="-228600" algn="l" defTabSz="914400" rtl="0" eaLnBrk="1" latinLnBrk="0" hangingPunct="1">
+              <a:lnSpc>
+                <a:spcPct val="90000"/>
+              </a:lnSpc>
+              <a:spcBef>
+                <a:spcPts val="500"/>
+              </a:spcBef>
+              <a:buFont typeface="Arial" panose="020B0604020202020204" pitchFamily="34" charset="0"/>
+              <a:buChar char="•"/>
+              <a:defRPr sz="1800" kern="1200">
+                <a:solidFill>
+                  <a:schemeClr val="tx1"/>
+                </a:solidFill>
+                <a:latin typeface="+mn-lt"/>
+                <a:ea typeface="+mn-ea"/>
+                <a:cs typeface="+mn-cs"/>
+              </a:defRPr>
+            </a:lvl6pPr>
+            <a:lvl7pPr marL="2971800" indent="-228600" algn="l" defTabSz="914400" rtl="0" eaLnBrk="1" latinLnBrk="0" hangingPunct="1">
+              <a:lnSpc>
+                <a:spcPct val="90000"/>
+              </a:lnSpc>
+              <a:spcBef>
+                <a:spcPts val="500"/>
+              </a:spcBef>
+              <a:buFont typeface="Arial" panose="020B0604020202020204" pitchFamily="34" charset="0"/>
+              <a:buChar char="•"/>
+              <a:defRPr sz="1800" kern="1200">
+                <a:solidFill>
+                  <a:schemeClr val="tx1"/>
+                </a:solidFill>
+                <a:latin typeface="+mn-lt"/>
+                <a:ea typeface="+mn-ea"/>
+                <a:cs typeface="+mn-cs"/>
+              </a:defRPr>
+            </a:lvl7pPr>
+            <a:lvl8pPr marL="3429000" indent="-228600" algn="l" defTabSz="914400" rtl="0" eaLnBrk="1" latinLnBrk="0" hangingPunct="1">
+              <a:lnSpc>
+                <a:spcPct val="90000"/>
+              </a:lnSpc>
+              <a:spcBef>
+                <a:spcPts val="500"/>
+              </a:spcBef>
+              <a:buFont typeface="Arial" panose="020B0604020202020204" pitchFamily="34" charset="0"/>
+              <a:buChar char="•"/>
+              <a:defRPr sz="1800" kern="1200">
+                <a:solidFill>
+                  <a:schemeClr val="tx1"/>
+                </a:solidFill>
+                <a:latin typeface="+mn-lt"/>
+                <a:ea typeface="+mn-ea"/>
+                <a:cs typeface="+mn-cs"/>
+              </a:defRPr>
+            </a:lvl8pPr>
+            <a:lvl9pPr marL="3886200" indent="-228600" algn="l" defTabSz="914400" rtl="0" eaLnBrk="1" latinLnBrk="0" hangingPunct="1">
+              <a:lnSpc>
+                <a:spcPct val="90000"/>
+              </a:lnSpc>
+              <a:spcBef>
+                <a:spcPts val="500"/>
+              </a:spcBef>
+              <a:buFont typeface="Arial" panose="020B0604020202020204" pitchFamily="34" charset="0"/>
+              <a:buChar char="•"/>
+              <a:defRPr sz="1800" kern="1200">
+                <a:solidFill>
+                  <a:schemeClr val="tx1"/>
+                </a:solidFill>
+                <a:latin typeface="+mn-lt"/>
+                <a:ea typeface="+mn-ea"/>
+                <a:cs typeface="+mn-cs"/>
+              </a:defRPr>
+            </a:lvl9pPr>
+          </a:lstStyle>
+          <a:p>
+            <a:pPr marL="0" indent="0" algn="ctr">
+              <a:buFont typeface="Arial" panose="020B0604020202020204" pitchFamily="34" charset="0"/>
+              <a:buNone/>
+            </a:pPr>
+            <a:r>
+              <a:rPr lang="en-US" sz="2000" dirty="0">
+                <a:solidFill>
+                  <a:srgbClr val="FFFF00"/>
+                </a:solidFill>
+              </a:rPr>
+              <a:t>Your previous decision</a:t>
+            </a:r>
+          </a:p>
+        </p:txBody>
+      </p:sp>
+      <p:cxnSp>
+        <p:nvCxnSpPr>
+          <p:cNvPr id="9" name="Straight Arrow Connector 8">
+            <a:extLst>
+              <a:ext uri="{FF2B5EF4-FFF2-40B4-BE49-F238E27FC236}">
+                <a16:creationId xmlns:a16="http://schemas.microsoft.com/office/drawing/2014/main" id="{9DAD20B7-6323-956F-E8DD-9C6B81A52112}"/>
+              </a:ext>
+            </a:extLst>
+          </p:cNvPr>
+          <p:cNvCxnSpPr>
+            <a:cxnSpLocks/>
+          </p:cNvCxnSpPr>
+          <p:nvPr/>
+        </p:nvCxnSpPr>
+        <p:spPr>
+          <a:xfrm flipH="1" flipV="1">
+            <a:off x="2347137" y="3383280"/>
+            <a:ext cx="931817" cy="333068"/>
+          </a:xfrm>
+          <a:prstGeom prst="straightConnector1">
+            <a:avLst/>
+          </a:prstGeom>
+          <a:ln w="101600">
+            <a:solidFill>
+              <a:srgbClr val="FFFF00"/>
+            </a:solidFill>
+            <a:headEnd type="stealth"/>
+            <a:tailEnd type="none"/>
+          </a:ln>
+        </p:spPr>
         <p:style>
-          <a:lnRef idx="2">
-            <a:schemeClr val="accent1">
-              <a:shade val="15000"/>
-            </a:schemeClr>
+          <a:lnRef idx="1">
+            <a:schemeClr val="accent6"/>
           </a:lnRef>
-          <a:fillRef idx="1">
-            <a:schemeClr val="accent1"/>
+          <a:fillRef idx="0">
+            <a:schemeClr val="accent6"/>
           </a:fillRef>
           <a:effectRef idx="0">
-            <a:schemeClr val="accent1"/>
+            <a:schemeClr val="accent6"/>
           </a:effectRef>
           <a:fontRef idx="minor">
-            <a:schemeClr val="lt1"/>
+            <a:schemeClr val="tx1"/>
           </a:fontRef>
         </p:style>
-        <p:txBody>
-          <a:bodyPr rtlCol="0" anchor="ctr"/>
-          <a:lstStyle/>
-          <a:p>
-            <a:pPr algn="ctr"/>
-            <a:endParaRPr lang="en-US"/>
-          </a:p>
-        </p:txBody>
-      </p:sp>
+      </p:cxnSp>
     </p:spTree>
     <p:extLst>
       <p:ext uri="{BB962C8B-B14F-4D97-AF65-F5344CB8AC3E}">
@@ -3956,6 +4132,430 @@
 </file>
 
 <file path=ppt/slides/slide11.xml><?xml version="1.0" encoding="utf-8"?>
+<p:sld xmlns:a="http://schemas.openxmlformats.org/drawingml/2006/main" xmlns:r="http://schemas.openxmlformats.org/officeDocument/2006/relationships" xmlns:p="http://schemas.openxmlformats.org/presentationml/2006/main">
+  <p:cSld>
+    <p:bg>
+      <p:bgPr>
+        <a:solidFill>
+          <a:srgbClr val="808070"/>
+        </a:solidFill>
+        <a:effectLst/>
+      </p:bgPr>
+    </p:bg>
+    <p:spTree>
+      <p:nvGrpSpPr>
+        <p:cNvPr id="1" name="">
+          <a:extLst>
+            <a:ext uri="{FF2B5EF4-FFF2-40B4-BE49-F238E27FC236}">
+              <a16:creationId xmlns:a16="http://schemas.microsoft.com/office/drawing/2014/main" id="{D5E2CC23-C1F5-3938-A6D4-7FAF7437FA64}"/>
+            </a:ext>
+          </a:extLst>
+        </p:cNvPr>
+        <p:cNvGrpSpPr/>
+        <p:nvPr/>
+      </p:nvGrpSpPr>
+      <p:grpSpPr>
+        <a:xfrm>
+          <a:off x="0" y="0"/>
+          <a:ext cx="0" cy="0"/>
+          <a:chOff x="0" y="0"/>
+          <a:chExt cx="0" cy="0"/>
+        </a:xfrm>
+      </p:grpSpPr>
+      <p:sp>
+        <p:nvSpPr>
+          <p:cNvPr id="3" name="Content Placeholder 2">
+            <a:extLst>
+              <a:ext uri="{FF2B5EF4-FFF2-40B4-BE49-F238E27FC236}">
+                <a16:creationId xmlns:a16="http://schemas.microsoft.com/office/drawing/2014/main" id="{C13D314E-B6A8-28D2-E7DB-ECFFD7D913D7}"/>
+              </a:ext>
+            </a:extLst>
+          </p:cNvPr>
+          <p:cNvSpPr>
+            <a:spLocks noGrp="1"/>
+          </p:cNvSpPr>
+          <p:nvPr>
+            <p:ph idx="1"/>
+          </p:nvPr>
+        </p:nvSpPr>
+        <p:spPr>
+          <a:xfrm>
+            <a:off x="838200" y="1131286"/>
+            <a:ext cx="10515600" cy="3193579"/>
+          </a:xfrm>
+        </p:spPr>
+        <p:txBody>
+          <a:bodyPr>
+            <a:normAutofit/>
+          </a:bodyPr>
+          <a:lstStyle/>
+          <a:p>
+            <a:pPr marL="0" indent="0" algn="ctr">
+              <a:buNone/>
+            </a:pPr>
+            <a:r>
+              <a:rPr lang="en-US" dirty="0">
+                <a:solidFill>
+                  <a:schemeClr val="bg1"/>
+                </a:solidFill>
+              </a:rPr>
+              <a:t>After these options, you will be asked to confirm your final decision by clicking once more:</a:t>
+            </a:r>
+          </a:p>
+        </p:txBody>
+      </p:sp>
+      <p:pic>
+        <p:nvPicPr>
+          <p:cNvPr id="7" name="Picture 6" descr="A grey rectangular sign with white text&#10;&#10;AI-generated content may be incorrect.">
+            <a:extLst>
+              <a:ext uri="{FF2B5EF4-FFF2-40B4-BE49-F238E27FC236}">
+                <a16:creationId xmlns:a16="http://schemas.microsoft.com/office/drawing/2014/main" id="{5E4985BE-33B3-3F78-DC7B-B62D4CC41C77}"/>
+              </a:ext>
+            </a:extLst>
+          </p:cNvPr>
+          <p:cNvPicPr>
+            <a:picLocks noChangeAspect="1"/>
+          </p:cNvPicPr>
+          <p:nvPr/>
+        </p:nvPicPr>
+        <p:blipFill>
+          <a:blip r:embed="rId2"/>
+          <a:stretch>
+            <a:fillRect/>
+          </a:stretch>
+        </p:blipFill>
+        <p:spPr>
+          <a:xfrm>
+            <a:off x="2800639" y="2412311"/>
+            <a:ext cx="6314518" cy="2699515"/>
+          </a:xfrm>
+          <a:prstGeom prst="rect">
+            <a:avLst/>
+          </a:prstGeom>
+          <a:ln w="38100">
+            <a:solidFill>
+              <a:schemeClr val="bg1"/>
+            </a:solidFill>
+          </a:ln>
+        </p:spPr>
+      </p:pic>
+      <p:pic>
+        <p:nvPicPr>
+          <p:cNvPr id="4" name="Picture 3" descr="A grey rectangular sign with white text&#10;&#10;AI-generated content may be incorrect.">
+            <a:extLst>
+              <a:ext uri="{FF2B5EF4-FFF2-40B4-BE49-F238E27FC236}">
+                <a16:creationId xmlns:a16="http://schemas.microsoft.com/office/drawing/2014/main" id="{77E70C68-CF0C-6063-D6D4-1AA83DB94894}"/>
+              </a:ext>
+            </a:extLst>
+          </p:cNvPr>
+          <p:cNvPicPr>
+            <a:picLocks noChangeAspect="1"/>
+          </p:cNvPicPr>
+          <p:nvPr/>
+        </p:nvPicPr>
+        <p:blipFill>
+          <a:blip r:embed="rId3"/>
+          <a:srcRect r="2904"/>
+          <a:stretch/>
+        </p:blipFill>
+        <p:spPr>
+          <a:xfrm>
+            <a:off x="2813045" y="2524839"/>
+            <a:ext cx="6165492" cy="2586987"/>
+          </a:xfrm>
+          <a:prstGeom prst="rect">
+            <a:avLst/>
+          </a:prstGeom>
+        </p:spPr>
+      </p:pic>
+      <p:sp>
+        <p:nvSpPr>
+          <p:cNvPr id="5" name="Content Placeholder 2">
+            <a:extLst>
+              <a:ext uri="{FF2B5EF4-FFF2-40B4-BE49-F238E27FC236}">
+                <a16:creationId xmlns:a16="http://schemas.microsoft.com/office/drawing/2014/main" id="{7F7324D4-9130-FDC9-FDAF-1FAADBFBA45D}"/>
+              </a:ext>
+            </a:extLst>
+          </p:cNvPr>
+          <p:cNvSpPr txBox="1">
+            <a:spLocks/>
+          </p:cNvSpPr>
+          <p:nvPr/>
+        </p:nvSpPr>
+        <p:spPr>
+          <a:xfrm>
+            <a:off x="3346269" y="5451266"/>
+            <a:ext cx="1508937" cy="888239"/>
+          </a:xfrm>
+          <a:prstGeom prst="rect">
+            <a:avLst/>
+          </a:prstGeom>
+          <a:solidFill>
+            <a:srgbClr val="808070"/>
+          </a:solidFill>
+          <a:ln w="38100">
+            <a:solidFill>
+              <a:srgbClr val="FFFF00"/>
+            </a:solidFill>
+          </a:ln>
+        </p:spPr>
+        <p:txBody>
+          <a:bodyPr vert="horz" lIns="91440" tIns="45720" rIns="91440" bIns="45720" rtlCol="0" anchor="ctr">
+            <a:noAutofit/>
+          </a:bodyPr>
+          <a:lstStyle>
+            <a:lvl1pPr marL="228600" indent="-228600" algn="l" defTabSz="914400" rtl="0" eaLnBrk="1" latinLnBrk="0" hangingPunct="1">
+              <a:lnSpc>
+                <a:spcPct val="90000"/>
+              </a:lnSpc>
+              <a:spcBef>
+                <a:spcPts val="1000"/>
+              </a:spcBef>
+              <a:buFont typeface="Arial" panose="020B0604020202020204" pitchFamily="34" charset="0"/>
+              <a:buChar char="•"/>
+              <a:defRPr sz="2800" kern="1200">
+                <a:solidFill>
+                  <a:schemeClr val="tx1"/>
+                </a:solidFill>
+                <a:latin typeface="+mn-lt"/>
+                <a:ea typeface="+mn-ea"/>
+                <a:cs typeface="+mn-cs"/>
+              </a:defRPr>
+            </a:lvl1pPr>
+            <a:lvl2pPr marL="685800" indent="-228600" algn="l" defTabSz="914400" rtl="0" eaLnBrk="1" latinLnBrk="0" hangingPunct="1">
+              <a:lnSpc>
+                <a:spcPct val="90000"/>
+              </a:lnSpc>
+              <a:spcBef>
+                <a:spcPts val="500"/>
+              </a:spcBef>
+              <a:buFont typeface="Arial" panose="020B0604020202020204" pitchFamily="34" charset="0"/>
+              <a:buChar char="•"/>
+              <a:defRPr sz="2400" kern="1200">
+                <a:solidFill>
+                  <a:schemeClr val="tx1"/>
+                </a:solidFill>
+                <a:latin typeface="+mn-lt"/>
+                <a:ea typeface="+mn-ea"/>
+                <a:cs typeface="+mn-cs"/>
+              </a:defRPr>
+            </a:lvl2pPr>
+            <a:lvl3pPr marL="1143000" indent="-228600" algn="l" defTabSz="914400" rtl="0" eaLnBrk="1" latinLnBrk="0" hangingPunct="1">
+              <a:lnSpc>
+                <a:spcPct val="90000"/>
+              </a:lnSpc>
+              <a:spcBef>
+                <a:spcPts val="500"/>
+              </a:spcBef>
+              <a:buFont typeface="Arial" panose="020B0604020202020204" pitchFamily="34" charset="0"/>
+              <a:buChar char="•"/>
+              <a:defRPr sz="2000" kern="1200">
+                <a:solidFill>
+                  <a:schemeClr val="tx1"/>
+                </a:solidFill>
+                <a:latin typeface="+mn-lt"/>
+                <a:ea typeface="+mn-ea"/>
+                <a:cs typeface="+mn-cs"/>
+              </a:defRPr>
+            </a:lvl3pPr>
+            <a:lvl4pPr marL="1600200" indent="-228600" algn="l" defTabSz="914400" rtl="0" eaLnBrk="1" latinLnBrk="0" hangingPunct="1">
+              <a:lnSpc>
+                <a:spcPct val="90000"/>
+              </a:lnSpc>
+              <a:spcBef>
+                <a:spcPts val="500"/>
+              </a:spcBef>
+              <a:buFont typeface="Arial" panose="020B0604020202020204" pitchFamily="34" charset="0"/>
+              <a:buChar char="•"/>
+              <a:defRPr sz="1800" kern="1200">
+                <a:solidFill>
+                  <a:schemeClr val="tx1"/>
+                </a:solidFill>
+                <a:latin typeface="+mn-lt"/>
+                <a:ea typeface="+mn-ea"/>
+                <a:cs typeface="+mn-cs"/>
+              </a:defRPr>
+            </a:lvl4pPr>
+            <a:lvl5pPr marL="2057400" indent="-228600" algn="l" defTabSz="914400" rtl="0" eaLnBrk="1" latinLnBrk="0" hangingPunct="1">
+              <a:lnSpc>
+                <a:spcPct val="90000"/>
+              </a:lnSpc>
+              <a:spcBef>
+                <a:spcPts val="500"/>
+              </a:spcBef>
+              <a:buFont typeface="Arial" panose="020B0604020202020204" pitchFamily="34" charset="0"/>
+              <a:buChar char="•"/>
+              <a:defRPr sz="1800" kern="1200">
+                <a:solidFill>
+                  <a:schemeClr val="tx1"/>
+                </a:solidFill>
+                <a:latin typeface="+mn-lt"/>
+                <a:ea typeface="+mn-ea"/>
+                <a:cs typeface="+mn-cs"/>
+              </a:defRPr>
+            </a:lvl5pPr>
+            <a:lvl6pPr marL="2514600" indent="-228600" algn="l" defTabSz="914400" rtl="0" eaLnBrk="1" latinLnBrk="0" hangingPunct="1">
+              <a:lnSpc>
+                <a:spcPct val="90000"/>
+              </a:lnSpc>
+              <a:spcBef>
+                <a:spcPts val="500"/>
+              </a:spcBef>
+              <a:buFont typeface="Arial" panose="020B0604020202020204" pitchFamily="34" charset="0"/>
+              <a:buChar char="•"/>
+              <a:defRPr sz="1800" kern="1200">
+                <a:solidFill>
+                  <a:schemeClr val="tx1"/>
+                </a:solidFill>
+                <a:latin typeface="+mn-lt"/>
+                <a:ea typeface="+mn-ea"/>
+                <a:cs typeface="+mn-cs"/>
+              </a:defRPr>
+            </a:lvl6pPr>
+            <a:lvl7pPr marL="2971800" indent="-228600" algn="l" defTabSz="914400" rtl="0" eaLnBrk="1" latinLnBrk="0" hangingPunct="1">
+              <a:lnSpc>
+                <a:spcPct val="90000"/>
+              </a:lnSpc>
+              <a:spcBef>
+                <a:spcPts val="500"/>
+              </a:spcBef>
+              <a:buFont typeface="Arial" panose="020B0604020202020204" pitchFamily="34" charset="0"/>
+              <a:buChar char="•"/>
+              <a:defRPr sz="1800" kern="1200">
+                <a:solidFill>
+                  <a:schemeClr val="tx1"/>
+                </a:solidFill>
+                <a:latin typeface="+mn-lt"/>
+                <a:ea typeface="+mn-ea"/>
+                <a:cs typeface="+mn-cs"/>
+              </a:defRPr>
+            </a:lvl7pPr>
+            <a:lvl8pPr marL="3429000" indent="-228600" algn="l" defTabSz="914400" rtl="0" eaLnBrk="1" latinLnBrk="0" hangingPunct="1">
+              <a:lnSpc>
+                <a:spcPct val="90000"/>
+              </a:lnSpc>
+              <a:spcBef>
+                <a:spcPts val="500"/>
+              </a:spcBef>
+              <a:buFont typeface="Arial" panose="020B0604020202020204" pitchFamily="34" charset="0"/>
+              <a:buChar char="•"/>
+              <a:defRPr sz="1800" kern="1200">
+                <a:solidFill>
+                  <a:schemeClr val="tx1"/>
+                </a:solidFill>
+                <a:latin typeface="+mn-lt"/>
+                <a:ea typeface="+mn-ea"/>
+                <a:cs typeface="+mn-cs"/>
+              </a:defRPr>
+            </a:lvl8pPr>
+            <a:lvl9pPr marL="3886200" indent="-228600" algn="l" defTabSz="914400" rtl="0" eaLnBrk="1" latinLnBrk="0" hangingPunct="1">
+              <a:lnSpc>
+                <a:spcPct val="90000"/>
+              </a:lnSpc>
+              <a:spcBef>
+                <a:spcPts val="500"/>
+              </a:spcBef>
+              <a:buFont typeface="Arial" panose="020B0604020202020204" pitchFamily="34" charset="0"/>
+              <a:buChar char="•"/>
+              <a:defRPr sz="1800" kern="1200">
+                <a:solidFill>
+                  <a:schemeClr val="tx1"/>
+                </a:solidFill>
+                <a:latin typeface="+mn-lt"/>
+                <a:ea typeface="+mn-ea"/>
+                <a:cs typeface="+mn-cs"/>
+              </a:defRPr>
+            </a:lvl9pPr>
+          </a:lstStyle>
+          <a:p>
+            <a:pPr marL="0" indent="0" algn="ctr">
+              <a:buFont typeface="Arial" panose="020B0604020202020204" pitchFamily="34" charset="0"/>
+              <a:buNone/>
+            </a:pPr>
+            <a:r>
+              <a:rPr lang="en-US" sz="2000" dirty="0">
+                <a:solidFill>
+                  <a:srgbClr val="FFFF00"/>
+                </a:solidFill>
+              </a:rPr>
+              <a:t>Your Final</a:t>
+            </a:r>
+          </a:p>
+          <a:p>
+            <a:pPr marL="0" indent="0" algn="ctr">
+              <a:buFont typeface="Arial" panose="020B0604020202020204" pitchFamily="34" charset="0"/>
+              <a:buNone/>
+            </a:pPr>
+            <a:r>
+              <a:rPr lang="en-US" sz="2000" dirty="0">
+                <a:solidFill>
+                  <a:srgbClr val="FFFF00"/>
+                </a:solidFill>
+              </a:rPr>
+              <a:t>decision</a:t>
+            </a:r>
+          </a:p>
+        </p:txBody>
+      </p:sp>
+      <p:cxnSp>
+        <p:nvCxnSpPr>
+          <p:cNvPr id="6" name="Straight Arrow Connector 5">
+            <a:extLst>
+              <a:ext uri="{FF2B5EF4-FFF2-40B4-BE49-F238E27FC236}">
+                <a16:creationId xmlns:a16="http://schemas.microsoft.com/office/drawing/2014/main" id="{0C6EA442-4215-2CCD-18A6-E767BB8E1B42}"/>
+              </a:ext>
+            </a:extLst>
+          </p:cNvPr>
+          <p:cNvCxnSpPr>
+            <a:cxnSpLocks/>
+          </p:cNvCxnSpPr>
+          <p:nvPr/>
+        </p:nvCxnSpPr>
+        <p:spPr>
+          <a:xfrm>
+            <a:off x="4297857" y="4120237"/>
+            <a:ext cx="0" cy="1331029"/>
+          </a:xfrm>
+          <a:prstGeom prst="straightConnector1">
+            <a:avLst/>
+          </a:prstGeom>
+          <a:ln w="101600">
+            <a:solidFill>
+              <a:srgbClr val="FFFF00"/>
+            </a:solidFill>
+            <a:headEnd type="stealth"/>
+            <a:tailEnd type="none"/>
+          </a:ln>
+        </p:spPr>
+        <p:style>
+          <a:lnRef idx="1">
+            <a:schemeClr val="accent6"/>
+          </a:lnRef>
+          <a:fillRef idx="0">
+            <a:schemeClr val="accent6"/>
+          </a:fillRef>
+          <a:effectRef idx="0">
+            <a:schemeClr val="accent6"/>
+          </a:effectRef>
+          <a:fontRef idx="minor">
+            <a:schemeClr val="tx1"/>
+          </a:fontRef>
+        </p:style>
+      </p:cxnSp>
+    </p:spTree>
+    <p:extLst>
+      <p:ext uri="{BB962C8B-B14F-4D97-AF65-F5344CB8AC3E}">
+        <p14:creationId xmlns:p14="http://schemas.microsoft.com/office/powerpoint/2010/main" val="2424719650"/>
+      </p:ext>
+    </p:extLst>
+  </p:cSld>
+  <p:clrMapOvr>
+    <a:masterClrMapping/>
+  </p:clrMapOvr>
+</p:sld>
+</file>
+
+<file path=ppt/slides/slide12.xml><?xml version="1.0" encoding="utf-8"?>
 <p:sld xmlns:a="http://schemas.openxmlformats.org/drawingml/2006/main" xmlns:r="http://schemas.openxmlformats.org/officeDocument/2006/relationships" xmlns:p="http://schemas.openxmlformats.org/presentationml/2006/main">
   <p:cSld>
     <p:bg>
@@ -4744,7 +5344,7 @@
 </p:sld>
 </file>
 
-<file path=ppt/slides/slide12.xml><?xml version="1.0" encoding="utf-8"?>
+<file path=ppt/slides/slide13.xml><?xml version="1.0" encoding="utf-8"?>
 <p:sld xmlns:a="http://schemas.openxmlformats.org/drawingml/2006/main" xmlns:r="http://schemas.openxmlformats.org/officeDocument/2006/relationships" xmlns:p="http://schemas.openxmlformats.org/presentationml/2006/main">
   <p:cSld>
     <p:bg>
@@ -4863,7 +5463,7 @@
 </p:sld>
 </file>
 
-<file path=ppt/slides/slide13.xml><?xml version="1.0" encoding="utf-8"?>
+<file path=ppt/slides/slide14.xml><?xml version="1.0" encoding="utf-8"?>
 <p:sld xmlns:a="http://schemas.openxmlformats.org/drawingml/2006/main" xmlns:r="http://schemas.openxmlformats.org/officeDocument/2006/relationships" xmlns:p="http://schemas.openxmlformats.org/presentationml/2006/main">
   <p:cSld>
     <p:bg>
@@ -5048,7 +5648,7 @@
 </p:sld>
 </file>
 
-<file path=ppt/slides/slide14.xml><?xml version="1.0" encoding="utf-8"?>
+<file path=ppt/slides/slide15.xml><?xml version="1.0" encoding="utf-8"?>
 <p:sld xmlns:a="http://schemas.openxmlformats.org/drawingml/2006/main" xmlns:r="http://schemas.openxmlformats.org/officeDocument/2006/relationships" xmlns:p="http://schemas.openxmlformats.org/presentationml/2006/main">
   <p:cSld>
     <p:bg>
@@ -5195,7 +5795,7 @@
 </p:sld>
 </file>
 
-<file path=ppt/slides/slide15.xml><?xml version="1.0" encoding="utf-8"?>
+<file path=ppt/slides/slide16.xml><?xml version="1.0" encoding="utf-8"?>
 <p:sld xmlns:a="http://schemas.openxmlformats.org/drawingml/2006/main" xmlns:r="http://schemas.openxmlformats.org/officeDocument/2006/relationships" xmlns:p="http://schemas.openxmlformats.org/presentationml/2006/main">
   <p:cSld>
     <p:bg>

</xml_diff>